<commit_message>
Update code and remove unnecessary files
</commit_message>
<xml_diff>
--- a/doc/compilador.pptx
+++ b/doc/compilador.pptx
@@ -107,6 +107,11 @@
       </a:defRPr>
     </a:lvl9pPr>
   </p:defaultTextStyle>
+  <p:extLst>
+    <p:ext uri="{EFAFB233-063F-42B5-8137-9DF3F51BA10A}">
+      <p15:sldGuideLst xmlns:p15="http://schemas.microsoft.com/office/powerpoint/2012/main"/>
+    </p:ext>
+  </p:extLst>
 </p:presentation>
 </file>
 
@@ -425,7 +430,7 @@
             <a:fld id="{73C3BD54-29B9-3D42-B178-776ED395AA85}" type="datetimeFigureOut">
               <a:rPr lang="en-US" smtClean="0"/>
               <a:pPr/>
-              <a:t>2/12/2024</a:t>
+              <a:t>2/13/2024</a:t>
             </a:fld>
             <a:endParaRPr lang="en-US" sz="1400"/>
           </a:p>
@@ -675,7 +680,7 @@
           <a:p>
             <a:fld id="{73C3BD54-29B9-3D42-B178-776ED395AA85}" type="datetimeFigureOut">
               <a:rPr lang="en-US" smtClean="0"/>
-              <a:t>2/12/2024</a:t>
+              <a:t>2/13/2024</a:t>
             </a:fld>
             <a:endParaRPr lang="en-US"/>
           </a:p>
@@ -989,7 +994,7 @@
           <a:p>
             <a:fld id="{73C3BD54-29B9-3D42-B178-776ED395AA85}" type="datetimeFigureOut">
               <a:rPr lang="en-US" smtClean="0"/>
-              <a:t>2/12/2024</a:t>
+              <a:t>2/13/2024</a:t>
             </a:fld>
             <a:endParaRPr lang="en-US"/>
           </a:p>
@@ -1503,7 +1508,7 @@
           <a:p>
             <a:fld id="{73C3BD54-29B9-3D42-B178-776ED395AA85}" type="datetimeFigureOut">
               <a:rPr lang="en-US" smtClean="0"/>
-              <a:t>2/12/2024</a:t>
+              <a:t>2/13/2024</a:t>
             </a:fld>
             <a:endParaRPr lang="en-US"/>
           </a:p>
@@ -1934,7 +1939,7 @@
           <a:p>
             <a:fld id="{73C3BD54-29B9-3D42-B178-776ED395AA85}" type="datetimeFigureOut">
               <a:rPr lang="en-US" smtClean="0"/>
-              <a:t>2/12/2024</a:t>
+              <a:t>2/13/2024</a:t>
             </a:fld>
             <a:endParaRPr lang="en-US"/>
           </a:p>
@@ -2199,7 +2204,7 @@
           <a:p>
             <a:fld id="{73C3BD54-29B9-3D42-B178-776ED395AA85}" type="datetimeFigureOut">
               <a:rPr lang="en-US" smtClean="0"/>
-              <a:t>2/12/2024</a:t>
+              <a:t>2/13/2024</a:t>
             </a:fld>
             <a:endParaRPr lang="en-US"/>
           </a:p>
@@ -2773,7 +2778,7 @@
           <a:p>
             <a:fld id="{73C3BD54-29B9-3D42-B178-776ED395AA85}" type="datetimeFigureOut">
               <a:rPr lang="en-US" smtClean="0"/>
-              <a:t>2/12/2024</a:t>
+              <a:t>2/13/2024</a:t>
             </a:fld>
             <a:endParaRPr lang="en-US"/>
           </a:p>
@@ -3076,7 +3081,7 @@
           <a:p>
             <a:fld id="{73C3BD54-29B9-3D42-B178-776ED395AA85}" type="datetimeFigureOut">
               <a:rPr lang="en-US" smtClean="0"/>
-              <a:t>2/12/2024</a:t>
+              <a:t>2/13/2024</a:t>
             </a:fld>
             <a:endParaRPr lang="en-US"/>
           </a:p>
@@ -3351,7 +3356,7 @@
           <a:p>
             <a:fld id="{73C3BD54-29B9-3D42-B178-776ED395AA85}" type="datetimeFigureOut">
               <a:rPr lang="en-US" smtClean="0"/>
-              <a:t>2/12/2024</a:t>
+              <a:t>2/13/2024</a:t>
             </a:fld>
             <a:endParaRPr lang="en-US"/>
           </a:p>
@@ -3822,7 +3827,7 @@
           <a:p>
             <a:fld id="{73C3BD54-29B9-3D42-B178-776ED395AA85}" type="datetimeFigureOut">
               <a:rPr lang="en-US" smtClean="0"/>
-              <a:t>2/12/2024</a:t>
+              <a:t>2/13/2024</a:t>
             </a:fld>
             <a:endParaRPr lang="en-US"/>
           </a:p>
@@ -4273,7 +4278,7 @@
           <a:p>
             <a:fld id="{73C3BD54-29B9-3D42-B178-776ED395AA85}" type="datetimeFigureOut">
               <a:rPr lang="en-US" smtClean="0"/>
-              <a:t>2/12/2024</a:t>
+              <a:t>2/13/2024</a:t>
             </a:fld>
             <a:endParaRPr lang="en-US"/>
           </a:p>
@@ -4669,7 +4674,7 @@
             <a:fld id="{73C3BD54-29B9-3D42-B178-776ED395AA85}" type="datetimeFigureOut">
               <a:rPr lang="en-US" smtClean="0"/>
               <a:pPr/>
-              <a:t>2/12/2024</a:t>
+              <a:t>2/13/2024</a:t>
             </a:fld>
             <a:endParaRPr lang="en-US" dirty="0"/>
           </a:p>
@@ -5171,7 +5176,7 @@
         </p:blipFill>
         <p:spPr>
           <a:xfrm>
-            <a:off x="20" y="10"/>
+            <a:off x="0" y="219085"/>
             <a:ext cx="12191980" cy="6857990"/>
           </a:xfrm>
           <a:prstGeom prst="rect">
@@ -5688,6 +5693,11 @@
               </a:rPr>
               <a:t>Gramatica</a:t>
             </a:r>
+            <a:endParaRPr lang="es-MX" dirty="0">
+              <a:solidFill>
+                <a:schemeClr val="bg1"/>
+              </a:solidFill>
+            </a:endParaRPr>
           </a:p>
         </p:txBody>
       </p:sp>
@@ -5715,7 +5725,7 @@
         </p:spPr>
         <p:txBody>
           <a:bodyPr numCol="2">
-            <a:normAutofit fontScale="25000" lnSpcReduction="20000"/>
+            <a:normAutofit fontScale="92500"/>
           </a:bodyPr>
           <a:lstStyle/>
           <a:p>
@@ -5725,18 +5735,9 @@
               </a:lnSpc>
             </a:pPr>
             <a:r>
-              <a:rPr lang="es-MX" sz="4800" dirty="0" err="1"/>
-              <a:t>program</a:t>
-            </a:r>
-            <a:r>
-              <a:rPr lang="es-MX" sz="4800" dirty="0"/>
-              <a:t> -&gt; </a:t>
-            </a:r>
-            <a:r>
-              <a:rPr lang="es-MX" sz="4800" dirty="0" err="1"/>
-              <a:t>ini_block</a:t>
-            </a:r>
-            <a:endParaRPr lang="es-MX" sz="4800" dirty="0"/>
+              <a:rPr lang="es-MX" sz="1000"/>
+              <a:t>//gramatica</a:t>
+            </a:r>
           </a:p>
           <a:p>
             <a:pPr>
@@ -5745,28 +5746,8 @@
               </a:lnSpc>
             </a:pPr>
             <a:r>
-              <a:rPr lang="es-MX" sz="4800" dirty="0" err="1"/>
-              <a:t>ini_block</a:t>
-            </a:r>
-            <a:r>
-              <a:rPr lang="es-MX" sz="4800" dirty="0"/>
-              <a:t> -&gt; "</a:t>
-            </a:r>
-            <a:r>
-              <a:rPr lang="es-MX" sz="4800" dirty="0" err="1"/>
-              <a:t>ini</a:t>
-            </a:r>
-            <a:r>
-              <a:rPr lang="es-MX" sz="4800" dirty="0"/>
-              <a:t>" "{" </a:t>
-            </a:r>
-            <a:r>
-              <a:rPr lang="es-MX" sz="4800" dirty="0" err="1"/>
-              <a:t>statements</a:t>
-            </a:r>
-            <a:r>
-              <a:rPr lang="es-MX" sz="4800" dirty="0"/>
-              <a:t> "}"</a:t>
+              <a:rPr lang="es-MX" sz="1000"/>
+              <a:t>program -&gt; ini_block</a:t>
             </a:r>
           </a:p>
           <a:p>
@@ -5776,34 +5757,9 @@
               </a:lnSpc>
             </a:pPr>
             <a:r>
-              <a:rPr lang="es-MX" sz="4800" dirty="0" err="1"/>
-              <a:t>statements</a:t>
-            </a:r>
-            <a:r>
-              <a:rPr lang="es-MX" sz="4800" dirty="0"/>
-              <a:t> -&gt; </a:t>
-            </a:r>
-            <a:r>
-              <a:rPr lang="es-MX" sz="4800" dirty="0" err="1"/>
-              <a:t>statement</a:t>
-            </a:r>
-            <a:r>
-              <a:rPr lang="es-MX" sz="4800" dirty="0"/>
-              <a:t> </a:t>
-            </a:r>
-            <a:r>
-              <a:rPr lang="es-MX" sz="4800" dirty="0" err="1"/>
-              <a:t>statements</a:t>
-            </a:r>
-            <a:r>
-              <a:rPr lang="es-MX" sz="4800" dirty="0"/>
-              <a:t> | </a:t>
-            </a:r>
-            <a:r>
-              <a:rPr lang="es-MX" sz="4800" dirty="0" err="1"/>
-              <a:t>statement</a:t>
-            </a:r>
-            <a:endParaRPr lang="es-MX" sz="4800" dirty="0"/>
+              <a:rPr lang="es-MX" sz="1000"/>
+              <a:t>ini_block -&gt; "ini" "{" statements "}"</a:t>
+            </a:r>
           </a:p>
           <a:p>
             <a:pPr>
@@ -5812,42 +5768,9 @@
               </a:lnSpc>
             </a:pPr>
             <a:r>
-              <a:rPr lang="es-MX" sz="4800" dirty="0" err="1"/>
-              <a:t>statement</a:t>
-            </a:r>
-            <a:r>
-              <a:rPr lang="es-MX" sz="4800" dirty="0"/>
-              <a:t> -&gt; </a:t>
-            </a:r>
-            <a:r>
-              <a:rPr lang="es-MX" sz="4800" dirty="0" err="1"/>
-              <a:t>variable_declaration</a:t>
-            </a:r>
-            <a:r>
-              <a:rPr lang="es-MX" sz="4800" dirty="0"/>
-              <a:t> | </a:t>
-            </a:r>
-            <a:r>
-              <a:rPr lang="es-MX" sz="4800" dirty="0" err="1"/>
-              <a:t>assignment</a:t>
-            </a:r>
-            <a:r>
-              <a:rPr lang="es-MX" sz="4800" dirty="0"/>
-              <a:t> | </a:t>
-            </a:r>
-            <a:r>
-              <a:rPr lang="es-MX" sz="4800" dirty="0" err="1"/>
-              <a:t>if_statement</a:t>
-            </a:r>
-            <a:r>
-              <a:rPr lang="es-MX" sz="4800" dirty="0"/>
-              <a:t> | </a:t>
-            </a:r>
-            <a:r>
-              <a:rPr lang="es-MX" sz="4800" dirty="0" err="1"/>
-              <a:t>printing</a:t>
-            </a:r>
-            <a:endParaRPr lang="es-MX" sz="4800" dirty="0"/>
+              <a:rPr lang="es-MX" sz="1000"/>
+              <a:t>statements -&gt; statement statements | statement</a:t>
+            </a:r>
           </a:p>
           <a:p>
             <a:pPr>
@@ -5856,52 +5779,8 @@
               </a:lnSpc>
             </a:pPr>
             <a:r>
-              <a:rPr lang="es-MX" sz="4800" dirty="0" err="1"/>
-              <a:t>variable_declaration</a:t>
-            </a:r>
-            <a:r>
-              <a:rPr lang="es-MX" sz="4800" dirty="0"/>
-              <a:t> -&gt; </a:t>
-            </a:r>
-            <a:r>
-              <a:rPr lang="es-MX" sz="4800" dirty="0" err="1"/>
-              <a:t>type</a:t>
-            </a:r>
-            <a:r>
-              <a:rPr lang="es-MX" sz="4800" dirty="0"/>
-              <a:t> </a:t>
-            </a:r>
-            <a:r>
-              <a:rPr lang="es-MX" sz="4800" dirty="0" err="1"/>
-              <a:t>identifier</a:t>
-            </a:r>
-            <a:r>
-              <a:rPr lang="es-MX" sz="4800" dirty="0"/>
-              <a:t> "=" </a:t>
-            </a:r>
-            <a:r>
-              <a:rPr lang="es-MX" sz="4800" dirty="0" err="1"/>
-              <a:t>expression</a:t>
-            </a:r>
-            <a:r>
-              <a:rPr lang="es-MX" sz="4800" dirty="0"/>
-              <a:t> ";" | </a:t>
-            </a:r>
-            <a:r>
-              <a:rPr lang="es-MX" sz="4800" dirty="0" err="1"/>
-              <a:t>type</a:t>
-            </a:r>
-            <a:r>
-              <a:rPr lang="es-MX" sz="4800" dirty="0"/>
-              <a:t> </a:t>
-            </a:r>
-            <a:r>
-              <a:rPr lang="es-MX" sz="4800" dirty="0" err="1"/>
-              <a:t>identifier</a:t>
-            </a:r>
-            <a:r>
-              <a:rPr lang="es-MX" sz="4800" dirty="0"/>
-              <a:t> ";"</a:t>
+              <a:rPr lang="es-MX" sz="1000"/>
+              <a:t>statement -&gt; variable_declarationInt | variable_declarationString | assignment | if_statement | for_statement | while_statement | printing</a:t>
             </a:r>
           </a:p>
           <a:p>
@@ -5911,28 +5790,8 @@
               </a:lnSpc>
             </a:pPr>
             <a:r>
-              <a:rPr lang="es-MX" sz="4800" dirty="0" err="1"/>
-              <a:t>assignment</a:t>
-            </a:r>
-            <a:r>
-              <a:rPr lang="es-MX" sz="4800" dirty="0"/>
-              <a:t> -&gt; </a:t>
-            </a:r>
-            <a:r>
-              <a:rPr lang="es-MX" sz="4800" dirty="0" err="1"/>
-              <a:t>identifier</a:t>
-            </a:r>
-            <a:r>
-              <a:rPr lang="es-MX" sz="4800" dirty="0"/>
-              <a:t> "=" </a:t>
-            </a:r>
-            <a:r>
-              <a:rPr lang="es-MX" sz="4800" dirty="0" err="1"/>
-              <a:t>expression</a:t>
-            </a:r>
-            <a:r>
-              <a:rPr lang="es-MX" sz="4800" dirty="0"/>
-              <a:t> ";"</a:t>
+              <a:rPr lang="es-MX" sz="1000"/>
+              <a:t>variable_declarationInt -&gt; type identifier "=" expression ";" | type identifier ";"</a:t>
             </a:r>
           </a:p>
           <a:p>
@@ -5942,36 +5801,8 @@
               </a:lnSpc>
             </a:pPr>
             <a:r>
-              <a:rPr lang="es-MX" sz="4800" dirty="0" err="1"/>
-              <a:t>if_statement</a:t>
-            </a:r>
-            <a:r>
-              <a:rPr lang="es-MX" sz="4800" dirty="0"/>
-              <a:t> -&gt; "</a:t>
-            </a:r>
-            <a:r>
-              <a:rPr lang="es-MX" sz="4800" dirty="0" err="1"/>
-              <a:t>if</a:t>
-            </a:r>
-            <a:r>
-              <a:rPr lang="es-MX" sz="4800" dirty="0"/>
-              <a:t>" "(" </a:t>
-            </a:r>
-            <a:r>
-              <a:rPr lang="es-MX" sz="4800" dirty="0" err="1"/>
-              <a:t>condition</a:t>
-            </a:r>
-            <a:r>
-              <a:rPr lang="es-MX" sz="4800" dirty="0"/>
-              <a:t> ")" "{" </a:t>
-            </a:r>
-            <a:r>
-              <a:rPr lang="es-MX" sz="4800" dirty="0" err="1"/>
-              <a:t>statements</a:t>
-            </a:r>
-            <a:r>
-              <a:rPr lang="es-MX" sz="4800" dirty="0"/>
-              <a:t> "}"</a:t>
+              <a:rPr lang="es-MX" sz="1000"/>
+              <a:t>variable_declarationString -&gt; type identifier "=" string ";" | type identifier ";"</a:t>
             </a:r>
           </a:p>
           <a:p>
@@ -5981,48 +5812,8 @@
               </a:lnSpc>
             </a:pPr>
             <a:r>
-              <a:rPr lang="es-MX" sz="4800" dirty="0"/>
-              <a:t>              | "</a:t>
-            </a:r>
-            <a:r>
-              <a:rPr lang="es-MX" sz="4800" dirty="0" err="1"/>
-              <a:t>if</a:t>
-            </a:r>
-            <a:r>
-              <a:rPr lang="es-MX" sz="4800" dirty="0"/>
-              <a:t>" "(" </a:t>
-            </a:r>
-            <a:r>
-              <a:rPr lang="es-MX" sz="4800" dirty="0" err="1"/>
-              <a:t>condition</a:t>
-            </a:r>
-            <a:r>
-              <a:rPr lang="es-MX" sz="4800" dirty="0"/>
-              <a:t> ")" "{" </a:t>
-            </a:r>
-            <a:r>
-              <a:rPr lang="es-MX" sz="4800" dirty="0" err="1"/>
-              <a:t>statements</a:t>
-            </a:r>
-            <a:r>
-              <a:rPr lang="es-MX" sz="4800" dirty="0"/>
-              <a:t> "}" "</a:t>
-            </a:r>
-            <a:r>
-              <a:rPr lang="es-MX" sz="4800" dirty="0" err="1"/>
-              <a:t>else</a:t>
-            </a:r>
-            <a:r>
-              <a:rPr lang="es-MX" sz="4800" dirty="0"/>
-              <a:t>" "{" </a:t>
-            </a:r>
-            <a:r>
-              <a:rPr lang="es-MX" sz="4800" dirty="0" err="1"/>
-              <a:t>statements</a:t>
-            </a:r>
-            <a:r>
-              <a:rPr lang="es-MX" sz="4800" dirty="0"/>
-              <a:t> "}"</a:t>
+              <a:rPr lang="es-MX" sz="1000"/>
+              <a:t>assignment -&gt; identifier "=" expression ";"</a:t>
             </a:r>
           </a:p>
           <a:p>
@@ -6032,52 +5823,8 @@
               </a:lnSpc>
             </a:pPr>
             <a:r>
-              <a:rPr lang="es-MX" sz="4800" dirty="0" err="1"/>
-              <a:t>for_statement</a:t>
-            </a:r>
-            <a:r>
-              <a:rPr lang="es-MX" sz="4800" dirty="0"/>
-              <a:t> -&gt; "</a:t>
-            </a:r>
-            <a:r>
-              <a:rPr lang="es-MX" sz="4800" dirty="0" err="1"/>
-              <a:t>for</a:t>
-            </a:r>
-            <a:r>
-              <a:rPr lang="es-MX" sz="4800" dirty="0"/>
-              <a:t>" "(" </a:t>
-            </a:r>
-            <a:r>
-              <a:rPr lang="es-MX" sz="4800" dirty="0" err="1"/>
-              <a:t>variable_declaration</a:t>
-            </a:r>
-            <a:r>
-              <a:rPr lang="es-MX" sz="4800" dirty="0"/>
-              <a:t> ";" </a:t>
-            </a:r>
-            <a:r>
-              <a:rPr lang="es-MX" sz="4800" dirty="0" err="1"/>
-              <a:t>condition</a:t>
-            </a:r>
-            <a:r>
-              <a:rPr lang="es-MX" sz="4800" dirty="0"/>
-              <a:t> ";" </a:t>
-            </a:r>
-            <a:r>
-              <a:rPr lang="es-MX" sz="4800" dirty="0" err="1"/>
-              <a:t>assignment</a:t>
-            </a:r>
-            <a:r>
-              <a:rPr lang="es-MX" sz="4800" dirty="0"/>
-              <a:t> ")" "{" </a:t>
-            </a:r>
-            <a:r>
-              <a:rPr lang="es-MX" sz="4800" dirty="0" err="1"/>
-              <a:t>statements</a:t>
-            </a:r>
-            <a:r>
-              <a:rPr lang="es-MX" sz="4800" dirty="0"/>
-              <a:t> "}"</a:t>
+              <a:rPr lang="es-MX" sz="1000"/>
+              <a:t>if_statement -&gt; "if" "(" condition ")" "{" statements "}"</a:t>
             </a:r>
           </a:p>
           <a:p>
@@ -6087,36 +5834,8 @@
               </a:lnSpc>
             </a:pPr>
             <a:r>
-              <a:rPr lang="es-MX" sz="4800" dirty="0" err="1"/>
-              <a:t>while_statement</a:t>
-            </a:r>
-            <a:r>
-              <a:rPr lang="es-MX" sz="4800" dirty="0"/>
-              <a:t> -&gt; "</a:t>
-            </a:r>
-            <a:r>
-              <a:rPr lang="es-MX" sz="4800" dirty="0" err="1"/>
-              <a:t>while</a:t>
-            </a:r>
-            <a:r>
-              <a:rPr lang="es-MX" sz="4800" dirty="0"/>
-              <a:t>" "(" </a:t>
-            </a:r>
-            <a:r>
-              <a:rPr lang="es-MX" sz="4800" dirty="0" err="1"/>
-              <a:t>condition</a:t>
-            </a:r>
-            <a:r>
-              <a:rPr lang="es-MX" sz="4800" dirty="0"/>
-              <a:t> ")" "{" </a:t>
-            </a:r>
-            <a:r>
-              <a:rPr lang="es-MX" sz="4800" dirty="0" err="1"/>
-              <a:t>statements</a:t>
-            </a:r>
-            <a:r>
-              <a:rPr lang="es-MX" sz="4800" dirty="0"/>
-              <a:t> "}"</a:t>
+              <a:rPr lang="es-MX" sz="1000"/>
+              <a:t>              | "if" "(" condition ")" "{" statements "}" "else" "{" statements "}"</a:t>
             </a:r>
           </a:p>
           <a:p>
@@ -6126,20 +5845,8 @@
               </a:lnSpc>
             </a:pPr>
             <a:r>
-              <a:rPr lang="es-MX" sz="4800" dirty="0" err="1"/>
-              <a:t>printing</a:t>
-            </a:r>
-            <a:r>
-              <a:rPr lang="es-MX" sz="4800" dirty="0"/>
-              <a:t> -&gt; mostrar "(" </a:t>
-            </a:r>
-            <a:r>
-              <a:rPr lang="es-MX" sz="4800" dirty="0" err="1"/>
-              <a:t>identifier</a:t>
-            </a:r>
-            <a:r>
-              <a:rPr lang="es-MX" sz="4800" dirty="0"/>
-              <a:t> ")" ";"</a:t>
+              <a:rPr lang="es-MX" sz="1000"/>
+              <a:t>for_statement -&gt; "for" "(" variable_declaration ";" condition ";" assignment ")" "{" statements "}"</a:t>
             </a:r>
           </a:p>
           <a:p>
@@ -6149,34 +5856,9 @@
               </a:lnSpc>
             </a:pPr>
             <a:r>
-              <a:rPr lang="es-MX" sz="4800" dirty="0" err="1"/>
-              <a:t>arguments</a:t>
-            </a:r>
-            <a:r>
-              <a:rPr lang="es-MX" sz="4800" dirty="0"/>
-              <a:t> -&gt; </a:t>
-            </a:r>
-            <a:r>
-              <a:rPr lang="es-MX" sz="4800" dirty="0" err="1"/>
-              <a:t>expression</a:t>
-            </a:r>
-            <a:r>
-              <a:rPr lang="es-MX" sz="4800" dirty="0"/>
-              <a:t> </a:t>
-            </a:r>
-            <a:r>
-              <a:rPr lang="es-MX" sz="4800" dirty="0" err="1"/>
-              <a:t>arguments</a:t>
-            </a:r>
-            <a:r>
-              <a:rPr lang="es-MX" sz="4800" dirty="0"/>
-              <a:t> | </a:t>
-            </a:r>
-            <a:r>
-              <a:rPr lang="es-MX" sz="4800" dirty="0" err="1"/>
-              <a:t>expression</a:t>
-            </a:r>
-            <a:endParaRPr lang="es-MX" sz="4800" dirty="0"/>
+              <a:rPr lang="es-MX" sz="1000"/>
+              <a:t>while_statement -&gt; "while" "(" condition ")" "{" statements "}"</a:t>
+            </a:r>
           </a:p>
           <a:p>
             <a:pPr>
@@ -6185,28 +5867,8 @@
               </a:lnSpc>
             </a:pPr>
             <a:r>
-              <a:rPr lang="es-MX" sz="4800" dirty="0" err="1"/>
-              <a:t>expression</a:t>
-            </a:r>
-            <a:r>
-              <a:rPr lang="es-MX" sz="4800" dirty="0"/>
-              <a:t> -&gt; factor </a:t>
-            </a:r>
-            <a:r>
-              <a:rPr lang="es-MX" sz="4800" dirty="0" err="1"/>
-              <a:t>operator</a:t>
-            </a:r>
-            <a:r>
-              <a:rPr lang="es-MX" sz="4800" dirty="0"/>
-              <a:t> </a:t>
-            </a:r>
-            <a:r>
-              <a:rPr lang="es-MX" sz="4800" dirty="0" err="1"/>
-              <a:t>expression</a:t>
-            </a:r>
-            <a:r>
-              <a:rPr lang="es-MX" sz="4800" dirty="0"/>
-              <a:t> | factor</a:t>
+              <a:rPr lang="es-MX" sz="1000"/>
+              <a:t>printing -&gt; mostrar "(" identifier ")" ";"</a:t>
             </a:r>
           </a:p>
           <a:p>
@@ -6216,32 +5878,8 @@
               </a:lnSpc>
             </a:pPr>
             <a:r>
-              <a:rPr lang="es-MX" sz="4800" dirty="0"/>
-              <a:t>factor -&gt; </a:t>
-            </a:r>
-            <a:r>
-              <a:rPr lang="es-MX" sz="4800" dirty="0" err="1"/>
-              <a:t>identifier</a:t>
-            </a:r>
-            <a:r>
-              <a:rPr lang="es-MX" sz="4800" dirty="0"/>
-              <a:t> | </a:t>
-            </a:r>
-            <a:r>
-              <a:rPr lang="es-MX" sz="4800" dirty="0" err="1"/>
-              <a:t>number</a:t>
-            </a:r>
-            <a:r>
-              <a:rPr lang="es-MX" sz="4800" dirty="0"/>
-              <a:t> | "(" </a:t>
-            </a:r>
-            <a:r>
-              <a:rPr lang="es-MX" sz="4800" dirty="0" err="1"/>
-              <a:t>expression</a:t>
-            </a:r>
-            <a:r>
-              <a:rPr lang="es-MX" sz="4800" dirty="0"/>
-              <a:t> ")"</a:t>
+              <a:rPr lang="es-MX" sz="1000"/>
+              <a:t>type -&gt; "int"</a:t>
             </a:r>
           </a:p>
           <a:p>
@@ -6251,34 +5889,9 @@
               </a:lnSpc>
             </a:pPr>
             <a:r>
-              <a:rPr lang="es-MX" sz="4800" dirty="0" err="1"/>
-              <a:t>condition</a:t>
-            </a:r>
-            <a:r>
-              <a:rPr lang="es-MX" sz="4800" dirty="0"/>
-              <a:t> -&gt; </a:t>
-            </a:r>
-            <a:r>
-              <a:rPr lang="es-MX" sz="4800" dirty="0" err="1"/>
-              <a:t>expression</a:t>
-            </a:r>
-            <a:r>
-              <a:rPr lang="es-MX" sz="4800" dirty="0"/>
-              <a:t> </a:t>
-            </a:r>
-            <a:r>
-              <a:rPr lang="es-MX" sz="4800" dirty="0" err="1"/>
-              <a:t>comparison_operator</a:t>
-            </a:r>
-            <a:r>
-              <a:rPr lang="es-MX" sz="4800" dirty="0"/>
-              <a:t> </a:t>
-            </a:r>
-            <a:r>
-              <a:rPr lang="es-MX" sz="4800" dirty="0" err="1"/>
-              <a:t>expression</a:t>
-            </a:r>
-            <a:endParaRPr lang="es-MX" sz="4800" dirty="0"/>
+              <a:rPr lang="es-MX" sz="1000"/>
+              <a:t>      | "string"</a:t>
+            </a:r>
           </a:p>
           <a:p>
             <a:pPr>
@@ -6287,12 +5900,8 @@
               </a:lnSpc>
             </a:pPr>
             <a:r>
-              <a:rPr lang="es-MX" sz="4800" dirty="0" err="1"/>
-              <a:t>operator</a:t>
-            </a:r>
-            <a:r>
-              <a:rPr lang="es-MX" sz="4800" dirty="0"/>
-              <a:t> -&gt; "+"</a:t>
+              <a:rPr lang="es-MX" sz="1000"/>
+              <a:t>identifier -&gt; [char][char | number | _]*</a:t>
             </a:r>
           </a:p>
           <a:p>
@@ -6302,8 +5911,8 @@
               </a:lnSpc>
             </a:pPr>
             <a:r>
-              <a:rPr lang="es-MX" sz="4800" dirty="0"/>
-              <a:t>          | "-"</a:t>
+              <a:rPr lang="es-MX" sz="1000"/>
+              <a:t>expression -&gt; factor operator expression | factor</a:t>
             </a:r>
           </a:p>
           <a:p>
@@ -6313,8 +5922,8 @@
               </a:lnSpc>
             </a:pPr>
             <a:r>
-              <a:rPr lang="es-MX" sz="4800" dirty="0"/>
-              <a:t>          | "*"</a:t>
+              <a:rPr lang="es-MX" sz="1000"/>
+              <a:t>string -&gt; """ [char+ | " "]+ """</a:t>
             </a:r>
           </a:p>
           <a:p>
@@ -6324,8 +5933,8 @@
               </a:lnSpc>
             </a:pPr>
             <a:r>
-              <a:rPr lang="es-MX" sz="4800" dirty="0"/>
-              <a:t>          | "/"</a:t>
+              <a:rPr lang="es-MX" sz="1000"/>
+              <a:t>char -&gt;  [a-zA-Z]</a:t>
             </a:r>
           </a:p>
           <a:p>
@@ -6335,8 +5944,8 @@
               </a:lnSpc>
             </a:pPr>
             <a:r>
-              <a:rPr lang="es-MX" sz="4800" dirty="0"/>
-              <a:t>          | "^"</a:t>
+              <a:rPr lang="es-MX" sz="1000"/>
+              <a:t>number -&gt; [0-9]+</a:t>
             </a:r>
           </a:p>
           <a:p>
@@ -6346,12 +5955,8 @@
               </a:lnSpc>
             </a:pPr>
             <a:r>
-              <a:rPr lang="es-MX" sz="4800" dirty="0" err="1"/>
-              <a:t>comparison_operator</a:t>
-            </a:r>
-            <a:r>
-              <a:rPr lang="es-MX" sz="4800" dirty="0"/>
-              <a:t> -&gt; "&gt;"</a:t>
+              <a:rPr lang="es-MX" sz="1000"/>
+              <a:t>arguments -&gt; expression arguments | expression</a:t>
             </a:r>
           </a:p>
           <a:p>
@@ -6361,8 +5966,8 @@
               </a:lnSpc>
             </a:pPr>
             <a:r>
-              <a:rPr lang="es-MX" sz="4800" dirty="0"/>
-              <a:t>                     | "&lt;"</a:t>
+              <a:rPr lang="es-MX" sz="1000"/>
+              <a:t>factor -&gt; identifier | number | "(" expression ")"</a:t>
             </a:r>
           </a:p>
           <a:p>
@@ -6372,8 +5977,8 @@
               </a:lnSpc>
             </a:pPr>
             <a:r>
-              <a:rPr lang="es-MX" sz="4800" dirty="0"/>
-              <a:t>                     | "=&gt;"</a:t>
+              <a:rPr lang="es-MX" sz="1000"/>
+              <a:t>condition -&gt; expression comparison_operator expression</a:t>
             </a:r>
           </a:p>
           <a:p>
@@ -6383,8 +5988,8 @@
               </a:lnSpc>
             </a:pPr>
             <a:r>
-              <a:rPr lang="es-MX" sz="4800" dirty="0"/>
-              <a:t>                     | "&lt;="</a:t>
+              <a:rPr lang="es-MX" sz="1000"/>
+              <a:t>operator -&gt; "+"</a:t>
             </a:r>
           </a:p>
           <a:p>
@@ -6394,8 +5999,8 @@
               </a:lnSpc>
             </a:pPr>
             <a:r>
-              <a:rPr lang="es-MX" sz="4800" dirty="0"/>
-              <a:t>                     | "=="</a:t>
+              <a:rPr lang="es-MX" sz="1000"/>
+              <a:t>          | "-"</a:t>
             </a:r>
           </a:p>
           <a:p>
@@ -6405,8 +6010,8 @@
               </a:lnSpc>
             </a:pPr>
             <a:r>
-              <a:rPr lang="es-MX" sz="4800" dirty="0"/>
-              <a:t>                     | "!="</a:t>
+              <a:rPr lang="es-MX" sz="1000"/>
+              <a:t>          | "*"</a:t>
             </a:r>
           </a:p>
           <a:p>
@@ -6416,20 +6021,8 @@
               </a:lnSpc>
             </a:pPr>
             <a:r>
-              <a:rPr lang="es-MX" sz="4800" dirty="0" err="1"/>
-              <a:t>type</a:t>
-            </a:r>
-            <a:r>
-              <a:rPr lang="es-MX" sz="4800" dirty="0"/>
-              <a:t> -&gt; "</a:t>
-            </a:r>
-            <a:r>
-              <a:rPr lang="es-MX" sz="4800" dirty="0" err="1"/>
-              <a:t>int</a:t>
-            </a:r>
-            <a:r>
-              <a:rPr lang="es-MX" sz="4800" dirty="0"/>
-              <a:t>"</a:t>
+              <a:rPr lang="es-MX" sz="1000"/>
+              <a:t>          | "/"</a:t>
             </a:r>
           </a:p>
           <a:p>
@@ -6439,16 +6032,8 @@
               </a:lnSpc>
             </a:pPr>
             <a:r>
-              <a:rPr lang="es-MX" sz="4800" dirty="0"/>
-              <a:t>      | "</a:t>
-            </a:r>
-            <a:r>
-              <a:rPr lang="es-MX" sz="4800" dirty="0" err="1"/>
-              <a:t>string</a:t>
-            </a:r>
-            <a:r>
-              <a:rPr lang="es-MX" sz="4800" dirty="0"/>
-              <a:t>"</a:t>
+              <a:rPr lang="es-MX" sz="1000"/>
+              <a:t>          | "^"</a:t>
             </a:r>
           </a:p>
           <a:p>
@@ -6458,20 +6043,8 @@
               </a:lnSpc>
             </a:pPr>
             <a:r>
-              <a:rPr lang="es-MX" sz="4800" dirty="0" err="1"/>
-              <a:t>identifier</a:t>
-            </a:r>
-            <a:r>
-              <a:rPr lang="es-MX" sz="4800" dirty="0"/>
-              <a:t> -&gt; [a-</a:t>
-            </a:r>
-            <a:r>
-              <a:rPr lang="es-MX" sz="4800" dirty="0" err="1"/>
-              <a:t>zA</a:t>
-            </a:r>
-            <a:r>
-              <a:rPr lang="es-MX" sz="4800" dirty="0"/>
-              <a:t>-Z_][a-zA-Z0-9_]*</a:t>
+              <a:rPr lang="es-MX" sz="1000"/>
+              <a:t>comparison_operator -&gt; "&gt;"</a:t>
             </a:r>
           </a:p>
           <a:p>
@@ -6481,12 +6054,8 @@
               </a:lnSpc>
             </a:pPr>
             <a:r>
-              <a:rPr lang="es-MX" sz="4800" dirty="0" err="1"/>
-              <a:t>number</a:t>
-            </a:r>
-            <a:r>
-              <a:rPr lang="es-MX" sz="4800" dirty="0"/>
-              <a:t> -&gt; [0-9]+</a:t>
+              <a:rPr lang="es-MX" sz="1000"/>
+              <a:t>                     | "&lt;"</a:t>
             </a:r>
           </a:p>
           <a:p>
@@ -6495,7 +6064,44 @@
                 <a:spcPct val="90000"/>
               </a:lnSpc>
             </a:pPr>
-            <a:endParaRPr lang="es-MX" sz="600" dirty="0"/>
+            <a:r>
+              <a:rPr lang="es-MX" sz="1000"/>
+              <a:t>                     | "=&gt;"</a:t>
+            </a:r>
+          </a:p>
+          <a:p>
+            <a:pPr>
+              <a:lnSpc>
+                <a:spcPct val="90000"/>
+              </a:lnSpc>
+            </a:pPr>
+            <a:r>
+              <a:rPr lang="es-MX" sz="1000"/>
+              <a:t>                     | "&lt;="</a:t>
+            </a:r>
+          </a:p>
+          <a:p>
+            <a:pPr>
+              <a:lnSpc>
+                <a:spcPct val="90000"/>
+              </a:lnSpc>
+            </a:pPr>
+            <a:r>
+              <a:rPr lang="es-MX" sz="1000"/>
+              <a:t>                     | "=="</a:t>
+            </a:r>
+          </a:p>
+          <a:p>
+            <a:pPr>
+              <a:lnSpc>
+                <a:spcPct val="90000"/>
+              </a:lnSpc>
+            </a:pPr>
+            <a:r>
+              <a:rPr lang="es-MX" sz="1000"/>
+              <a:t>                     | "!="</a:t>
+            </a:r>
+            <a:endParaRPr lang="es-MX" sz="1000" dirty="0"/>
           </a:p>
         </p:txBody>
       </p:sp>
@@ -7073,10 +6679,13 @@
               <a:buChar char="–"/>
             </a:pPr>
             <a:r>
-              <a:rPr lang="en-US" sz="1300"/>
-              <a:t>ini{</a:t>
-            </a:r>
-            <a:endParaRPr lang="en-US" sz="1300" dirty="0"/>
+              <a:rPr lang="en-US" sz="1300" dirty="0" err="1"/>
+              <a:t>ini</a:t>
+            </a:r>
+            <a:r>
+              <a:rPr lang="en-US" sz="1300" dirty="0"/>
+              <a:t>{</a:t>
+            </a:r>
           </a:p>
           <a:p>
             <a:pPr indent="-228600">
@@ -7091,7 +6700,15 @@
             </a:pPr>
             <a:r>
               <a:rPr lang="en-US" sz="1300" dirty="0"/>
-              <a:t>    string x;</a:t>
+              <a:t>    string x = "</a:t>
+            </a:r>
+            <a:r>
+              <a:rPr lang="en-US" sz="1300" dirty="0" err="1"/>
+              <a:t>hola</a:t>
+            </a:r>
+            <a:r>
+              <a:rPr lang="en-US" sz="1300" dirty="0"/>
+              <a:t>";</a:t>
             </a:r>
           </a:p>
           <a:p>
@@ -7107,7 +6724,7 @@
             </a:pPr>
             <a:r>
               <a:rPr lang="en-US" sz="1300" dirty="0"/>
-              <a:t>    int a = 1 + a;</a:t>
+              <a:t>    int b = a + 3;</a:t>
             </a:r>
           </a:p>
           <a:p>
@@ -7123,7 +6740,7 @@
             </a:pPr>
             <a:r>
               <a:rPr lang="en-US" sz="1300" dirty="0"/>
-              <a:t>    int b = a + 3;</a:t>
+              <a:t>    if(a &lt;= 10){</a:t>
             </a:r>
           </a:p>
           <a:p>
@@ -7139,7 +6756,7 @@
             </a:pPr>
             <a:r>
               <a:rPr lang="en-US" sz="1300" dirty="0"/>
-              <a:t>    int astro;</a:t>
+              <a:t>        b = 5</a:t>
             </a:r>
           </a:p>
           <a:p>
@@ -7155,7 +6772,7 @@
             </a:pPr>
             <a:r>
               <a:rPr lang="en-US" sz="1300" dirty="0"/>
-              <a:t>    if(a &lt;= 10){</a:t>
+              <a:t>    }</a:t>
             </a:r>
           </a:p>
           <a:p>
@@ -7171,7 +6788,15 @@
             </a:pPr>
             <a:r>
               <a:rPr lang="en-US" sz="1300" dirty="0"/>
-              <a:t>        astro = 5</a:t>
+              <a:t>    </a:t>
+            </a:r>
+            <a:r>
+              <a:rPr lang="en-US" sz="1300" dirty="0" err="1"/>
+              <a:t>mostrar</a:t>
+            </a:r>
+            <a:r>
+              <a:rPr lang="en-US" sz="1300" dirty="0"/>
+              <a:t>(a);</a:t>
             </a:r>
           </a:p>
           <a:p>
@@ -7187,7 +6812,15 @@
             </a:pPr>
             <a:r>
               <a:rPr lang="en-US" sz="1300" dirty="0"/>
-              <a:t>    }else{</a:t>
+              <a:t>    </a:t>
+            </a:r>
+            <a:r>
+              <a:rPr lang="en-US" sz="1300" dirty="0" err="1"/>
+              <a:t>mostrar</a:t>
+            </a:r>
+            <a:r>
+              <a:rPr lang="en-US" sz="1300" dirty="0"/>
+              <a:t>(x);</a:t>
             </a:r>
           </a:p>
           <a:p>
@@ -7203,73 +6836,8 @@
             </a:pPr>
             <a:r>
               <a:rPr lang="en-US" sz="1300" dirty="0"/>
-              <a:t>        astro = 1;</a:t>
-            </a:r>
-          </a:p>
-          <a:p>
-            <a:pPr indent="-228600">
-              <a:lnSpc>
-                <a:spcPct val="90000"/>
-              </a:lnSpc>
-              <a:spcAft>
-                <a:spcPts val="600"/>
-              </a:spcAft>
-              <a:buFont typeface="System Font Regular"/>
-              <a:buChar char="–"/>
-            </a:pPr>
-            <a:r>
-              <a:rPr lang="en-US" sz="1300" dirty="0"/>
-              <a:t>    }</a:t>
-            </a:r>
-          </a:p>
-          <a:p>
-            <a:pPr indent="-228600">
-              <a:lnSpc>
-                <a:spcPct val="90000"/>
-              </a:lnSpc>
-              <a:spcAft>
-                <a:spcPts val="600"/>
-              </a:spcAft>
-              <a:buFont typeface="System Font Regular"/>
-              <a:buChar char="–"/>
-            </a:pPr>
-            <a:r>
-              <a:rPr lang="en-US" sz="1300"/>
-              <a:t>    mostrar(</a:t>
-            </a:r>
-            <a:r>
-              <a:rPr lang="en-US" sz="1300" dirty="0"/>
-              <a:t>astro);</a:t>
-            </a:r>
-          </a:p>
-          <a:p>
-            <a:pPr indent="-228600">
-              <a:lnSpc>
-                <a:spcPct val="90000"/>
-              </a:lnSpc>
-              <a:spcAft>
-                <a:spcPts val="600"/>
-              </a:spcAft>
-              <a:buFont typeface="System Font Regular"/>
-              <a:buChar char="–"/>
-            </a:pPr>
-            <a:r>
-              <a:rPr lang="en-US" sz="1300" dirty="0"/>
               <a:t>}</a:t>
             </a:r>
-          </a:p>
-          <a:p>
-            <a:pPr indent="-228600">
-              <a:lnSpc>
-                <a:spcPct val="90000"/>
-              </a:lnSpc>
-              <a:spcAft>
-                <a:spcPts val="600"/>
-              </a:spcAft>
-              <a:buFont typeface="System Font Regular"/>
-              <a:buChar char="–"/>
-            </a:pPr>
-            <a:endParaRPr lang="en-US" sz="1300" dirty="0"/>
           </a:p>
         </p:txBody>
       </p:sp>
@@ -7463,10 +7031,1927 @@
       </p:grpSpPr>
       <p:sp>
         <p:nvSpPr>
-          <p:cNvPr id="2" name="CuadroTexto 1">
-            <a:extLst>
-              <a:ext uri="{FF2B5EF4-FFF2-40B4-BE49-F238E27FC236}">
-                <a16:creationId xmlns:a16="http://schemas.microsoft.com/office/drawing/2014/main" id="{131E62E0-600F-F0A4-80EA-4E48F14A25AC}"/>
+          <p:cNvPr id="6" name="Elipse 5">
+            <a:extLst>
+              <a:ext uri="{FF2B5EF4-FFF2-40B4-BE49-F238E27FC236}">
+                <a16:creationId xmlns:a16="http://schemas.microsoft.com/office/drawing/2014/main" id="{B4BB7DB9-289A-BA6E-D02A-B3BAB0A6AD03}"/>
+              </a:ext>
+            </a:extLst>
+          </p:cNvPr>
+          <p:cNvSpPr/>
+          <p:nvPr/>
+        </p:nvSpPr>
+        <p:spPr>
+          <a:xfrm>
+            <a:off x="4628773" y="586740"/>
+            <a:ext cx="1676882" cy="472440"/>
+          </a:xfrm>
+          <a:prstGeom prst="ellipse">
+            <a:avLst/>
+          </a:prstGeom>
+        </p:spPr>
+        <p:style>
+          <a:lnRef idx="2">
+            <a:schemeClr val="accent1">
+              <a:shade val="15000"/>
+            </a:schemeClr>
+          </a:lnRef>
+          <a:fillRef idx="1">
+            <a:schemeClr val="accent1"/>
+          </a:fillRef>
+          <a:effectRef idx="0">
+            <a:schemeClr val="accent1"/>
+          </a:effectRef>
+          <a:fontRef idx="minor">
+            <a:schemeClr val="lt1"/>
+          </a:fontRef>
+        </p:style>
+        <p:txBody>
+          <a:bodyPr rtlCol="0" anchor="ctr"/>
+          <a:lstStyle/>
+          <a:p>
+            <a:pPr algn="ctr"/>
+            <a:r>
+              <a:rPr lang="es-MX" dirty="0" err="1"/>
+              <a:t>ini_block</a:t>
+            </a:r>
+            <a:endParaRPr lang="es-MX" dirty="0"/>
+          </a:p>
+        </p:txBody>
+      </p:sp>
+      <p:sp>
+        <p:nvSpPr>
+          <p:cNvPr id="88" name="Elipse 87">
+            <a:extLst>
+              <a:ext uri="{FF2B5EF4-FFF2-40B4-BE49-F238E27FC236}">
+                <a16:creationId xmlns:a16="http://schemas.microsoft.com/office/drawing/2014/main" id="{E7CAEA60-215A-1DAC-D24F-5076BC03E9EE}"/>
+              </a:ext>
+            </a:extLst>
+          </p:cNvPr>
+          <p:cNvSpPr/>
+          <p:nvPr/>
+        </p:nvSpPr>
+        <p:spPr>
+          <a:xfrm>
+            <a:off x="208981" y="4120055"/>
+            <a:ext cx="721644" cy="332855"/>
+          </a:xfrm>
+          <a:prstGeom prst="ellipse">
+            <a:avLst/>
+          </a:prstGeom>
+        </p:spPr>
+        <p:style>
+          <a:lnRef idx="2">
+            <a:schemeClr val="accent1">
+              <a:shade val="15000"/>
+            </a:schemeClr>
+          </a:lnRef>
+          <a:fillRef idx="1">
+            <a:schemeClr val="accent1"/>
+          </a:fillRef>
+          <a:effectRef idx="0">
+            <a:schemeClr val="accent1"/>
+          </a:effectRef>
+          <a:fontRef idx="minor">
+            <a:schemeClr val="lt1"/>
+          </a:fontRef>
+        </p:style>
+        <p:txBody>
+          <a:bodyPr rtlCol="0" anchor="ctr"/>
+          <a:lstStyle/>
+          <a:p>
+            <a:pPr algn="ctr"/>
+            <a:r>
+              <a:rPr lang="es-MX" sz="1100" dirty="0" err="1"/>
+              <a:t>pr</a:t>
+            </a:r>
+            <a:endParaRPr lang="es-MX" sz="1100" dirty="0"/>
+          </a:p>
+        </p:txBody>
+      </p:sp>
+      <p:sp>
+        <p:nvSpPr>
+          <p:cNvPr id="89" name="Elipse 88">
+            <a:extLst>
+              <a:ext uri="{FF2B5EF4-FFF2-40B4-BE49-F238E27FC236}">
+                <a16:creationId xmlns:a16="http://schemas.microsoft.com/office/drawing/2014/main" id="{68E430BB-1FCE-EFED-A8BF-20A1D5463953}"/>
+              </a:ext>
+            </a:extLst>
+          </p:cNvPr>
+          <p:cNvSpPr/>
+          <p:nvPr/>
+        </p:nvSpPr>
+        <p:spPr>
+          <a:xfrm>
+            <a:off x="1217874" y="4080403"/>
+            <a:ext cx="518572" cy="472440"/>
+          </a:xfrm>
+          <a:prstGeom prst="ellipse">
+            <a:avLst/>
+          </a:prstGeom>
+        </p:spPr>
+        <p:style>
+          <a:lnRef idx="2">
+            <a:schemeClr val="accent1">
+              <a:shade val="15000"/>
+            </a:schemeClr>
+          </a:lnRef>
+          <a:fillRef idx="1">
+            <a:schemeClr val="accent1"/>
+          </a:fillRef>
+          <a:effectRef idx="0">
+            <a:schemeClr val="accent1"/>
+          </a:effectRef>
+          <a:fontRef idx="minor">
+            <a:schemeClr val="lt1"/>
+          </a:fontRef>
+        </p:style>
+        <p:txBody>
+          <a:bodyPr rtlCol="0" anchor="ctr"/>
+          <a:lstStyle/>
+          <a:p>
+            <a:pPr algn="ctr"/>
+            <a:r>
+              <a:rPr lang="es-MX" sz="1100" dirty="0"/>
+              <a:t>id</a:t>
+            </a:r>
+          </a:p>
+        </p:txBody>
+      </p:sp>
+      <p:sp>
+        <p:nvSpPr>
+          <p:cNvPr id="90" name="Elipse 89">
+            <a:extLst>
+              <a:ext uri="{FF2B5EF4-FFF2-40B4-BE49-F238E27FC236}">
+                <a16:creationId xmlns:a16="http://schemas.microsoft.com/office/drawing/2014/main" id="{807E1EE9-D4B1-7509-6FA7-4258BD232774}"/>
+              </a:ext>
+            </a:extLst>
+          </p:cNvPr>
+          <p:cNvSpPr/>
+          <p:nvPr/>
+        </p:nvSpPr>
+        <p:spPr>
+          <a:xfrm>
+            <a:off x="1837118" y="4091912"/>
+            <a:ext cx="518572" cy="472440"/>
+          </a:xfrm>
+          <a:prstGeom prst="ellipse">
+            <a:avLst/>
+          </a:prstGeom>
+        </p:spPr>
+        <p:style>
+          <a:lnRef idx="2">
+            <a:schemeClr val="accent1">
+              <a:shade val="15000"/>
+            </a:schemeClr>
+          </a:lnRef>
+          <a:fillRef idx="1">
+            <a:schemeClr val="accent1"/>
+          </a:fillRef>
+          <a:effectRef idx="0">
+            <a:schemeClr val="accent1"/>
+          </a:effectRef>
+          <a:fontRef idx="minor">
+            <a:schemeClr val="lt1"/>
+          </a:fontRef>
+        </p:style>
+        <p:txBody>
+          <a:bodyPr rtlCol="0" anchor="ctr"/>
+          <a:lstStyle/>
+          <a:p>
+            <a:pPr algn="ctr"/>
+            <a:r>
+              <a:rPr lang="es-MX" sz="1100" dirty="0"/>
+              <a:t>=</a:t>
+            </a:r>
+          </a:p>
+        </p:txBody>
+      </p:sp>
+      <p:sp>
+        <p:nvSpPr>
+          <p:cNvPr id="92" name="Elipse 91">
+            <a:extLst>
+              <a:ext uri="{FF2B5EF4-FFF2-40B4-BE49-F238E27FC236}">
+                <a16:creationId xmlns:a16="http://schemas.microsoft.com/office/drawing/2014/main" id="{286839A7-86BF-59D5-910C-FD080F3DBD93}"/>
+              </a:ext>
+            </a:extLst>
+          </p:cNvPr>
+          <p:cNvSpPr/>
+          <p:nvPr/>
+        </p:nvSpPr>
+        <p:spPr>
+          <a:xfrm>
+            <a:off x="2578413" y="4013991"/>
+            <a:ext cx="1005735" cy="594360"/>
+          </a:xfrm>
+          <a:prstGeom prst="ellipse">
+            <a:avLst/>
+          </a:prstGeom>
+        </p:spPr>
+        <p:style>
+          <a:lnRef idx="2">
+            <a:schemeClr val="accent1">
+              <a:shade val="15000"/>
+            </a:schemeClr>
+          </a:lnRef>
+          <a:fillRef idx="1">
+            <a:schemeClr val="accent1"/>
+          </a:fillRef>
+          <a:effectRef idx="0">
+            <a:schemeClr val="accent1"/>
+          </a:effectRef>
+          <a:fontRef idx="minor">
+            <a:schemeClr val="lt1"/>
+          </a:fontRef>
+        </p:style>
+        <p:txBody>
+          <a:bodyPr rtlCol="0" anchor="ctr"/>
+          <a:lstStyle/>
+          <a:p>
+            <a:pPr algn="ctr"/>
+            <a:r>
+              <a:rPr lang="es-MX" sz="1100" dirty="0" err="1"/>
+              <a:t>number</a:t>
+            </a:r>
+            <a:endParaRPr lang="es-MX" sz="1100" dirty="0"/>
+          </a:p>
+        </p:txBody>
+      </p:sp>
+      <p:sp>
+        <p:nvSpPr>
+          <p:cNvPr id="93" name="Elipse 92">
+            <a:extLst>
+              <a:ext uri="{FF2B5EF4-FFF2-40B4-BE49-F238E27FC236}">
+                <a16:creationId xmlns:a16="http://schemas.microsoft.com/office/drawing/2014/main" id="{81905878-B1E8-69A4-F03E-2F522234AA73}"/>
+              </a:ext>
+            </a:extLst>
+          </p:cNvPr>
+          <p:cNvSpPr/>
+          <p:nvPr/>
+        </p:nvSpPr>
+        <p:spPr>
+          <a:xfrm>
+            <a:off x="840621" y="3126612"/>
+            <a:ext cx="2405589" cy="332855"/>
+          </a:xfrm>
+          <a:prstGeom prst="ellipse">
+            <a:avLst/>
+          </a:prstGeom>
+        </p:spPr>
+        <p:style>
+          <a:lnRef idx="2">
+            <a:schemeClr val="accent1">
+              <a:shade val="15000"/>
+            </a:schemeClr>
+          </a:lnRef>
+          <a:fillRef idx="1">
+            <a:schemeClr val="accent1"/>
+          </a:fillRef>
+          <a:effectRef idx="0">
+            <a:schemeClr val="accent1"/>
+          </a:effectRef>
+          <a:fontRef idx="minor">
+            <a:schemeClr val="lt1"/>
+          </a:fontRef>
+        </p:style>
+        <p:txBody>
+          <a:bodyPr rtlCol="0" anchor="ctr"/>
+          <a:lstStyle/>
+          <a:p>
+            <a:pPr algn="ctr"/>
+            <a:r>
+              <a:rPr lang="es-MX" sz="1100" dirty="0" err="1"/>
+              <a:t>variable_declarationInt</a:t>
+            </a:r>
+            <a:endParaRPr lang="es-MX" sz="1100" dirty="0"/>
+          </a:p>
+        </p:txBody>
+      </p:sp>
+      <p:cxnSp>
+        <p:nvCxnSpPr>
+          <p:cNvPr id="94" name="Conector recto 93">
+            <a:extLst>
+              <a:ext uri="{FF2B5EF4-FFF2-40B4-BE49-F238E27FC236}">
+                <a16:creationId xmlns:a16="http://schemas.microsoft.com/office/drawing/2014/main" id="{7B05E84A-E051-4FE0-070D-DA3B73A051AE}"/>
+              </a:ext>
+            </a:extLst>
+          </p:cNvPr>
+          <p:cNvCxnSpPr>
+            <a:cxnSpLocks/>
+            <a:stCxn id="93" idx="4"/>
+            <a:endCxn id="88" idx="0"/>
+          </p:cNvCxnSpPr>
+          <p:nvPr/>
+        </p:nvCxnSpPr>
+        <p:spPr>
+          <a:xfrm flipH="1">
+            <a:off x="569803" y="3459467"/>
+            <a:ext cx="1473613" cy="660588"/>
+          </a:xfrm>
+          <a:prstGeom prst="line">
+            <a:avLst/>
+          </a:prstGeom>
+        </p:spPr>
+        <p:style>
+          <a:lnRef idx="1">
+            <a:schemeClr val="accent1"/>
+          </a:lnRef>
+          <a:fillRef idx="0">
+            <a:schemeClr val="accent1"/>
+          </a:fillRef>
+          <a:effectRef idx="0">
+            <a:schemeClr val="accent1"/>
+          </a:effectRef>
+          <a:fontRef idx="minor">
+            <a:schemeClr val="tx1"/>
+          </a:fontRef>
+        </p:style>
+      </p:cxnSp>
+      <p:cxnSp>
+        <p:nvCxnSpPr>
+          <p:cNvPr id="95" name="Conector recto 94">
+            <a:extLst>
+              <a:ext uri="{FF2B5EF4-FFF2-40B4-BE49-F238E27FC236}">
+                <a16:creationId xmlns:a16="http://schemas.microsoft.com/office/drawing/2014/main" id="{B2D2FEB7-DB3C-4772-4808-4F090D337351}"/>
+              </a:ext>
+            </a:extLst>
+          </p:cNvPr>
+          <p:cNvCxnSpPr>
+            <a:cxnSpLocks/>
+            <a:stCxn id="93" idx="4"/>
+            <a:endCxn id="89" idx="0"/>
+          </p:cNvCxnSpPr>
+          <p:nvPr/>
+        </p:nvCxnSpPr>
+        <p:spPr>
+          <a:xfrm flipH="1">
+            <a:off x="1477160" y="3459467"/>
+            <a:ext cx="566256" cy="620936"/>
+          </a:xfrm>
+          <a:prstGeom prst="line">
+            <a:avLst/>
+          </a:prstGeom>
+        </p:spPr>
+        <p:style>
+          <a:lnRef idx="1">
+            <a:schemeClr val="accent1"/>
+          </a:lnRef>
+          <a:fillRef idx="0">
+            <a:schemeClr val="accent1"/>
+          </a:fillRef>
+          <a:effectRef idx="0">
+            <a:schemeClr val="accent1"/>
+          </a:effectRef>
+          <a:fontRef idx="minor">
+            <a:schemeClr val="tx1"/>
+          </a:fontRef>
+        </p:style>
+      </p:cxnSp>
+      <p:cxnSp>
+        <p:nvCxnSpPr>
+          <p:cNvPr id="96" name="Conector recto 95">
+            <a:extLst>
+              <a:ext uri="{FF2B5EF4-FFF2-40B4-BE49-F238E27FC236}">
+                <a16:creationId xmlns:a16="http://schemas.microsoft.com/office/drawing/2014/main" id="{03EA4C3C-AE0E-26C7-57EE-64E874697673}"/>
+              </a:ext>
+            </a:extLst>
+          </p:cNvPr>
+          <p:cNvCxnSpPr>
+            <a:cxnSpLocks/>
+            <a:stCxn id="93" idx="4"/>
+            <a:endCxn id="90" idx="0"/>
+          </p:cNvCxnSpPr>
+          <p:nvPr/>
+        </p:nvCxnSpPr>
+        <p:spPr>
+          <a:xfrm>
+            <a:off x="2043416" y="3459467"/>
+            <a:ext cx="52988" cy="632445"/>
+          </a:xfrm>
+          <a:prstGeom prst="line">
+            <a:avLst/>
+          </a:prstGeom>
+        </p:spPr>
+        <p:style>
+          <a:lnRef idx="1">
+            <a:schemeClr val="accent1"/>
+          </a:lnRef>
+          <a:fillRef idx="0">
+            <a:schemeClr val="accent1"/>
+          </a:fillRef>
+          <a:effectRef idx="0">
+            <a:schemeClr val="accent1"/>
+          </a:effectRef>
+          <a:fontRef idx="minor">
+            <a:schemeClr val="tx1"/>
+          </a:fontRef>
+        </p:style>
+      </p:cxnSp>
+      <p:cxnSp>
+        <p:nvCxnSpPr>
+          <p:cNvPr id="98" name="Conector recto 97">
+            <a:extLst>
+              <a:ext uri="{FF2B5EF4-FFF2-40B4-BE49-F238E27FC236}">
+                <a16:creationId xmlns:a16="http://schemas.microsoft.com/office/drawing/2014/main" id="{DE8C55BB-5648-962C-4098-EDC303D4EB86}"/>
+              </a:ext>
+            </a:extLst>
+          </p:cNvPr>
+          <p:cNvCxnSpPr>
+            <a:cxnSpLocks/>
+            <a:stCxn id="93" idx="4"/>
+            <a:endCxn id="92" idx="0"/>
+          </p:cNvCxnSpPr>
+          <p:nvPr/>
+        </p:nvCxnSpPr>
+        <p:spPr>
+          <a:xfrm>
+            <a:off x="2043416" y="3459467"/>
+            <a:ext cx="1037865" cy="554524"/>
+          </a:xfrm>
+          <a:prstGeom prst="line">
+            <a:avLst/>
+          </a:prstGeom>
+        </p:spPr>
+        <p:style>
+          <a:lnRef idx="1">
+            <a:schemeClr val="accent1"/>
+          </a:lnRef>
+          <a:fillRef idx="0">
+            <a:schemeClr val="accent1"/>
+          </a:fillRef>
+          <a:effectRef idx="0">
+            <a:schemeClr val="accent1"/>
+          </a:effectRef>
+          <a:fontRef idx="minor">
+            <a:schemeClr val="tx1"/>
+          </a:fontRef>
+        </p:style>
+      </p:cxnSp>
+      <p:sp>
+        <p:nvSpPr>
+          <p:cNvPr id="113" name="Elipse 112">
+            <a:extLst>
+              <a:ext uri="{FF2B5EF4-FFF2-40B4-BE49-F238E27FC236}">
+                <a16:creationId xmlns:a16="http://schemas.microsoft.com/office/drawing/2014/main" id="{A69F4550-FD8B-DA49-A4EC-644CACB26B75}"/>
+              </a:ext>
+            </a:extLst>
+          </p:cNvPr>
+          <p:cNvSpPr/>
+          <p:nvPr/>
+        </p:nvSpPr>
+        <p:spPr>
+          <a:xfrm>
+            <a:off x="3755315" y="4066319"/>
+            <a:ext cx="518572" cy="472440"/>
+          </a:xfrm>
+          <a:prstGeom prst="ellipse">
+            <a:avLst/>
+          </a:prstGeom>
+        </p:spPr>
+        <p:style>
+          <a:lnRef idx="2">
+            <a:schemeClr val="accent1">
+              <a:shade val="15000"/>
+            </a:schemeClr>
+          </a:lnRef>
+          <a:fillRef idx="1">
+            <a:schemeClr val="accent1"/>
+          </a:fillRef>
+          <a:effectRef idx="0">
+            <a:schemeClr val="accent1"/>
+          </a:effectRef>
+          <a:fontRef idx="minor">
+            <a:schemeClr val="lt1"/>
+          </a:fontRef>
+        </p:style>
+        <p:txBody>
+          <a:bodyPr rtlCol="0" anchor="ctr"/>
+          <a:lstStyle/>
+          <a:p>
+            <a:pPr algn="ctr"/>
+            <a:r>
+              <a:rPr lang="es-MX" sz="1100" dirty="0"/>
+              <a:t>;</a:t>
+            </a:r>
+          </a:p>
+        </p:txBody>
+      </p:sp>
+      <p:cxnSp>
+        <p:nvCxnSpPr>
+          <p:cNvPr id="115" name="Conector recto 114">
+            <a:extLst>
+              <a:ext uri="{FF2B5EF4-FFF2-40B4-BE49-F238E27FC236}">
+                <a16:creationId xmlns:a16="http://schemas.microsoft.com/office/drawing/2014/main" id="{C0E0A642-06E2-DDBB-EC56-937DBBF67185}"/>
+              </a:ext>
+            </a:extLst>
+          </p:cNvPr>
+          <p:cNvCxnSpPr>
+            <a:stCxn id="93" idx="4"/>
+            <a:endCxn id="113" idx="0"/>
+          </p:cNvCxnSpPr>
+          <p:nvPr/>
+        </p:nvCxnSpPr>
+        <p:spPr>
+          <a:xfrm>
+            <a:off x="2043416" y="3459467"/>
+            <a:ext cx="1971185" cy="606852"/>
+          </a:xfrm>
+          <a:prstGeom prst="line">
+            <a:avLst/>
+          </a:prstGeom>
+        </p:spPr>
+        <p:style>
+          <a:lnRef idx="1">
+            <a:schemeClr val="accent1"/>
+          </a:lnRef>
+          <a:fillRef idx="0">
+            <a:schemeClr val="accent1"/>
+          </a:fillRef>
+          <a:effectRef idx="0">
+            <a:schemeClr val="accent1"/>
+          </a:effectRef>
+          <a:fontRef idx="minor">
+            <a:schemeClr val="tx1"/>
+          </a:fontRef>
+        </p:style>
+      </p:cxnSp>
+      <p:sp>
+        <p:nvSpPr>
+          <p:cNvPr id="117" name="Elipse 116">
+            <a:extLst>
+              <a:ext uri="{FF2B5EF4-FFF2-40B4-BE49-F238E27FC236}">
+                <a16:creationId xmlns:a16="http://schemas.microsoft.com/office/drawing/2014/main" id="{EF3A4A9F-9C6E-5061-E0F0-B16330D07334}"/>
+              </a:ext>
+            </a:extLst>
+          </p:cNvPr>
+          <p:cNvSpPr/>
+          <p:nvPr/>
+        </p:nvSpPr>
+        <p:spPr>
+          <a:xfrm>
+            <a:off x="4264419" y="1983255"/>
+            <a:ext cx="2405589" cy="332855"/>
+          </a:xfrm>
+          <a:prstGeom prst="ellipse">
+            <a:avLst/>
+          </a:prstGeom>
+        </p:spPr>
+        <p:style>
+          <a:lnRef idx="2">
+            <a:schemeClr val="accent1">
+              <a:shade val="15000"/>
+            </a:schemeClr>
+          </a:lnRef>
+          <a:fillRef idx="1">
+            <a:schemeClr val="accent1"/>
+          </a:fillRef>
+          <a:effectRef idx="0">
+            <a:schemeClr val="accent1"/>
+          </a:effectRef>
+          <a:fontRef idx="minor">
+            <a:schemeClr val="lt1"/>
+          </a:fontRef>
+        </p:style>
+        <p:txBody>
+          <a:bodyPr rtlCol="0" anchor="ctr"/>
+          <a:lstStyle/>
+          <a:p>
+            <a:pPr algn="ctr"/>
+            <a:r>
+              <a:rPr lang="es-MX" sz="1100" dirty="0" err="1"/>
+              <a:t>statements</a:t>
+            </a:r>
+            <a:endParaRPr lang="es-MX" sz="1100" dirty="0"/>
+          </a:p>
+        </p:txBody>
+      </p:sp>
+      <p:sp>
+        <p:nvSpPr>
+          <p:cNvPr id="120" name="Elipse 119">
+            <a:extLst>
+              <a:ext uri="{FF2B5EF4-FFF2-40B4-BE49-F238E27FC236}">
+                <a16:creationId xmlns:a16="http://schemas.microsoft.com/office/drawing/2014/main" id="{22D52C65-88D4-7048-D542-A32E24A1DB85}"/>
+              </a:ext>
+            </a:extLst>
+          </p:cNvPr>
+          <p:cNvSpPr/>
+          <p:nvPr/>
+        </p:nvSpPr>
+        <p:spPr>
+          <a:xfrm>
+            <a:off x="840620" y="2529622"/>
+            <a:ext cx="2405589" cy="332855"/>
+          </a:xfrm>
+          <a:prstGeom prst="ellipse">
+            <a:avLst/>
+          </a:prstGeom>
+        </p:spPr>
+        <p:style>
+          <a:lnRef idx="2">
+            <a:schemeClr val="accent1">
+              <a:shade val="15000"/>
+            </a:schemeClr>
+          </a:lnRef>
+          <a:fillRef idx="1">
+            <a:schemeClr val="accent1"/>
+          </a:fillRef>
+          <a:effectRef idx="0">
+            <a:schemeClr val="accent1"/>
+          </a:effectRef>
+          <a:fontRef idx="minor">
+            <a:schemeClr val="lt1"/>
+          </a:fontRef>
+        </p:style>
+        <p:txBody>
+          <a:bodyPr rtlCol="0" anchor="ctr"/>
+          <a:lstStyle/>
+          <a:p>
+            <a:pPr algn="ctr"/>
+            <a:r>
+              <a:rPr lang="es-MX" sz="1100" dirty="0" err="1"/>
+              <a:t>statements</a:t>
+            </a:r>
+            <a:endParaRPr lang="es-MX" sz="1100" dirty="0"/>
+          </a:p>
+        </p:txBody>
+      </p:sp>
+      <p:cxnSp>
+        <p:nvCxnSpPr>
+          <p:cNvPr id="124" name="Conector recto 123">
+            <a:extLst>
+              <a:ext uri="{FF2B5EF4-FFF2-40B4-BE49-F238E27FC236}">
+                <a16:creationId xmlns:a16="http://schemas.microsoft.com/office/drawing/2014/main" id="{42727BE9-E783-791F-3E53-60CE760BBF1C}"/>
+              </a:ext>
+            </a:extLst>
+          </p:cNvPr>
+          <p:cNvCxnSpPr>
+            <a:stCxn id="117" idx="4"/>
+            <a:endCxn id="120" idx="0"/>
+          </p:cNvCxnSpPr>
+          <p:nvPr/>
+        </p:nvCxnSpPr>
+        <p:spPr>
+          <a:xfrm flipH="1">
+            <a:off x="2043415" y="2316110"/>
+            <a:ext cx="3423799" cy="213512"/>
+          </a:xfrm>
+          <a:prstGeom prst="line">
+            <a:avLst/>
+          </a:prstGeom>
+        </p:spPr>
+        <p:style>
+          <a:lnRef idx="1">
+            <a:schemeClr val="accent1"/>
+          </a:lnRef>
+          <a:fillRef idx="0">
+            <a:schemeClr val="accent1"/>
+          </a:fillRef>
+          <a:effectRef idx="0">
+            <a:schemeClr val="accent1"/>
+          </a:effectRef>
+          <a:fontRef idx="minor">
+            <a:schemeClr val="tx1"/>
+          </a:fontRef>
+        </p:style>
+      </p:cxnSp>
+      <p:cxnSp>
+        <p:nvCxnSpPr>
+          <p:cNvPr id="126" name="Conector recto 125">
+            <a:extLst>
+              <a:ext uri="{FF2B5EF4-FFF2-40B4-BE49-F238E27FC236}">
+                <a16:creationId xmlns:a16="http://schemas.microsoft.com/office/drawing/2014/main" id="{8BE05873-B6BB-5D46-CC40-6E27AF65A469}"/>
+              </a:ext>
+            </a:extLst>
+          </p:cNvPr>
+          <p:cNvCxnSpPr>
+            <a:stCxn id="120" idx="4"/>
+            <a:endCxn id="93" idx="0"/>
+          </p:cNvCxnSpPr>
+          <p:nvPr/>
+        </p:nvCxnSpPr>
+        <p:spPr>
+          <a:xfrm>
+            <a:off x="2043415" y="2862477"/>
+            <a:ext cx="1" cy="264135"/>
+          </a:xfrm>
+          <a:prstGeom prst="line">
+            <a:avLst/>
+          </a:prstGeom>
+        </p:spPr>
+        <p:style>
+          <a:lnRef idx="1">
+            <a:schemeClr val="accent1"/>
+          </a:lnRef>
+          <a:fillRef idx="0">
+            <a:schemeClr val="accent1"/>
+          </a:fillRef>
+          <a:effectRef idx="0">
+            <a:schemeClr val="accent1"/>
+          </a:effectRef>
+          <a:fontRef idx="minor">
+            <a:schemeClr val="tx1"/>
+          </a:fontRef>
+        </p:style>
+      </p:cxnSp>
+      <p:sp>
+        <p:nvSpPr>
+          <p:cNvPr id="127" name="Elipse 126">
+            <a:extLst>
+              <a:ext uri="{FF2B5EF4-FFF2-40B4-BE49-F238E27FC236}">
+                <a16:creationId xmlns:a16="http://schemas.microsoft.com/office/drawing/2014/main" id="{C24F0DE7-BF20-2638-01C8-97B1233E0B1A}"/>
+              </a:ext>
+            </a:extLst>
+          </p:cNvPr>
+          <p:cNvSpPr/>
+          <p:nvPr/>
+        </p:nvSpPr>
+        <p:spPr>
+          <a:xfrm>
+            <a:off x="4810048" y="2619735"/>
+            <a:ext cx="2405589" cy="332855"/>
+          </a:xfrm>
+          <a:prstGeom prst="ellipse">
+            <a:avLst/>
+          </a:prstGeom>
+        </p:spPr>
+        <p:style>
+          <a:lnRef idx="2">
+            <a:schemeClr val="accent1">
+              <a:shade val="15000"/>
+            </a:schemeClr>
+          </a:lnRef>
+          <a:fillRef idx="1">
+            <a:schemeClr val="accent1"/>
+          </a:fillRef>
+          <a:effectRef idx="0">
+            <a:schemeClr val="accent1"/>
+          </a:effectRef>
+          <a:fontRef idx="minor">
+            <a:schemeClr val="lt1"/>
+          </a:fontRef>
+        </p:style>
+        <p:txBody>
+          <a:bodyPr rtlCol="0" anchor="ctr"/>
+          <a:lstStyle/>
+          <a:p>
+            <a:pPr algn="ctr"/>
+            <a:r>
+              <a:rPr lang="es-MX" sz="1100" dirty="0" err="1"/>
+              <a:t>statements</a:t>
+            </a:r>
+            <a:endParaRPr lang="es-MX" sz="1100" dirty="0"/>
+          </a:p>
+        </p:txBody>
+      </p:sp>
+      <p:cxnSp>
+        <p:nvCxnSpPr>
+          <p:cNvPr id="129" name="Conector recto 128">
+            <a:extLst>
+              <a:ext uri="{FF2B5EF4-FFF2-40B4-BE49-F238E27FC236}">
+                <a16:creationId xmlns:a16="http://schemas.microsoft.com/office/drawing/2014/main" id="{64044B09-F5D1-B65D-94F6-AD6FC475C214}"/>
+              </a:ext>
+            </a:extLst>
+          </p:cNvPr>
+          <p:cNvCxnSpPr>
+            <a:stCxn id="117" idx="4"/>
+            <a:endCxn id="127" idx="0"/>
+          </p:cNvCxnSpPr>
+          <p:nvPr/>
+        </p:nvCxnSpPr>
+        <p:spPr>
+          <a:xfrm>
+            <a:off x="5467214" y="2316110"/>
+            <a:ext cx="545629" cy="303625"/>
+          </a:xfrm>
+          <a:prstGeom prst="line">
+            <a:avLst/>
+          </a:prstGeom>
+        </p:spPr>
+        <p:style>
+          <a:lnRef idx="1">
+            <a:schemeClr val="accent1"/>
+          </a:lnRef>
+          <a:fillRef idx="0">
+            <a:schemeClr val="accent1"/>
+          </a:fillRef>
+          <a:effectRef idx="0">
+            <a:schemeClr val="accent1"/>
+          </a:effectRef>
+          <a:fontRef idx="minor">
+            <a:schemeClr val="tx1"/>
+          </a:fontRef>
+        </p:style>
+      </p:cxnSp>
+      <p:sp>
+        <p:nvSpPr>
+          <p:cNvPr id="130" name="Elipse 129">
+            <a:extLst>
+              <a:ext uri="{FF2B5EF4-FFF2-40B4-BE49-F238E27FC236}">
+                <a16:creationId xmlns:a16="http://schemas.microsoft.com/office/drawing/2014/main" id="{C03D5568-634D-1F63-1D73-393AD110F910}"/>
+              </a:ext>
+            </a:extLst>
+          </p:cNvPr>
+          <p:cNvSpPr/>
+          <p:nvPr/>
+        </p:nvSpPr>
+        <p:spPr>
+          <a:xfrm>
+            <a:off x="4815923" y="3238830"/>
+            <a:ext cx="2405589" cy="332855"/>
+          </a:xfrm>
+          <a:prstGeom prst="ellipse">
+            <a:avLst/>
+          </a:prstGeom>
+        </p:spPr>
+        <p:style>
+          <a:lnRef idx="2">
+            <a:schemeClr val="accent1">
+              <a:shade val="15000"/>
+            </a:schemeClr>
+          </a:lnRef>
+          <a:fillRef idx="1">
+            <a:schemeClr val="accent1"/>
+          </a:fillRef>
+          <a:effectRef idx="0">
+            <a:schemeClr val="accent1"/>
+          </a:effectRef>
+          <a:fontRef idx="minor">
+            <a:schemeClr val="lt1"/>
+          </a:fontRef>
+        </p:style>
+        <p:txBody>
+          <a:bodyPr rtlCol="0" anchor="ctr"/>
+          <a:lstStyle/>
+          <a:p>
+            <a:pPr algn="ctr"/>
+            <a:r>
+              <a:rPr lang="es-MX" sz="1100" dirty="0" err="1"/>
+              <a:t>if_statement</a:t>
+            </a:r>
+            <a:endParaRPr lang="es-MX" sz="1100" dirty="0"/>
+          </a:p>
+        </p:txBody>
+      </p:sp>
+      <p:cxnSp>
+        <p:nvCxnSpPr>
+          <p:cNvPr id="132" name="Conector recto 131">
+            <a:extLst>
+              <a:ext uri="{FF2B5EF4-FFF2-40B4-BE49-F238E27FC236}">
+                <a16:creationId xmlns:a16="http://schemas.microsoft.com/office/drawing/2014/main" id="{2F731496-7CEA-DD8B-2CF8-76A3CADE5A1C}"/>
+              </a:ext>
+            </a:extLst>
+          </p:cNvPr>
+          <p:cNvCxnSpPr>
+            <a:cxnSpLocks/>
+            <a:stCxn id="127" idx="4"/>
+            <a:endCxn id="130" idx="0"/>
+          </p:cNvCxnSpPr>
+          <p:nvPr/>
+        </p:nvCxnSpPr>
+        <p:spPr>
+          <a:xfrm>
+            <a:off x="6012843" y="2952590"/>
+            <a:ext cx="5875" cy="286240"/>
+          </a:xfrm>
+          <a:prstGeom prst="line">
+            <a:avLst/>
+          </a:prstGeom>
+        </p:spPr>
+        <p:style>
+          <a:lnRef idx="1">
+            <a:schemeClr val="accent1"/>
+          </a:lnRef>
+          <a:fillRef idx="0">
+            <a:schemeClr val="accent1"/>
+          </a:fillRef>
+          <a:effectRef idx="0">
+            <a:schemeClr val="accent1"/>
+          </a:effectRef>
+          <a:fontRef idx="minor">
+            <a:schemeClr val="tx1"/>
+          </a:fontRef>
+        </p:style>
+      </p:cxnSp>
+      <p:sp>
+        <p:nvSpPr>
+          <p:cNvPr id="135" name="Elipse 134">
+            <a:extLst>
+              <a:ext uri="{FF2B5EF4-FFF2-40B4-BE49-F238E27FC236}">
+                <a16:creationId xmlns:a16="http://schemas.microsoft.com/office/drawing/2014/main" id="{50C2AB70-227C-B071-C100-4056426BB90C}"/>
+              </a:ext>
+            </a:extLst>
+          </p:cNvPr>
+          <p:cNvSpPr/>
+          <p:nvPr/>
+        </p:nvSpPr>
+        <p:spPr>
+          <a:xfrm>
+            <a:off x="4327246" y="4116027"/>
+            <a:ext cx="724221" cy="332855"/>
+          </a:xfrm>
+          <a:prstGeom prst="ellipse">
+            <a:avLst/>
+          </a:prstGeom>
+        </p:spPr>
+        <p:style>
+          <a:lnRef idx="2">
+            <a:schemeClr val="accent1">
+              <a:shade val="15000"/>
+            </a:schemeClr>
+          </a:lnRef>
+          <a:fillRef idx="1">
+            <a:schemeClr val="accent1"/>
+          </a:fillRef>
+          <a:effectRef idx="0">
+            <a:schemeClr val="accent1"/>
+          </a:effectRef>
+          <a:fontRef idx="minor">
+            <a:schemeClr val="lt1"/>
+          </a:fontRef>
+        </p:style>
+        <p:txBody>
+          <a:bodyPr rtlCol="0" anchor="ctr"/>
+          <a:lstStyle/>
+          <a:p>
+            <a:pPr algn="ctr"/>
+            <a:r>
+              <a:rPr lang="es-MX" sz="1100" dirty="0" err="1"/>
+              <a:t>pr</a:t>
+            </a:r>
+            <a:endParaRPr lang="es-MX" sz="1100" dirty="0"/>
+          </a:p>
+        </p:txBody>
+      </p:sp>
+      <p:sp>
+        <p:nvSpPr>
+          <p:cNvPr id="138" name="Elipse 137">
+            <a:extLst>
+              <a:ext uri="{FF2B5EF4-FFF2-40B4-BE49-F238E27FC236}">
+                <a16:creationId xmlns:a16="http://schemas.microsoft.com/office/drawing/2014/main" id="{58A22CED-57A6-E9CA-20FC-D829A1D899AA}"/>
+              </a:ext>
+            </a:extLst>
+          </p:cNvPr>
+          <p:cNvSpPr/>
+          <p:nvPr/>
+        </p:nvSpPr>
+        <p:spPr>
+          <a:xfrm>
+            <a:off x="5207927" y="4080403"/>
+            <a:ext cx="518572" cy="434891"/>
+          </a:xfrm>
+          <a:prstGeom prst="ellipse">
+            <a:avLst/>
+          </a:prstGeom>
+        </p:spPr>
+        <p:style>
+          <a:lnRef idx="2">
+            <a:schemeClr val="accent1">
+              <a:shade val="15000"/>
+            </a:schemeClr>
+          </a:lnRef>
+          <a:fillRef idx="1">
+            <a:schemeClr val="accent1"/>
+          </a:fillRef>
+          <a:effectRef idx="0">
+            <a:schemeClr val="accent1"/>
+          </a:effectRef>
+          <a:fontRef idx="minor">
+            <a:schemeClr val="lt1"/>
+          </a:fontRef>
+        </p:style>
+        <p:txBody>
+          <a:bodyPr rtlCol="0" anchor="ctr"/>
+          <a:lstStyle/>
+          <a:p>
+            <a:pPr algn="ctr"/>
+            <a:r>
+              <a:rPr lang="es-MX" dirty="0"/>
+              <a:t>(</a:t>
+            </a:r>
+          </a:p>
+        </p:txBody>
+      </p:sp>
+      <p:sp>
+        <p:nvSpPr>
+          <p:cNvPr id="139" name="Elipse 138">
+            <a:extLst>
+              <a:ext uri="{FF2B5EF4-FFF2-40B4-BE49-F238E27FC236}">
+                <a16:creationId xmlns:a16="http://schemas.microsoft.com/office/drawing/2014/main" id="{31A16369-3ED5-F2F6-E6CE-5771B605E8D5}"/>
+              </a:ext>
+            </a:extLst>
+          </p:cNvPr>
+          <p:cNvSpPr/>
+          <p:nvPr/>
+        </p:nvSpPr>
+        <p:spPr>
+          <a:xfrm>
+            <a:off x="7029833" y="4093725"/>
+            <a:ext cx="518572" cy="434891"/>
+          </a:xfrm>
+          <a:prstGeom prst="ellipse">
+            <a:avLst/>
+          </a:prstGeom>
+        </p:spPr>
+        <p:style>
+          <a:lnRef idx="2">
+            <a:schemeClr val="accent1">
+              <a:shade val="15000"/>
+            </a:schemeClr>
+          </a:lnRef>
+          <a:fillRef idx="1">
+            <a:schemeClr val="accent1"/>
+          </a:fillRef>
+          <a:effectRef idx="0">
+            <a:schemeClr val="accent1"/>
+          </a:effectRef>
+          <a:fontRef idx="minor">
+            <a:schemeClr val="lt1"/>
+          </a:fontRef>
+        </p:style>
+        <p:txBody>
+          <a:bodyPr rtlCol="0" anchor="ctr"/>
+          <a:lstStyle/>
+          <a:p>
+            <a:pPr algn="ctr"/>
+            <a:r>
+              <a:rPr lang="es-MX" dirty="0"/>
+              <a:t>)</a:t>
+            </a:r>
+          </a:p>
+        </p:txBody>
+      </p:sp>
+      <p:sp>
+        <p:nvSpPr>
+          <p:cNvPr id="140" name="Elipse 139">
+            <a:extLst>
+              <a:ext uri="{FF2B5EF4-FFF2-40B4-BE49-F238E27FC236}">
+                <a16:creationId xmlns:a16="http://schemas.microsoft.com/office/drawing/2014/main" id="{4003246D-3BFC-A067-0573-CEDD1349C919}"/>
+              </a:ext>
+            </a:extLst>
+          </p:cNvPr>
+          <p:cNvSpPr/>
+          <p:nvPr/>
+        </p:nvSpPr>
+        <p:spPr>
+          <a:xfrm>
+            <a:off x="5797323" y="4130719"/>
+            <a:ext cx="1107889" cy="332855"/>
+          </a:xfrm>
+          <a:prstGeom prst="ellipse">
+            <a:avLst/>
+          </a:prstGeom>
+        </p:spPr>
+        <p:style>
+          <a:lnRef idx="2">
+            <a:schemeClr val="accent1">
+              <a:shade val="15000"/>
+            </a:schemeClr>
+          </a:lnRef>
+          <a:fillRef idx="1">
+            <a:schemeClr val="accent1"/>
+          </a:fillRef>
+          <a:effectRef idx="0">
+            <a:schemeClr val="accent1"/>
+          </a:effectRef>
+          <a:fontRef idx="minor">
+            <a:schemeClr val="lt1"/>
+          </a:fontRef>
+        </p:style>
+        <p:txBody>
+          <a:bodyPr rtlCol="0" anchor="ctr"/>
+          <a:lstStyle/>
+          <a:p>
+            <a:pPr algn="ctr"/>
+            <a:r>
+              <a:rPr lang="es-MX" sz="1100" dirty="0" err="1"/>
+              <a:t>condition</a:t>
+            </a:r>
+            <a:endParaRPr lang="es-MX" sz="1100" dirty="0"/>
+          </a:p>
+        </p:txBody>
+      </p:sp>
+      <p:sp>
+        <p:nvSpPr>
+          <p:cNvPr id="141" name="Elipse 140">
+            <a:extLst>
+              <a:ext uri="{FF2B5EF4-FFF2-40B4-BE49-F238E27FC236}">
+                <a16:creationId xmlns:a16="http://schemas.microsoft.com/office/drawing/2014/main" id="{57D13109-958A-B5F3-4AEA-0053482ECDE8}"/>
+              </a:ext>
+            </a:extLst>
+          </p:cNvPr>
+          <p:cNvSpPr/>
+          <p:nvPr/>
+        </p:nvSpPr>
+        <p:spPr>
+          <a:xfrm>
+            <a:off x="4584289" y="52514"/>
+            <a:ext cx="1721366" cy="369332"/>
+          </a:xfrm>
+          <a:prstGeom prst="ellipse">
+            <a:avLst/>
+          </a:prstGeom>
+        </p:spPr>
+        <p:style>
+          <a:lnRef idx="2">
+            <a:schemeClr val="accent1">
+              <a:shade val="15000"/>
+            </a:schemeClr>
+          </a:lnRef>
+          <a:fillRef idx="1">
+            <a:schemeClr val="accent1"/>
+          </a:fillRef>
+          <a:effectRef idx="0">
+            <a:schemeClr val="accent1"/>
+          </a:effectRef>
+          <a:fontRef idx="minor">
+            <a:schemeClr val="lt1"/>
+          </a:fontRef>
+        </p:style>
+        <p:txBody>
+          <a:bodyPr rtlCol="0" anchor="ctr"/>
+          <a:lstStyle/>
+          <a:p>
+            <a:pPr algn="ctr"/>
+            <a:r>
+              <a:rPr lang="es-MX" dirty="0" err="1"/>
+              <a:t>program</a:t>
+            </a:r>
+            <a:endParaRPr lang="es-MX" dirty="0"/>
+          </a:p>
+        </p:txBody>
+      </p:sp>
+      <p:sp>
+        <p:nvSpPr>
+          <p:cNvPr id="153" name="Elipse 152">
+            <a:extLst>
+              <a:ext uri="{FF2B5EF4-FFF2-40B4-BE49-F238E27FC236}">
+                <a16:creationId xmlns:a16="http://schemas.microsoft.com/office/drawing/2014/main" id="{8BDADC41-B021-E875-BC6A-4F6D71648C68}"/>
+              </a:ext>
+            </a:extLst>
+          </p:cNvPr>
+          <p:cNvSpPr/>
+          <p:nvPr/>
+        </p:nvSpPr>
+        <p:spPr>
+          <a:xfrm>
+            <a:off x="4948642" y="1327683"/>
+            <a:ext cx="1037143" cy="369332"/>
+          </a:xfrm>
+          <a:prstGeom prst="ellipse">
+            <a:avLst/>
+          </a:prstGeom>
+        </p:spPr>
+        <p:style>
+          <a:lnRef idx="2">
+            <a:schemeClr val="accent1">
+              <a:shade val="15000"/>
+            </a:schemeClr>
+          </a:lnRef>
+          <a:fillRef idx="1">
+            <a:schemeClr val="accent1"/>
+          </a:fillRef>
+          <a:effectRef idx="0">
+            <a:schemeClr val="accent1"/>
+          </a:effectRef>
+          <a:fontRef idx="minor">
+            <a:schemeClr val="lt1"/>
+          </a:fontRef>
+        </p:style>
+        <p:txBody>
+          <a:bodyPr rtlCol="0" anchor="ctr"/>
+          <a:lstStyle/>
+          <a:p>
+            <a:pPr algn="ctr"/>
+            <a:r>
+              <a:rPr lang="es-MX" dirty="0" err="1"/>
+              <a:t>Ini</a:t>
+            </a:r>
+            <a:endParaRPr lang="es-MX" dirty="0"/>
+          </a:p>
+        </p:txBody>
+      </p:sp>
+      <p:sp>
+        <p:nvSpPr>
+          <p:cNvPr id="154" name="Elipse 153">
+            <a:extLst>
+              <a:ext uri="{FF2B5EF4-FFF2-40B4-BE49-F238E27FC236}">
+                <a16:creationId xmlns:a16="http://schemas.microsoft.com/office/drawing/2014/main" id="{FD623064-B468-D398-729F-DB07BD8F0AED}"/>
+              </a:ext>
+            </a:extLst>
+          </p:cNvPr>
+          <p:cNvSpPr/>
+          <p:nvPr/>
+        </p:nvSpPr>
+        <p:spPr>
+          <a:xfrm>
+            <a:off x="3226919" y="1460795"/>
+            <a:ext cx="693420" cy="472440"/>
+          </a:xfrm>
+          <a:prstGeom prst="ellipse">
+            <a:avLst/>
+          </a:prstGeom>
+        </p:spPr>
+        <p:style>
+          <a:lnRef idx="2">
+            <a:schemeClr val="accent1">
+              <a:shade val="15000"/>
+            </a:schemeClr>
+          </a:lnRef>
+          <a:fillRef idx="1">
+            <a:schemeClr val="accent1"/>
+          </a:fillRef>
+          <a:effectRef idx="0">
+            <a:schemeClr val="accent1"/>
+          </a:effectRef>
+          <a:fontRef idx="minor">
+            <a:schemeClr val="lt1"/>
+          </a:fontRef>
+        </p:style>
+        <p:txBody>
+          <a:bodyPr rtlCol="0" anchor="ctr"/>
+          <a:lstStyle/>
+          <a:p>
+            <a:pPr algn="ctr"/>
+            <a:r>
+              <a:rPr lang="es-MX" dirty="0"/>
+              <a:t>{</a:t>
+            </a:r>
+          </a:p>
+        </p:txBody>
+      </p:sp>
+      <p:sp>
+        <p:nvSpPr>
+          <p:cNvPr id="155" name="Elipse 154">
+            <a:extLst>
+              <a:ext uri="{FF2B5EF4-FFF2-40B4-BE49-F238E27FC236}">
+                <a16:creationId xmlns:a16="http://schemas.microsoft.com/office/drawing/2014/main" id="{7F387AB6-2D64-EFDC-E21A-0AA67DF23734}"/>
+              </a:ext>
+            </a:extLst>
+          </p:cNvPr>
+          <p:cNvSpPr/>
+          <p:nvPr/>
+        </p:nvSpPr>
+        <p:spPr>
+          <a:xfrm>
+            <a:off x="7265740" y="1460795"/>
+            <a:ext cx="693420" cy="472440"/>
+          </a:xfrm>
+          <a:prstGeom prst="ellipse">
+            <a:avLst/>
+          </a:prstGeom>
+        </p:spPr>
+        <p:style>
+          <a:lnRef idx="2">
+            <a:schemeClr val="accent1">
+              <a:shade val="15000"/>
+            </a:schemeClr>
+          </a:lnRef>
+          <a:fillRef idx="1">
+            <a:schemeClr val="accent1"/>
+          </a:fillRef>
+          <a:effectRef idx="0">
+            <a:schemeClr val="accent1"/>
+          </a:effectRef>
+          <a:fontRef idx="minor">
+            <a:schemeClr val="lt1"/>
+          </a:fontRef>
+        </p:style>
+        <p:txBody>
+          <a:bodyPr rtlCol="0" anchor="ctr"/>
+          <a:lstStyle/>
+          <a:p>
+            <a:pPr algn="ctr"/>
+            <a:r>
+              <a:rPr lang="es-MX" dirty="0"/>
+              <a:t>}</a:t>
+            </a:r>
+          </a:p>
+        </p:txBody>
+      </p:sp>
+      <p:cxnSp>
+        <p:nvCxnSpPr>
+          <p:cNvPr id="156" name="Conector recto 155">
+            <a:extLst>
+              <a:ext uri="{FF2B5EF4-FFF2-40B4-BE49-F238E27FC236}">
+                <a16:creationId xmlns:a16="http://schemas.microsoft.com/office/drawing/2014/main" id="{15BDFD08-A7CD-C7C9-526C-6969F0385201}"/>
+              </a:ext>
+            </a:extLst>
+          </p:cNvPr>
+          <p:cNvCxnSpPr>
+            <a:cxnSpLocks/>
+            <a:stCxn id="153" idx="2"/>
+            <a:endCxn id="154" idx="7"/>
+          </p:cNvCxnSpPr>
+          <p:nvPr/>
+        </p:nvCxnSpPr>
+        <p:spPr>
+          <a:xfrm flipH="1">
+            <a:off x="3818790" y="1512349"/>
+            <a:ext cx="1129852" cy="17633"/>
+          </a:xfrm>
+          <a:prstGeom prst="line">
+            <a:avLst/>
+          </a:prstGeom>
+        </p:spPr>
+        <p:style>
+          <a:lnRef idx="1">
+            <a:schemeClr val="accent1"/>
+          </a:lnRef>
+          <a:fillRef idx="0">
+            <a:schemeClr val="accent1"/>
+          </a:fillRef>
+          <a:effectRef idx="0">
+            <a:schemeClr val="accent1"/>
+          </a:effectRef>
+          <a:fontRef idx="minor">
+            <a:schemeClr val="tx1"/>
+          </a:fontRef>
+        </p:style>
+      </p:cxnSp>
+      <p:cxnSp>
+        <p:nvCxnSpPr>
+          <p:cNvPr id="157" name="Conector recto 156">
+            <a:extLst>
+              <a:ext uri="{FF2B5EF4-FFF2-40B4-BE49-F238E27FC236}">
+                <a16:creationId xmlns:a16="http://schemas.microsoft.com/office/drawing/2014/main" id="{92EBEC7C-D82A-2349-AE61-13F7F4C4192C}"/>
+              </a:ext>
+            </a:extLst>
+          </p:cNvPr>
+          <p:cNvCxnSpPr>
+            <a:stCxn id="153" idx="6"/>
+            <a:endCxn id="155" idx="1"/>
+          </p:cNvCxnSpPr>
+          <p:nvPr/>
+        </p:nvCxnSpPr>
+        <p:spPr>
+          <a:xfrm>
+            <a:off x="5985785" y="1512349"/>
+            <a:ext cx="1381504" cy="17633"/>
+          </a:xfrm>
+          <a:prstGeom prst="line">
+            <a:avLst/>
+          </a:prstGeom>
+        </p:spPr>
+        <p:style>
+          <a:lnRef idx="1">
+            <a:schemeClr val="accent1"/>
+          </a:lnRef>
+          <a:fillRef idx="0">
+            <a:schemeClr val="accent1"/>
+          </a:fillRef>
+          <a:effectRef idx="0">
+            <a:schemeClr val="accent1"/>
+          </a:effectRef>
+          <a:fontRef idx="minor">
+            <a:schemeClr val="tx1"/>
+          </a:fontRef>
+        </p:style>
+      </p:cxnSp>
+      <p:cxnSp>
+        <p:nvCxnSpPr>
+          <p:cNvPr id="165" name="Conector recto 164">
+            <a:extLst>
+              <a:ext uri="{FF2B5EF4-FFF2-40B4-BE49-F238E27FC236}">
+                <a16:creationId xmlns:a16="http://schemas.microsoft.com/office/drawing/2014/main" id="{6799100F-03FC-9987-1B88-21FD4EA0DF36}"/>
+              </a:ext>
+            </a:extLst>
+          </p:cNvPr>
+          <p:cNvCxnSpPr>
+            <a:stCxn id="141" idx="4"/>
+            <a:endCxn id="6" idx="0"/>
+          </p:cNvCxnSpPr>
+          <p:nvPr/>
+        </p:nvCxnSpPr>
+        <p:spPr>
+          <a:xfrm>
+            <a:off x="5444972" y="421846"/>
+            <a:ext cx="22242" cy="164894"/>
+          </a:xfrm>
+          <a:prstGeom prst="line">
+            <a:avLst/>
+          </a:prstGeom>
+        </p:spPr>
+        <p:style>
+          <a:lnRef idx="1">
+            <a:schemeClr val="accent1"/>
+          </a:lnRef>
+          <a:fillRef idx="0">
+            <a:schemeClr val="accent1"/>
+          </a:fillRef>
+          <a:effectRef idx="0">
+            <a:schemeClr val="accent1"/>
+          </a:effectRef>
+          <a:fontRef idx="minor">
+            <a:schemeClr val="tx1"/>
+          </a:fontRef>
+        </p:style>
+      </p:cxnSp>
+      <p:cxnSp>
+        <p:nvCxnSpPr>
+          <p:cNvPr id="167" name="Conector recto 166">
+            <a:extLst>
+              <a:ext uri="{FF2B5EF4-FFF2-40B4-BE49-F238E27FC236}">
+                <a16:creationId xmlns:a16="http://schemas.microsoft.com/office/drawing/2014/main" id="{75CF00A9-F1FF-6EDD-583B-30DC939E4C15}"/>
+              </a:ext>
+            </a:extLst>
+          </p:cNvPr>
+          <p:cNvCxnSpPr>
+            <a:stCxn id="6" idx="4"/>
+            <a:endCxn id="153" idx="0"/>
+          </p:cNvCxnSpPr>
+          <p:nvPr/>
+        </p:nvCxnSpPr>
+        <p:spPr>
+          <a:xfrm>
+            <a:off x="5467214" y="1059180"/>
+            <a:ext cx="0" cy="268503"/>
+          </a:xfrm>
+          <a:prstGeom prst="line">
+            <a:avLst/>
+          </a:prstGeom>
+        </p:spPr>
+        <p:style>
+          <a:lnRef idx="1">
+            <a:schemeClr val="accent1"/>
+          </a:lnRef>
+          <a:fillRef idx="0">
+            <a:schemeClr val="accent1"/>
+          </a:fillRef>
+          <a:effectRef idx="0">
+            <a:schemeClr val="accent1"/>
+          </a:effectRef>
+          <a:fontRef idx="minor">
+            <a:schemeClr val="tx1"/>
+          </a:fontRef>
+        </p:style>
+      </p:cxnSp>
+      <p:cxnSp>
+        <p:nvCxnSpPr>
+          <p:cNvPr id="169" name="Conector recto 168">
+            <a:extLst>
+              <a:ext uri="{FF2B5EF4-FFF2-40B4-BE49-F238E27FC236}">
+                <a16:creationId xmlns:a16="http://schemas.microsoft.com/office/drawing/2014/main" id="{DC487E71-C61E-4E53-C140-1E01371FB7B1}"/>
+              </a:ext>
+            </a:extLst>
+          </p:cNvPr>
+          <p:cNvCxnSpPr>
+            <a:stCxn id="153" idx="4"/>
+            <a:endCxn id="117" idx="0"/>
+          </p:cNvCxnSpPr>
+          <p:nvPr/>
+        </p:nvCxnSpPr>
+        <p:spPr>
+          <a:xfrm>
+            <a:off x="5467214" y="1697015"/>
+            <a:ext cx="0" cy="286240"/>
+          </a:xfrm>
+          <a:prstGeom prst="line">
+            <a:avLst/>
+          </a:prstGeom>
+        </p:spPr>
+        <p:style>
+          <a:lnRef idx="1">
+            <a:schemeClr val="accent1"/>
+          </a:lnRef>
+          <a:fillRef idx="0">
+            <a:schemeClr val="accent1"/>
+          </a:fillRef>
+          <a:effectRef idx="0">
+            <a:schemeClr val="accent1"/>
+          </a:effectRef>
+          <a:fontRef idx="minor">
+            <a:schemeClr val="tx1"/>
+          </a:fontRef>
+        </p:style>
+      </p:cxnSp>
+      <p:cxnSp>
+        <p:nvCxnSpPr>
+          <p:cNvPr id="172" name="Conector recto 171">
+            <a:extLst>
+              <a:ext uri="{FF2B5EF4-FFF2-40B4-BE49-F238E27FC236}">
+                <a16:creationId xmlns:a16="http://schemas.microsoft.com/office/drawing/2014/main" id="{4A7E151D-2BF0-6479-8A10-C0DC92E8E4B8}"/>
+              </a:ext>
+            </a:extLst>
+          </p:cNvPr>
+          <p:cNvCxnSpPr>
+            <a:stCxn id="130" idx="4"/>
+            <a:endCxn id="135" idx="0"/>
+          </p:cNvCxnSpPr>
+          <p:nvPr/>
+        </p:nvCxnSpPr>
+        <p:spPr>
+          <a:xfrm flipH="1">
+            <a:off x="4689357" y="3571685"/>
+            <a:ext cx="1329361" cy="544342"/>
+          </a:xfrm>
+          <a:prstGeom prst="line">
+            <a:avLst/>
+          </a:prstGeom>
+        </p:spPr>
+        <p:style>
+          <a:lnRef idx="1">
+            <a:schemeClr val="accent1"/>
+          </a:lnRef>
+          <a:fillRef idx="0">
+            <a:schemeClr val="accent1"/>
+          </a:fillRef>
+          <a:effectRef idx="0">
+            <a:schemeClr val="accent1"/>
+          </a:effectRef>
+          <a:fontRef idx="minor">
+            <a:schemeClr val="tx1"/>
+          </a:fontRef>
+        </p:style>
+      </p:cxnSp>
+      <p:cxnSp>
+        <p:nvCxnSpPr>
+          <p:cNvPr id="174" name="Conector recto 173">
+            <a:extLst>
+              <a:ext uri="{FF2B5EF4-FFF2-40B4-BE49-F238E27FC236}">
+                <a16:creationId xmlns:a16="http://schemas.microsoft.com/office/drawing/2014/main" id="{A853D4F8-E7C0-7F4E-55BC-72E8570FDAF7}"/>
+              </a:ext>
+            </a:extLst>
+          </p:cNvPr>
+          <p:cNvCxnSpPr>
+            <a:stCxn id="130" idx="4"/>
+            <a:endCxn id="138" idx="0"/>
+          </p:cNvCxnSpPr>
+          <p:nvPr/>
+        </p:nvCxnSpPr>
+        <p:spPr>
+          <a:xfrm flipH="1">
+            <a:off x="5467213" y="3571685"/>
+            <a:ext cx="551505" cy="508718"/>
+          </a:xfrm>
+          <a:prstGeom prst="line">
+            <a:avLst/>
+          </a:prstGeom>
+        </p:spPr>
+        <p:style>
+          <a:lnRef idx="1">
+            <a:schemeClr val="accent1"/>
+          </a:lnRef>
+          <a:fillRef idx="0">
+            <a:schemeClr val="accent1"/>
+          </a:fillRef>
+          <a:effectRef idx="0">
+            <a:schemeClr val="accent1"/>
+          </a:effectRef>
+          <a:fontRef idx="minor">
+            <a:schemeClr val="tx1"/>
+          </a:fontRef>
+        </p:style>
+      </p:cxnSp>
+      <p:cxnSp>
+        <p:nvCxnSpPr>
+          <p:cNvPr id="176" name="Conector recto 175">
+            <a:extLst>
+              <a:ext uri="{FF2B5EF4-FFF2-40B4-BE49-F238E27FC236}">
+                <a16:creationId xmlns:a16="http://schemas.microsoft.com/office/drawing/2014/main" id="{DAC68D7D-F347-501E-9547-524371BFF487}"/>
+              </a:ext>
+            </a:extLst>
+          </p:cNvPr>
+          <p:cNvCxnSpPr>
+            <a:cxnSpLocks/>
+            <a:stCxn id="130" idx="4"/>
+            <a:endCxn id="140" idx="0"/>
+          </p:cNvCxnSpPr>
+          <p:nvPr/>
+        </p:nvCxnSpPr>
+        <p:spPr>
+          <a:xfrm>
+            <a:off x="6018718" y="3571685"/>
+            <a:ext cx="332550" cy="559034"/>
+          </a:xfrm>
+          <a:prstGeom prst="line">
+            <a:avLst/>
+          </a:prstGeom>
+        </p:spPr>
+        <p:style>
+          <a:lnRef idx="1">
+            <a:schemeClr val="accent1"/>
+          </a:lnRef>
+          <a:fillRef idx="0">
+            <a:schemeClr val="accent1"/>
+          </a:fillRef>
+          <a:effectRef idx="0">
+            <a:schemeClr val="accent1"/>
+          </a:effectRef>
+          <a:fontRef idx="minor">
+            <a:schemeClr val="tx1"/>
+          </a:fontRef>
+        </p:style>
+      </p:cxnSp>
+      <p:cxnSp>
+        <p:nvCxnSpPr>
+          <p:cNvPr id="178" name="Conector recto 177">
+            <a:extLst>
+              <a:ext uri="{FF2B5EF4-FFF2-40B4-BE49-F238E27FC236}">
+                <a16:creationId xmlns:a16="http://schemas.microsoft.com/office/drawing/2014/main" id="{CBBC803C-2617-E6F8-9602-46A1E1910482}"/>
+              </a:ext>
+            </a:extLst>
+          </p:cNvPr>
+          <p:cNvCxnSpPr>
+            <a:stCxn id="130" idx="4"/>
+            <a:endCxn id="139" idx="0"/>
+          </p:cNvCxnSpPr>
+          <p:nvPr/>
+        </p:nvCxnSpPr>
+        <p:spPr>
+          <a:xfrm>
+            <a:off x="6018718" y="3571685"/>
+            <a:ext cx="1270401" cy="522040"/>
+          </a:xfrm>
+          <a:prstGeom prst="line">
+            <a:avLst/>
+          </a:prstGeom>
+        </p:spPr>
+        <p:style>
+          <a:lnRef idx="1">
+            <a:schemeClr val="accent1"/>
+          </a:lnRef>
+          <a:fillRef idx="0">
+            <a:schemeClr val="accent1"/>
+          </a:fillRef>
+          <a:effectRef idx="0">
+            <a:schemeClr val="accent1"/>
+          </a:effectRef>
+          <a:fontRef idx="minor">
+            <a:schemeClr val="tx1"/>
+          </a:fontRef>
+        </p:style>
+      </p:cxnSp>
+      <p:sp>
+        <p:nvSpPr>
+          <p:cNvPr id="191" name="Elipse 190">
+            <a:extLst>
+              <a:ext uri="{FF2B5EF4-FFF2-40B4-BE49-F238E27FC236}">
+                <a16:creationId xmlns:a16="http://schemas.microsoft.com/office/drawing/2014/main" id="{77FF68C5-33B3-1EA7-BFD2-68D4F6A91F3E}"/>
+              </a:ext>
+            </a:extLst>
+          </p:cNvPr>
+          <p:cNvSpPr/>
+          <p:nvPr/>
+        </p:nvSpPr>
+        <p:spPr>
+          <a:xfrm>
+            <a:off x="7636491" y="4074109"/>
+            <a:ext cx="518572" cy="434891"/>
+          </a:xfrm>
+          <a:prstGeom prst="ellipse">
+            <a:avLst/>
+          </a:prstGeom>
+        </p:spPr>
+        <p:style>
+          <a:lnRef idx="2">
+            <a:schemeClr val="accent1">
+              <a:shade val="15000"/>
+            </a:schemeClr>
+          </a:lnRef>
+          <a:fillRef idx="1">
+            <a:schemeClr val="accent1"/>
+          </a:fillRef>
+          <a:effectRef idx="0">
+            <a:schemeClr val="accent1"/>
+          </a:effectRef>
+          <a:fontRef idx="minor">
+            <a:schemeClr val="lt1"/>
+          </a:fontRef>
+        </p:style>
+        <p:txBody>
+          <a:bodyPr rtlCol="0" anchor="ctr"/>
+          <a:lstStyle/>
+          <a:p>
+            <a:pPr algn="ctr"/>
+            <a:r>
+              <a:rPr lang="es-MX" dirty="0"/>
+              <a:t>{</a:t>
+            </a:r>
+          </a:p>
+        </p:txBody>
+      </p:sp>
+      <p:sp>
+        <p:nvSpPr>
+          <p:cNvPr id="192" name="Elipse 191">
+            <a:extLst>
+              <a:ext uri="{FF2B5EF4-FFF2-40B4-BE49-F238E27FC236}">
+                <a16:creationId xmlns:a16="http://schemas.microsoft.com/office/drawing/2014/main" id="{A04AC31B-9BD2-3EA8-E7F2-4797784930B1}"/>
+              </a:ext>
+            </a:extLst>
+          </p:cNvPr>
+          <p:cNvSpPr/>
+          <p:nvPr/>
+        </p:nvSpPr>
+        <p:spPr>
+          <a:xfrm>
+            <a:off x="9636891" y="4072221"/>
+            <a:ext cx="518572" cy="434891"/>
+          </a:xfrm>
+          <a:prstGeom prst="ellipse">
+            <a:avLst/>
+          </a:prstGeom>
+        </p:spPr>
+        <p:style>
+          <a:lnRef idx="2">
+            <a:schemeClr val="accent1">
+              <a:shade val="15000"/>
+            </a:schemeClr>
+          </a:lnRef>
+          <a:fillRef idx="1">
+            <a:schemeClr val="accent1"/>
+          </a:fillRef>
+          <a:effectRef idx="0">
+            <a:schemeClr val="accent1"/>
+          </a:effectRef>
+          <a:fontRef idx="minor">
+            <a:schemeClr val="lt1"/>
+          </a:fontRef>
+        </p:style>
+        <p:txBody>
+          <a:bodyPr rtlCol="0" anchor="ctr"/>
+          <a:lstStyle/>
+          <a:p>
+            <a:pPr algn="ctr"/>
+            <a:r>
+              <a:rPr lang="es-MX" dirty="0"/>
+              <a:t>}</a:t>
+            </a:r>
+          </a:p>
+        </p:txBody>
+      </p:sp>
+      <p:sp>
+        <p:nvSpPr>
+          <p:cNvPr id="193" name="Elipse 192">
+            <a:extLst>
+              <a:ext uri="{FF2B5EF4-FFF2-40B4-BE49-F238E27FC236}">
+                <a16:creationId xmlns:a16="http://schemas.microsoft.com/office/drawing/2014/main" id="{6C7F405B-D3B5-43AE-A24F-C34D892DA202}"/>
+              </a:ext>
+            </a:extLst>
+          </p:cNvPr>
+          <p:cNvSpPr/>
+          <p:nvPr/>
+        </p:nvSpPr>
+        <p:spPr>
+          <a:xfrm>
+            <a:off x="8244310" y="4123240"/>
+            <a:ext cx="1303334" cy="332855"/>
+          </a:xfrm>
+          <a:prstGeom prst="ellipse">
+            <a:avLst/>
+          </a:prstGeom>
+        </p:spPr>
+        <p:style>
+          <a:lnRef idx="2">
+            <a:schemeClr val="accent1">
+              <a:shade val="15000"/>
+            </a:schemeClr>
+          </a:lnRef>
+          <a:fillRef idx="1">
+            <a:schemeClr val="accent1"/>
+          </a:fillRef>
+          <a:effectRef idx="0">
+            <a:schemeClr val="accent1"/>
+          </a:effectRef>
+          <a:fontRef idx="minor">
+            <a:schemeClr val="lt1"/>
+          </a:fontRef>
+        </p:style>
+        <p:txBody>
+          <a:bodyPr rtlCol="0" anchor="ctr"/>
+          <a:lstStyle/>
+          <a:p>
+            <a:pPr algn="ctr"/>
+            <a:r>
+              <a:rPr lang="es-MX" sz="1100" dirty="0" err="1"/>
+              <a:t>statements</a:t>
+            </a:r>
+            <a:endParaRPr lang="es-MX" sz="1100" dirty="0"/>
+          </a:p>
+        </p:txBody>
+      </p:sp>
+      <p:cxnSp>
+        <p:nvCxnSpPr>
+          <p:cNvPr id="195" name="Conector recto 194">
+            <a:extLst>
+              <a:ext uri="{FF2B5EF4-FFF2-40B4-BE49-F238E27FC236}">
+                <a16:creationId xmlns:a16="http://schemas.microsoft.com/office/drawing/2014/main" id="{8E5DF9F4-DE7C-8A9B-F9C2-9E5139DB7D75}"/>
+              </a:ext>
+            </a:extLst>
+          </p:cNvPr>
+          <p:cNvCxnSpPr>
+            <a:stCxn id="130" idx="4"/>
+            <a:endCxn id="191" idx="0"/>
+          </p:cNvCxnSpPr>
+          <p:nvPr/>
+        </p:nvCxnSpPr>
+        <p:spPr>
+          <a:xfrm>
+            <a:off x="6018718" y="3571685"/>
+            <a:ext cx="1877059" cy="502424"/>
+          </a:xfrm>
+          <a:prstGeom prst="line">
+            <a:avLst/>
+          </a:prstGeom>
+        </p:spPr>
+        <p:style>
+          <a:lnRef idx="1">
+            <a:schemeClr val="accent1"/>
+          </a:lnRef>
+          <a:fillRef idx="0">
+            <a:schemeClr val="accent1"/>
+          </a:fillRef>
+          <a:effectRef idx="0">
+            <a:schemeClr val="accent1"/>
+          </a:effectRef>
+          <a:fontRef idx="minor">
+            <a:schemeClr val="tx1"/>
+          </a:fontRef>
+        </p:style>
+      </p:cxnSp>
+      <p:cxnSp>
+        <p:nvCxnSpPr>
+          <p:cNvPr id="197" name="Conector recto 196">
+            <a:extLst>
+              <a:ext uri="{FF2B5EF4-FFF2-40B4-BE49-F238E27FC236}">
+                <a16:creationId xmlns:a16="http://schemas.microsoft.com/office/drawing/2014/main" id="{02FD139A-6DE1-85D6-11C2-C61A9C0A9D81}"/>
+              </a:ext>
+            </a:extLst>
+          </p:cNvPr>
+          <p:cNvCxnSpPr>
+            <a:stCxn id="130" idx="4"/>
+            <a:endCxn id="193" idx="0"/>
+          </p:cNvCxnSpPr>
+          <p:nvPr/>
+        </p:nvCxnSpPr>
+        <p:spPr>
+          <a:xfrm>
+            <a:off x="6018718" y="3571685"/>
+            <a:ext cx="2877259" cy="551555"/>
+          </a:xfrm>
+          <a:prstGeom prst="line">
+            <a:avLst/>
+          </a:prstGeom>
+        </p:spPr>
+        <p:style>
+          <a:lnRef idx="1">
+            <a:schemeClr val="accent1"/>
+          </a:lnRef>
+          <a:fillRef idx="0">
+            <a:schemeClr val="accent1"/>
+          </a:fillRef>
+          <a:effectRef idx="0">
+            <a:schemeClr val="accent1"/>
+          </a:effectRef>
+          <a:fontRef idx="minor">
+            <a:schemeClr val="tx1"/>
+          </a:fontRef>
+        </p:style>
+      </p:cxnSp>
+      <p:cxnSp>
+        <p:nvCxnSpPr>
+          <p:cNvPr id="199" name="Conector recto 198">
+            <a:extLst>
+              <a:ext uri="{FF2B5EF4-FFF2-40B4-BE49-F238E27FC236}">
+                <a16:creationId xmlns:a16="http://schemas.microsoft.com/office/drawing/2014/main" id="{392EDC6E-F8B4-6C88-DC04-ADD9472488E2}"/>
+              </a:ext>
+            </a:extLst>
+          </p:cNvPr>
+          <p:cNvCxnSpPr>
+            <a:stCxn id="130" idx="4"/>
+            <a:endCxn id="192" idx="0"/>
+          </p:cNvCxnSpPr>
+          <p:nvPr/>
+        </p:nvCxnSpPr>
+        <p:spPr>
+          <a:xfrm>
+            <a:off x="6018718" y="3571685"/>
+            <a:ext cx="3877459" cy="500536"/>
+          </a:xfrm>
+          <a:prstGeom prst="line">
+            <a:avLst/>
+          </a:prstGeom>
+        </p:spPr>
+        <p:style>
+          <a:lnRef idx="1">
+            <a:schemeClr val="accent1"/>
+          </a:lnRef>
+          <a:fillRef idx="0">
+            <a:schemeClr val="accent1"/>
+          </a:fillRef>
+          <a:effectRef idx="0">
+            <a:schemeClr val="accent1"/>
+          </a:effectRef>
+          <a:fontRef idx="minor">
+            <a:schemeClr val="tx1"/>
+          </a:fontRef>
+        </p:style>
+      </p:cxnSp>
+      <p:sp>
+        <p:nvSpPr>
+          <p:cNvPr id="203" name="CuadroTexto 202">
+            <a:extLst>
+              <a:ext uri="{FF2B5EF4-FFF2-40B4-BE49-F238E27FC236}">
+                <a16:creationId xmlns:a16="http://schemas.microsoft.com/office/drawing/2014/main" id="{2CB166B4-2246-6D0B-12E3-B67447422C16}"/>
               </a:ext>
             </a:extLst>
           </p:cNvPr>
@@ -7475,8 +8960,8 @@
         </p:nvSpPr>
         <p:spPr>
           <a:xfrm>
-            <a:off x="4762500" y="781050"/>
-            <a:ext cx="1037143" cy="369332"/>
+            <a:off x="2306037" y="6359009"/>
+            <a:ext cx="6096000" cy="369332"/>
           </a:xfrm>
           <a:prstGeom prst="rect">
             <a:avLst/>
@@ -7484,18 +8969,304 @@
           <a:noFill/>
         </p:spPr>
         <p:txBody>
-          <a:bodyPr wrap="none" rtlCol="0">
+          <a:bodyPr wrap="square">
             <a:spAutoFit/>
           </a:bodyPr>
           <a:lstStyle/>
           <a:p>
             <a:r>
-              <a:rPr lang="es-MX"/>
-              <a:t>Program</a:t>
-            </a:r>
-          </a:p>
-        </p:txBody>
-      </p:sp>
+              <a:rPr lang="es-MX" dirty="0" err="1"/>
+              <a:t>expression</a:t>
+            </a:r>
+            <a:r>
+              <a:rPr lang="es-MX" dirty="0"/>
+              <a:t> </a:t>
+            </a:r>
+            <a:r>
+              <a:rPr lang="es-MX" dirty="0" err="1"/>
+              <a:t>comparison_operator</a:t>
+            </a:r>
+            <a:r>
+              <a:rPr lang="es-MX" dirty="0"/>
+              <a:t> </a:t>
+            </a:r>
+            <a:r>
+              <a:rPr lang="es-MX" dirty="0" err="1"/>
+              <a:t>expression</a:t>
+            </a:r>
+            <a:endParaRPr lang="es-MX" dirty="0"/>
+          </a:p>
+        </p:txBody>
+      </p:sp>
+      <p:sp>
+        <p:nvSpPr>
+          <p:cNvPr id="204" name="Elipse 203">
+            <a:extLst>
+              <a:ext uri="{FF2B5EF4-FFF2-40B4-BE49-F238E27FC236}">
+                <a16:creationId xmlns:a16="http://schemas.microsoft.com/office/drawing/2014/main" id="{BCB91D32-14DE-0DE9-9962-00FBC0FE45B1}"/>
+              </a:ext>
+            </a:extLst>
+          </p:cNvPr>
+          <p:cNvSpPr/>
+          <p:nvPr/>
+        </p:nvSpPr>
+        <p:spPr>
+          <a:xfrm>
+            <a:off x="4524756" y="4753973"/>
+            <a:ext cx="1147244" cy="220620"/>
+          </a:xfrm>
+          <a:prstGeom prst="ellipse">
+            <a:avLst/>
+          </a:prstGeom>
+        </p:spPr>
+        <p:style>
+          <a:lnRef idx="2">
+            <a:schemeClr val="accent1">
+              <a:shade val="15000"/>
+            </a:schemeClr>
+          </a:lnRef>
+          <a:fillRef idx="1">
+            <a:schemeClr val="accent1"/>
+          </a:fillRef>
+          <a:effectRef idx="0">
+            <a:schemeClr val="accent1"/>
+          </a:effectRef>
+          <a:fontRef idx="minor">
+            <a:schemeClr val="lt1"/>
+          </a:fontRef>
+        </p:style>
+        <p:txBody>
+          <a:bodyPr rtlCol="0" anchor="ctr"/>
+          <a:lstStyle/>
+          <a:p>
+            <a:pPr algn="ctr"/>
+            <a:r>
+              <a:rPr lang="es-MX" sz="1000" dirty="0" err="1"/>
+              <a:t>Expression</a:t>
+            </a:r>
+            <a:endParaRPr lang="es-MX" sz="1000" dirty="0"/>
+          </a:p>
+        </p:txBody>
+      </p:sp>
+      <p:sp>
+        <p:nvSpPr>
+          <p:cNvPr id="205" name="Elipse 204">
+            <a:extLst>
+              <a:ext uri="{FF2B5EF4-FFF2-40B4-BE49-F238E27FC236}">
+                <a16:creationId xmlns:a16="http://schemas.microsoft.com/office/drawing/2014/main" id="{8B43D049-D840-D196-09AE-35931FED3537}"/>
+              </a:ext>
+            </a:extLst>
+          </p:cNvPr>
+          <p:cNvSpPr/>
+          <p:nvPr/>
+        </p:nvSpPr>
+        <p:spPr>
+          <a:xfrm>
+            <a:off x="5757968" y="4758967"/>
+            <a:ext cx="1147244" cy="220620"/>
+          </a:xfrm>
+          <a:prstGeom prst="ellipse">
+            <a:avLst/>
+          </a:prstGeom>
+        </p:spPr>
+        <p:style>
+          <a:lnRef idx="2">
+            <a:schemeClr val="accent1">
+              <a:shade val="15000"/>
+            </a:schemeClr>
+          </a:lnRef>
+          <a:fillRef idx="1">
+            <a:schemeClr val="accent1"/>
+          </a:fillRef>
+          <a:effectRef idx="0">
+            <a:schemeClr val="accent1"/>
+          </a:effectRef>
+          <a:fontRef idx="minor">
+            <a:schemeClr val="lt1"/>
+          </a:fontRef>
+        </p:style>
+        <p:txBody>
+          <a:bodyPr rtlCol="0" anchor="ctr"/>
+          <a:lstStyle/>
+          <a:p>
+            <a:pPr algn="ctr"/>
+            <a:r>
+              <a:rPr lang="es-MX" sz="1000" dirty="0"/>
+              <a:t>&lt;=</a:t>
+            </a:r>
+          </a:p>
+        </p:txBody>
+      </p:sp>
+      <p:sp>
+        <p:nvSpPr>
+          <p:cNvPr id="206" name="Elipse 205">
+            <a:extLst>
+              <a:ext uri="{FF2B5EF4-FFF2-40B4-BE49-F238E27FC236}">
+                <a16:creationId xmlns:a16="http://schemas.microsoft.com/office/drawing/2014/main" id="{2AE5B612-2CAB-5BEC-F37F-743DAB6D73CB}"/>
+              </a:ext>
+            </a:extLst>
+          </p:cNvPr>
+          <p:cNvSpPr/>
+          <p:nvPr/>
+        </p:nvSpPr>
+        <p:spPr>
+          <a:xfrm>
+            <a:off x="6994554" y="4758967"/>
+            <a:ext cx="1147244" cy="220620"/>
+          </a:xfrm>
+          <a:prstGeom prst="ellipse">
+            <a:avLst/>
+          </a:prstGeom>
+        </p:spPr>
+        <p:style>
+          <a:lnRef idx="2">
+            <a:schemeClr val="accent1">
+              <a:shade val="15000"/>
+            </a:schemeClr>
+          </a:lnRef>
+          <a:fillRef idx="1">
+            <a:schemeClr val="accent1"/>
+          </a:fillRef>
+          <a:effectRef idx="0">
+            <a:schemeClr val="accent1"/>
+          </a:effectRef>
+          <a:fontRef idx="minor">
+            <a:schemeClr val="lt1"/>
+          </a:fontRef>
+        </p:style>
+        <p:txBody>
+          <a:bodyPr rtlCol="0" anchor="ctr"/>
+          <a:lstStyle/>
+          <a:p>
+            <a:pPr algn="ctr"/>
+            <a:r>
+              <a:rPr lang="es-MX" sz="1000" dirty="0" err="1"/>
+              <a:t>Expression</a:t>
+            </a:r>
+            <a:endParaRPr lang="es-MX" sz="1000" dirty="0"/>
+          </a:p>
+        </p:txBody>
+      </p:sp>
+      <p:cxnSp>
+        <p:nvCxnSpPr>
+          <p:cNvPr id="208" name="Conector recto 207">
+            <a:extLst>
+              <a:ext uri="{FF2B5EF4-FFF2-40B4-BE49-F238E27FC236}">
+                <a16:creationId xmlns:a16="http://schemas.microsoft.com/office/drawing/2014/main" id="{FC66F752-93C4-5BF2-67C8-7C7574CCE2AE}"/>
+              </a:ext>
+            </a:extLst>
+          </p:cNvPr>
+          <p:cNvCxnSpPr>
+            <a:cxnSpLocks/>
+            <a:stCxn id="140" idx="4"/>
+            <a:endCxn id="204" idx="0"/>
+          </p:cNvCxnSpPr>
+          <p:nvPr/>
+        </p:nvCxnSpPr>
+        <p:spPr>
+          <a:xfrm flipH="1">
+            <a:off x="5098378" y="4463574"/>
+            <a:ext cx="1252890" cy="290399"/>
+          </a:xfrm>
+          <a:prstGeom prst="line">
+            <a:avLst/>
+          </a:prstGeom>
+        </p:spPr>
+        <p:style>
+          <a:lnRef idx="1">
+            <a:schemeClr val="accent1"/>
+          </a:lnRef>
+          <a:fillRef idx="0">
+            <a:schemeClr val="accent1"/>
+          </a:fillRef>
+          <a:effectRef idx="0">
+            <a:schemeClr val="accent1"/>
+          </a:effectRef>
+          <a:fontRef idx="minor">
+            <a:schemeClr val="tx1"/>
+          </a:fontRef>
+        </p:style>
+      </p:cxnSp>
+      <p:cxnSp>
+        <p:nvCxnSpPr>
+          <p:cNvPr id="210" name="Conector recto 209">
+            <a:extLst>
+              <a:ext uri="{FF2B5EF4-FFF2-40B4-BE49-F238E27FC236}">
+                <a16:creationId xmlns:a16="http://schemas.microsoft.com/office/drawing/2014/main" id="{EA88519F-13A3-6F85-CA6D-F99D1552FF56}"/>
+              </a:ext>
+            </a:extLst>
+          </p:cNvPr>
+          <p:cNvCxnSpPr>
+            <a:cxnSpLocks/>
+            <a:stCxn id="140" idx="4"/>
+            <a:endCxn id="205" idx="0"/>
+          </p:cNvCxnSpPr>
+          <p:nvPr/>
+        </p:nvCxnSpPr>
+        <p:spPr>
+          <a:xfrm flipH="1">
+            <a:off x="6331590" y="4463574"/>
+            <a:ext cx="19678" cy="295393"/>
+          </a:xfrm>
+          <a:prstGeom prst="line">
+            <a:avLst/>
+          </a:prstGeom>
+        </p:spPr>
+        <p:style>
+          <a:lnRef idx="1">
+            <a:schemeClr val="accent1"/>
+          </a:lnRef>
+          <a:fillRef idx="0">
+            <a:schemeClr val="accent1"/>
+          </a:fillRef>
+          <a:effectRef idx="0">
+            <a:schemeClr val="accent1"/>
+          </a:effectRef>
+          <a:fontRef idx="minor">
+            <a:schemeClr val="tx1"/>
+          </a:fontRef>
+        </p:style>
+      </p:cxnSp>
+      <p:cxnSp>
+        <p:nvCxnSpPr>
+          <p:cNvPr id="212" name="Conector recto 211">
+            <a:extLst>
+              <a:ext uri="{FF2B5EF4-FFF2-40B4-BE49-F238E27FC236}">
+                <a16:creationId xmlns:a16="http://schemas.microsoft.com/office/drawing/2014/main" id="{952EF567-6BCB-D505-43C1-A418DA8DE86F}"/>
+              </a:ext>
+            </a:extLst>
+          </p:cNvPr>
+          <p:cNvCxnSpPr>
+            <a:cxnSpLocks/>
+            <a:stCxn id="140" idx="4"/>
+            <a:endCxn id="206" idx="0"/>
+          </p:cNvCxnSpPr>
+          <p:nvPr/>
+        </p:nvCxnSpPr>
+        <p:spPr>
+          <a:xfrm>
+            <a:off x="6351268" y="4463574"/>
+            <a:ext cx="1216908" cy="295393"/>
+          </a:xfrm>
+          <a:prstGeom prst="line">
+            <a:avLst/>
+          </a:prstGeom>
+        </p:spPr>
+        <p:style>
+          <a:lnRef idx="1">
+            <a:schemeClr val="accent1"/>
+          </a:lnRef>
+          <a:fillRef idx="0">
+            <a:schemeClr val="accent1"/>
+          </a:fillRef>
+          <a:effectRef idx="0">
+            <a:schemeClr val="accent1"/>
+          </a:effectRef>
+          <a:fontRef idx="minor">
+            <a:schemeClr val="tx1"/>
+          </a:fontRef>
+        </p:style>
+      </p:cxnSp>
     </p:spTree>
     <p:extLst>
       <p:ext uri="{BB962C8B-B14F-4D97-AF65-F5344CB8AC3E}">

</xml_diff>

<commit_message>
Fix unsupported character exception and set window icon
</commit_message>
<xml_diff>
--- a/doc/compilador.pptx
+++ b/doc/compilador.pptx
@@ -430,7 +430,7 @@
             <a:fld id="{73C3BD54-29B9-3D42-B178-776ED395AA85}" type="datetimeFigureOut">
               <a:rPr lang="en-US" smtClean="0"/>
               <a:pPr/>
-              <a:t>2/13/2024</a:t>
+              <a:t>2/15/2024</a:t>
             </a:fld>
             <a:endParaRPr lang="en-US" sz="1400"/>
           </a:p>
@@ -680,7 +680,7 @@
           <a:p>
             <a:fld id="{73C3BD54-29B9-3D42-B178-776ED395AA85}" type="datetimeFigureOut">
               <a:rPr lang="en-US" smtClean="0"/>
-              <a:t>2/13/2024</a:t>
+              <a:t>2/15/2024</a:t>
             </a:fld>
             <a:endParaRPr lang="en-US"/>
           </a:p>
@@ -994,7 +994,7 @@
           <a:p>
             <a:fld id="{73C3BD54-29B9-3D42-B178-776ED395AA85}" type="datetimeFigureOut">
               <a:rPr lang="en-US" smtClean="0"/>
-              <a:t>2/13/2024</a:t>
+              <a:t>2/15/2024</a:t>
             </a:fld>
             <a:endParaRPr lang="en-US"/>
           </a:p>
@@ -1508,7 +1508,7 @@
           <a:p>
             <a:fld id="{73C3BD54-29B9-3D42-B178-776ED395AA85}" type="datetimeFigureOut">
               <a:rPr lang="en-US" smtClean="0"/>
-              <a:t>2/13/2024</a:t>
+              <a:t>2/15/2024</a:t>
             </a:fld>
             <a:endParaRPr lang="en-US"/>
           </a:p>
@@ -1939,7 +1939,7 @@
           <a:p>
             <a:fld id="{73C3BD54-29B9-3D42-B178-776ED395AA85}" type="datetimeFigureOut">
               <a:rPr lang="en-US" smtClean="0"/>
-              <a:t>2/13/2024</a:t>
+              <a:t>2/15/2024</a:t>
             </a:fld>
             <a:endParaRPr lang="en-US"/>
           </a:p>
@@ -2204,7 +2204,7 @@
           <a:p>
             <a:fld id="{73C3BD54-29B9-3D42-B178-776ED395AA85}" type="datetimeFigureOut">
               <a:rPr lang="en-US" smtClean="0"/>
-              <a:t>2/13/2024</a:t>
+              <a:t>2/15/2024</a:t>
             </a:fld>
             <a:endParaRPr lang="en-US"/>
           </a:p>
@@ -2778,7 +2778,7 @@
           <a:p>
             <a:fld id="{73C3BD54-29B9-3D42-B178-776ED395AA85}" type="datetimeFigureOut">
               <a:rPr lang="en-US" smtClean="0"/>
-              <a:t>2/13/2024</a:t>
+              <a:t>2/15/2024</a:t>
             </a:fld>
             <a:endParaRPr lang="en-US"/>
           </a:p>
@@ -3081,7 +3081,7 @@
           <a:p>
             <a:fld id="{73C3BD54-29B9-3D42-B178-776ED395AA85}" type="datetimeFigureOut">
               <a:rPr lang="en-US" smtClean="0"/>
-              <a:t>2/13/2024</a:t>
+              <a:t>2/15/2024</a:t>
             </a:fld>
             <a:endParaRPr lang="en-US"/>
           </a:p>
@@ -3356,7 +3356,7 @@
           <a:p>
             <a:fld id="{73C3BD54-29B9-3D42-B178-776ED395AA85}" type="datetimeFigureOut">
               <a:rPr lang="en-US" smtClean="0"/>
-              <a:t>2/13/2024</a:t>
+              <a:t>2/15/2024</a:t>
             </a:fld>
             <a:endParaRPr lang="en-US"/>
           </a:p>
@@ -3827,7 +3827,7 @@
           <a:p>
             <a:fld id="{73C3BD54-29B9-3D42-B178-776ED395AA85}" type="datetimeFigureOut">
               <a:rPr lang="en-US" smtClean="0"/>
-              <a:t>2/13/2024</a:t>
+              <a:t>2/15/2024</a:t>
             </a:fld>
             <a:endParaRPr lang="en-US"/>
           </a:p>
@@ -4278,7 +4278,7 @@
           <a:p>
             <a:fld id="{73C3BD54-29B9-3D42-B178-776ED395AA85}" type="datetimeFigureOut">
               <a:rPr lang="en-US" smtClean="0"/>
-              <a:t>2/13/2024</a:t>
+              <a:t>2/15/2024</a:t>
             </a:fld>
             <a:endParaRPr lang="en-US"/>
           </a:p>
@@ -4674,7 +4674,7 @@
             <a:fld id="{73C3BD54-29B9-3D42-B178-776ED395AA85}" type="datetimeFigureOut">
               <a:rPr lang="en-US" smtClean="0"/>
               <a:pPr/>
-              <a:t>2/13/2024</a:t>
+              <a:t>2/15/2024</a:t>
             </a:fld>
             <a:endParaRPr lang="en-US" dirty="0"/>
           </a:p>
@@ -6724,7 +6724,7 @@
             </a:pPr>
             <a:r>
               <a:rPr lang="en-US" sz="1300" dirty="0"/>
-              <a:t>    int b = a + 3;</a:t>
+              <a:t>    int b = 3;</a:t>
             </a:r>
           </a:p>
           <a:p>
@@ -6740,7 +6740,7 @@
             </a:pPr>
             <a:r>
               <a:rPr lang="en-US" sz="1300" dirty="0"/>
-              <a:t>    if(a &lt;= 10){</a:t>
+              <a:t>    if(b &lt;= 10){</a:t>
             </a:r>
           </a:p>
           <a:p>
@@ -6788,15 +6788,7 @@
             </a:pPr>
             <a:r>
               <a:rPr lang="en-US" sz="1300" dirty="0"/>
-              <a:t>    </a:t>
-            </a:r>
-            <a:r>
-              <a:rPr lang="en-US" sz="1300" dirty="0" err="1"/>
-              <a:t>mostrar</a:t>
-            </a:r>
-            <a:r>
-              <a:rPr lang="en-US" sz="1300" dirty="0"/>
-              <a:t>(a);</a:t>
+              <a:t>}</a:t>
             </a:r>
           </a:p>
           <a:p>
@@ -6810,67 +6802,21 @@
               <a:buFont typeface="System Font Regular"/>
               <a:buChar char="–"/>
             </a:pPr>
-            <a:r>
-              <a:rPr lang="en-US" sz="1300" dirty="0"/>
-              <a:t>    </a:t>
-            </a:r>
-            <a:r>
-              <a:rPr lang="en-US" sz="1300" dirty="0" err="1"/>
-              <a:t>mostrar</a:t>
-            </a:r>
-            <a:r>
-              <a:rPr lang="en-US" sz="1300" dirty="0"/>
-              <a:t>(x);</a:t>
-            </a:r>
-          </a:p>
-          <a:p>
-            <a:pPr indent="-228600">
+            <a:endParaRPr lang="en-US" sz="1300" dirty="0"/>
+          </a:p>
+          <a:p>
+            <a:pPr>
               <a:lnSpc>
                 <a:spcPct val="90000"/>
               </a:lnSpc>
               <a:spcAft>
                 <a:spcPts val="600"/>
               </a:spcAft>
-              <a:buFont typeface="System Font Regular"/>
-              <a:buChar char="–"/>
             </a:pPr>
-            <a:r>
-              <a:rPr lang="en-US" sz="1300" dirty="0"/>
-              <a:t>}</a:t>
-            </a:r>
-          </a:p>
-        </p:txBody>
-      </p:sp>
-      <p:pic>
-        <p:nvPicPr>
-          <p:cNvPr id="48" name="Imagen 47">
-            <a:extLst>
-              <a:ext uri="{FF2B5EF4-FFF2-40B4-BE49-F238E27FC236}">
-                <a16:creationId xmlns:a16="http://schemas.microsoft.com/office/drawing/2014/main" id="{048B195F-3E7C-2873-6E9E-A1B9D825D2A5}"/>
-              </a:ext>
-            </a:extLst>
-          </p:cNvPr>
-          <p:cNvPicPr>
-            <a:picLocks noChangeAspect="1"/>
-          </p:cNvPicPr>
-          <p:nvPr/>
-        </p:nvPicPr>
-        <p:blipFill>
-          <a:blip r:embed="rId2"/>
-          <a:stretch>
-            <a:fillRect/>
-          </a:stretch>
-        </p:blipFill>
-        <p:spPr>
-          <a:xfrm>
-            <a:off x="5296282" y="1497220"/>
-            <a:ext cx="5325457" cy="4127230"/>
-          </a:xfrm>
-          <a:prstGeom prst="rect">
-            <a:avLst/>
-          </a:prstGeom>
-        </p:spPr>
-      </p:pic>
+            <a:endParaRPr lang="en-US" sz="1300" dirty="0" err="1"/>
+          </a:p>
+        </p:txBody>
+      </p:sp>
       <p:sp>
         <p:nvSpPr>
           <p:cNvPr id="107" name="Cross 98">
@@ -6999,6 +6945,36 @@
           </a:p>
         </p:txBody>
       </p:sp>
+      <p:pic>
+        <p:nvPicPr>
+          <p:cNvPr id="3" name="Imagen 2">
+            <a:extLst>
+              <a:ext uri="{FF2B5EF4-FFF2-40B4-BE49-F238E27FC236}">
+                <a16:creationId xmlns:a16="http://schemas.microsoft.com/office/drawing/2014/main" id="{D7AB8791-BE86-7081-CFB6-496627906AD0}"/>
+              </a:ext>
+            </a:extLst>
+          </p:cNvPr>
+          <p:cNvPicPr>
+            <a:picLocks noChangeAspect="1"/>
+          </p:cNvPicPr>
+          <p:nvPr/>
+        </p:nvPicPr>
+        <p:blipFill>
+          <a:blip r:embed="rId2"/>
+          <a:stretch>
+            <a:fillRect/>
+          </a:stretch>
+        </p:blipFill>
+        <p:spPr>
+          <a:xfrm>
+            <a:off x="5559271" y="1204721"/>
+            <a:ext cx="5658396" cy="4414182"/>
+          </a:xfrm>
+          <a:prstGeom prst="rect">
+            <a:avLst/>
+          </a:prstGeom>
+        </p:spPr>
+      </p:pic>
     </p:spTree>
     <p:extLst>
       <p:ext uri="{BB962C8B-B14F-4D97-AF65-F5344CB8AC3E}">
@@ -7093,7 +7069,7 @@
         </p:nvSpPr>
         <p:spPr>
           <a:xfrm>
-            <a:off x="208981" y="4120055"/>
+            <a:off x="208981" y="4188756"/>
             <a:ext cx="721644" cy="332855"/>
           </a:xfrm>
           <a:prstGeom prst="ellipse">
@@ -7143,8 +7119,8 @@
         </p:nvSpPr>
         <p:spPr>
           <a:xfrm>
-            <a:off x="1217874" y="4080403"/>
-            <a:ext cx="518572" cy="472440"/>
+            <a:off x="1044707" y="4091912"/>
+            <a:ext cx="772635" cy="472440"/>
           </a:xfrm>
           <a:prstGeom prst="ellipse">
             <a:avLst/>
@@ -7192,7 +7168,7 @@
         </p:nvSpPr>
         <p:spPr>
           <a:xfrm>
-            <a:off x="1837118" y="4091912"/>
+            <a:off x="1897569" y="4091912"/>
             <a:ext cx="518572" cy="472440"/>
           </a:xfrm>
           <a:prstGeom prst="ellipse">
@@ -7241,7 +7217,7 @@
         </p:nvSpPr>
         <p:spPr>
           <a:xfrm>
-            <a:off x="2578413" y="4013991"/>
+            <a:off x="2588027" y="3996916"/>
             <a:ext cx="1005735" cy="594360"/>
           </a:xfrm>
           <a:prstGeom prst="ellipse">
@@ -7271,7 +7247,7 @@
             <a:pPr algn="ctr"/>
             <a:r>
               <a:rPr lang="es-MX" sz="1100" dirty="0" err="1"/>
-              <a:t>number</a:t>
+              <a:t>string</a:t>
             </a:r>
             <a:endParaRPr lang="es-MX" sz="1100" dirty="0"/>
           </a:p>
@@ -7292,7 +7268,7 @@
         <p:spPr>
           <a:xfrm>
             <a:off x="840621" y="3126612"/>
-            <a:ext cx="2405589" cy="332855"/>
+            <a:ext cx="2612696" cy="332855"/>
           </a:xfrm>
           <a:prstGeom prst="ellipse">
             <a:avLst/>
@@ -7321,7 +7297,7 @@
             <a:pPr algn="ctr"/>
             <a:r>
               <a:rPr lang="es-MX" sz="1100" dirty="0" err="1"/>
-              <a:t>variable_declarationInt</a:t>
+              <a:t>variable_declarationString</a:t>
             </a:r>
             <a:endParaRPr lang="es-MX" sz="1100" dirty="0"/>
           </a:p>
@@ -7346,7 +7322,7 @@
         <p:spPr>
           <a:xfrm flipH="1">
             <a:off x="569803" y="3459467"/>
-            <a:ext cx="1473613" cy="660588"/>
+            <a:ext cx="1577166" cy="729289"/>
           </a:xfrm>
           <a:prstGeom prst="line">
             <a:avLst/>
@@ -7385,8 +7361,8 @@
         </p:nvCxnSpPr>
         <p:spPr>
           <a:xfrm flipH="1">
-            <a:off x="1477160" y="3459467"/>
-            <a:ext cx="566256" cy="620936"/>
+            <a:off x="1431025" y="3459467"/>
+            <a:ext cx="715944" cy="632445"/>
           </a:xfrm>
           <a:prstGeom prst="line">
             <a:avLst/>
@@ -7425,8 +7401,8 @@
         </p:nvCxnSpPr>
         <p:spPr>
           <a:xfrm>
-            <a:off x="2043416" y="3459467"/>
-            <a:ext cx="52988" cy="632445"/>
+            <a:off x="2146969" y="3459467"/>
+            <a:ext cx="9886" cy="632445"/>
           </a:xfrm>
           <a:prstGeom prst="line">
             <a:avLst/>
@@ -7465,8 +7441,8 @@
         </p:nvCxnSpPr>
         <p:spPr>
           <a:xfrm>
-            <a:off x="2043416" y="3459467"/>
-            <a:ext cx="1037865" cy="554524"/>
+            <a:off x="2146969" y="3459467"/>
+            <a:ext cx="943926" cy="537449"/>
           </a:xfrm>
           <a:prstGeom prst="line">
             <a:avLst/>
@@ -7501,7 +7477,7 @@
         </p:nvSpPr>
         <p:spPr>
           <a:xfrm>
-            <a:off x="3755315" y="4066319"/>
+            <a:off x="3750222" y="4091912"/>
             <a:ext cx="518572" cy="472440"/>
           </a:xfrm>
           <a:prstGeom prst="ellipse">
@@ -7546,6 +7522,7 @@
             </a:extLst>
           </p:cNvPr>
           <p:cNvCxnSpPr>
+            <a:cxnSpLocks/>
             <a:stCxn id="93" idx="4"/>
             <a:endCxn id="113" idx="0"/>
           </p:cNvCxnSpPr>
@@ -7553,8 +7530,8 @@
         </p:nvCxnSpPr>
         <p:spPr>
           <a:xfrm>
-            <a:off x="2043416" y="3459467"/>
-            <a:ext cx="1971185" cy="606852"/>
+            <a:off x="2146969" y="3459467"/>
+            <a:ext cx="1862539" cy="632445"/>
           </a:xfrm>
           <a:prstGeom prst="line">
             <a:avLst/>
@@ -7589,7 +7566,7 @@
         </p:nvSpPr>
         <p:spPr>
           <a:xfrm>
-            <a:off x="4264419" y="1983255"/>
+            <a:off x="5931939" y="1353085"/>
             <a:ext cx="2405589" cy="332855"/>
           </a:xfrm>
           <a:prstGeom prst="ellipse">
@@ -7669,7 +7646,7 @@
             <a:pPr algn="ctr"/>
             <a:r>
               <a:rPr lang="es-MX" sz="1100" dirty="0" err="1"/>
-              <a:t>statements</a:t>
+              <a:t>statement</a:t>
             </a:r>
             <a:endParaRPr lang="es-MX" sz="1100" dirty="0"/>
           </a:p>
@@ -7685,6 +7662,7 @@
             </a:extLst>
           </p:cNvPr>
           <p:cNvCxnSpPr>
+            <a:cxnSpLocks/>
             <a:stCxn id="117" idx="4"/>
             <a:endCxn id="120" idx="0"/>
           </p:cNvCxnSpPr>
@@ -7692,8 +7670,8 @@
         </p:nvCxnSpPr>
         <p:spPr>
           <a:xfrm flipH="1">
-            <a:off x="2043415" y="2316110"/>
-            <a:ext cx="3423799" cy="213512"/>
+            <a:off x="2043415" y="1685940"/>
+            <a:ext cx="5091319" cy="843682"/>
           </a:xfrm>
           <a:prstGeom prst="line">
             <a:avLst/>
@@ -7724,6 +7702,7 @@
             </a:extLst>
           </p:cNvPr>
           <p:cNvCxnSpPr>
+            <a:cxnSpLocks/>
             <a:stCxn id="120" idx="4"/>
             <a:endCxn id="93" idx="0"/>
           </p:cNvCxnSpPr>
@@ -7732,7 +7711,7 @@
         <p:spPr>
           <a:xfrm>
             <a:off x="2043415" y="2862477"/>
-            <a:ext cx="1" cy="264135"/>
+            <a:ext cx="103554" cy="264135"/>
           </a:xfrm>
           <a:prstGeom prst="line">
             <a:avLst/>
@@ -7767,7 +7746,7 @@
         </p:nvSpPr>
         <p:spPr>
           <a:xfrm>
-            <a:off x="4810048" y="2619735"/>
+            <a:off x="7016718" y="2696049"/>
             <a:ext cx="2405589" cy="332855"/>
           </a:xfrm>
           <a:prstGeom prst="ellipse">
@@ -7797,7 +7776,7 @@
             <a:pPr algn="ctr"/>
             <a:r>
               <a:rPr lang="es-MX" sz="1100" dirty="0" err="1"/>
-              <a:t>statements</a:t>
+              <a:t>statement</a:t>
             </a:r>
             <a:endParaRPr lang="es-MX" sz="1100" dirty="0"/>
           </a:p>
@@ -7820,8 +7799,8 @@
         </p:nvCxnSpPr>
         <p:spPr>
           <a:xfrm>
-            <a:off x="5467214" y="2316110"/>
-            <a:ext cx="545629" cy="303625"/>
+            <a:off x="7134734" y="1685940"/>
+            <a:ext cx="1084779" cy="1010109"/>
           </a:xfrm>
           <a:prstGeom prst="line">
             <a:avLst/>
@@ -7856,7 +7835,7 @@
         </p:nvSpPr>
         <p:spPr>
           <a:xfrm>
-            <a:off x="4815923" y="3238830"/>
+            <a:off x="6852460" y="3399589"/>
             <a:ext cx="2405589" cy="332855"/>
           </a:xfrm>
           <a:prstGeom prst="ellipse">
@@ -7909,9 +7888,9 @@
           <p:nvPr/>
         </p:nvCxnSpPr>
         <p:spPr>
-          <a:xfrm>
-            <a:off x="6012843" y="2952590"/>
-            <a:ext cx="5875" cy="286240"/>
+          <a:xfrm flipH="1">
+            <a:off x="8055255" y="3028904"/>
+            <a:ext cx="164258" cy="370685"/>
           </a:xfrm>
           <a:prstGeom prst="line">
             <a:avLst/>
@@ -7946,7 +7925,7 @@
         </p:nvSpPr>
         <p:spPr>
           <a:xfrm>
-            <a:off x="4327246" y="4116027"/>
+            <a:off x="6363783" y="4283916"/>
             <a:ext cx="724221" cy="332855"/>
           </a:xfrm>
           <a:prstGeom prst="ellipse">
@@ -7996,7 +7975,7 @@
         </p:nvSpPr>
         <p:spPr>
           <a:xfrm>
-            <a:off x="5207927" y="4080403"/>
+            <a:off x="7244464" y="4248292"/>
             <a:ext cx="518572" cy="434891"/>
           </a:xfrm>
           <a:prstGeom prst="ellipse">
@@ -8045,7 +8024,7 @@
         </p:nvSpPr>
         <p:spPr>
           <a:xfrm>
-            <a:off x="7029833" y="4093725"/>
+            <a:off x="9066370" y="4261614"/>
             <a:ext cx="518572" cy="434891"/>
           </a:xfrm>
           <a:prstGeom prst="ellipse">
@@ -8094,7 +8073,7 @@
         </p:nvSpPr>
         <p:spPr>
           <a:xfrm>
-            <a:off x="5797323" y="4130719"/>
+            <a:off x="7833860" y="4298608"/>
             <a:ext cx="1107889" cy="332855"/>
           </a:xfrm>
           <a:prstGeom prst="ellipse">
@@ -8194,7 +8173,7 @@
         </p:nvSpPr>
         <p:spPr>
           <a:xfrm>
-            <a:off x="4948642" y="1327683"/>
+            <a:off x="3736456" y="1318185"/>
             <a:ext cx="1037143" cy="369332"/>
           </a:xfrm>
           <a:prstGeom prst="ellipse">
@@ -8244,7 +8223,7 @@
         </p:nvSpPr>
         <p:spPr>
           <a:xfrm>
-            <a:off x="3226919" y="1460795"/>
+            <a:off x="5120503" y="1283293"/>
             <a:ext cx="693420" cy="472440"/>
           </a:xfrm>
           <a:prstGeom prst="ellipse">
@@ -8293,7 +8272,7 @@
         </p:nvSpPr>
         <p:spPr>
           <a:xfrm>
-            <a:off x="7265740" y="1460795"/>
+            <a:off x="8455545" y="1310978"/>
             <a:ext cx="693420" cy="472440"/>
           </a:xfrm>
           <a:prstGeom prst="ellipse">
@@ -8330,85 +8309,6 @@
       </p:sp>
       <p:cxnSp>
         <p:nvCxnSpPr>
-          <p:cNvPr id="156" name="Conector recto 155">
-            <a:extLst>
-              <a:ext uri="{FF2B5EF4-FFF2-40B4-BE49-F238E27FC236}">
-                <a16:creationId xmlns:a16="http://schemas.microsoft.com/office/drawing/2014/main" id="{15BDFD08-A7CD-C7C9-526C-6969F0385201}"/>
-              </a:ext>
-            </a:extLst>
-          </p:cNvPr>
-          <p:cNvCxnSpPr>
-            <a:cxnSpLocks/>
-            <a:stCxn id="153" idx="2"/>
-            <a:endCxn id="154" idx="7"/>
-          </p:cNvCxnSpPr>
-          <p:nvPr/>
-        </p:nvCxnSpPr>
-        <p:spPr>
-          <a:xfrm flipH="1">
-            <a:off x="3818790" y="1512349"/>
-            <a:ext cx="1129852" cy="17633"/>
-          </a:xfrm>
-          <a:prstGeom prst="line">
-            <a:avLst/>
-          </a:prstGeom>
-        </p:spPr>
-        <p:style>
-          <a:lnRef idx="1">
-            <a:schemeClr val="accent1"/>
-          </a:lnRef>
-          <a:fillRef idx="0">
-            <a:schemeClr val="accent1"/>
-          </a:fillRef>
-          <a:effectRef idx="0">
-            <a:schemeClr val="accent1"/>
-          </a:effectRef>
-          <a:fontRef idx="minor">
-            <a:schemeClr val="tx1"/>
-          </a:fontRef>
-        </p:style>
-      </p:cxnSp>
-      <p:cxnSp>
-        <p:nvCxnSpPr>
-          <p:cNvPr id="157" name="Conector recto 156">
-            <a:extLst>
-              <a:ext uri="{FF2B5EF4-FFF2-40B4-BE49-F238E27FC236}">
-                <a16:creationId xmlns:a16="http://schemas.microsoft.com/office/drawing/2014/main" id="{92EBEC7C-D82A-2349-AE61-13F7F4C4192C}"/>
-              </a:ext>
-            </a:extLst>
-          </p:cNvPr>
-          <p:cNvCxnSpPr>
-            <a:stCxn id="153" idx="6"/>
-            <a:endCxn id="155" idx="1"/>
-          </p:cNvCxnSpPr>
-          <p:nvPr/>
-        </p:nvCxnSpPr>
-        <p:spPr>
-          <a:xfrm>
-            <a:off x="5985785" y="1512349"/>
-            <a:ext cx="1381504" cy="17633"/>
-          </a:xfrm>
-          <a:prstGeom prst="line">
-            <a:avLst/>
-          </a:prstGeom>
-        </p:spPr>
-        <p:style>
-          <a:lnRef idx="1">
-            <a:schemeClr val="accent1"/>
-          </a:lnRef>
-          <a:fillRef idx="0">
-            <a:schemeClr val="accent1"/>
-          </a:fillRef>
-          <a:effectRef idx="0">
-            <a:schemeClr val="accent1"/>
-          </a:effectRef>
-          <a:fontRef idx="minor">
-            <a:schemeClr val="tx1"/>
-          </a:fontRef>
-        </p:style>
-      </p:cxnSp>
-      <p:cxnSp>
-        <p:nvCxnSpPr>
           <p:cNvPr id="165" name="Conector recto 164">
             <a:extLst>
               <a:ext uri="{FF2B5EF4-FFF2-40B4-BE49-F238E27FC236}">
@@ -8462,48 +8362,9 @@
           <p:nvPr/>
         </p:nvCxnSpPr>
         <p:spPr>
-          <a:xfrm>
-            <a:off x="5467214" y="1059180"/>
-            <a:ext cx="0" cy="268503"/>
-          </a:xfrm>
-          <a:prstGeom prst="line">
-            <a:avLst/>
-          </a:prstGeom>
-        </p:spPr>
-        <p:style>
-          <a:lnRef idx="1">
-            <a:schemeClr val="accent1"/>
-          </a:lnRef>
-          <a:fillRef idx="0">
-            <a:schemeClr val="accent1"/>
-          </a:fillRef>
-          <a:effectRef idx="0">
-            <a:schemeClr val="accent1"/>
-          </a:effectRef>
-          <a:fontRef idx="minor">
-            <a:schemeClr val="tx1"/>
-          </a:fontRef>
-        </p:style>
-      </p:cxnSp>
-      <p:cxnSp>
-        <p:nvCxnSpPr>
-          <p:cNvPr id="169" name="Conector recto 168">
-            <a:extLst>
-              <a:ext uri="{FF2B5EF4-FFF2-40B4-BE49-F238E27FC236}">
-                <a16:creationId xmlns:a16="http://schemas.microsoft.com/office/drawing/2014/main" id="{DC487E71-C61E-4E53-C140-1E01371FB7B1}"/>
-              </a:ext>
-            </a:extLst>
-          </p:cNvPr>
-          <p:cNvCxnSpPr>
-            <a:stCxn id="153" idx="4"/>
-            <a:endCxn id="117" idx="0"/>
-          </p:cNvCxnSpPr>
-          <p:nvPr/>
-        </p:nvCxnSpPr>
-        <p:spPr>
-          <a:xfrm>
-            <a:off x="5467214" y="1697015"/>
-            <a:ext cx="0" cy="286240"/>
+          <a:xfrm flipH="1">
+            <a:off x="4255028" y="1059180"/>
+            <a:ext cx="1212186" cy="259005"/>
           </a:xfrm>
           <a:prstGeom prst="line">
             <a:avLst/>
@@ -8534,14 +8395,14 @@
             </a:extLst>
           </p:cNvPr>
           <p:cNvCxnSpPr>
-            <a:stCxn id="130" idx="4"/>
+            <a:cxnSpLocks/>
             <a:endCxn id="135" idx="0"/>
           </p:cNvCxnSpPr>
           <p:nvPr/>
         </p:nvCxnSpPr>
         <p:spPr>
           <a:xfrm flipH="1">
-            <a:off x="4689357" y="3571685"/>
+            <a:off x="6725894" y="3739574"/>
             <a:ext cx="1329361" cy="544342"/>
           </a:xfrm>
           <a:prstGeom prst="line">
@@ -8573,14 +8434,14 @@
             </a:extLst>
           </p:cNvPr>
           <p:cNvCxnSpPr>
-            <a:stCxn id="130" idx="4"/>
+            <a:cxnSpLocks/>
             <a:endCxn id="138" idx="0"/>
           </p:cNvCxnSpPr>
           <p:nvPr/>
         </p:nvCxnSpPr>
         <p:spPr>
           <a:xfrm flipH="1">
-            <a:off x="5467213" y="3571685"/>
+            <a:off x="7503750" y="3739574"/>
             <a:ext cx="551505" cy="508718"/>
           </a:xfrm>
           <a:prstGeom prst="line">
@@ -8613,14 +8474,13 @@
           </p:cNvPr>
           <p:cNvCxnSpPr>
             <a:cxnSpLocks/>
-            <a:stCxn id="130" idx="4"/>
             <a:endCxn id="140" idx="0"/>
           </p:cNvCxnSpPr>
           <p:nvPr/>
         </p:nvCxnSpPr>
         <p:spPr>
           <a:xfrm>
-            <a:off x="6018718" y="3571685"/>
+            <a:off x="8055255" y="3739574"/>
             <a:ext cx="332550" cy="559034"/>
           </a:xfrm>
           <a:prstGeom prst="line">
@@ -8652,14 +8512,14 @@
             </a:extLst>
           </p:cNvPr>
           <p:cNvCxnSpPr>
-            <a:stCxn id="130" idx="4"/>
+            <a:cxnSpLocks/>
             <a:endCxn id="139" idx="0"/>
           </p:cNvCxnSpPr>
           <p:nvPr/>
         </p:nvCxnSpPr>
         <p:spPr>
           <a:xfrm>
-            <a:off x="6018718" y="3571685"/>
+            <a:off x="8055255" y="3739574"/>
             <a:ext cx="1270401" cy="522040"/>
           </a:xfrm>
           <a:prstGeom prst="line">
@@ -8695,7 +8555,7 @@
         </p:nvSpPr>
         <p:spPr>
           <a:xfrm>
-            <a:off x="7636491" y="4074109"/>
+            <a:off x="9673028" y="4241998"/>
             <a:ext cx="518572" cy="434891"/>
           </a:xfrm>
           <a:prstGeom prst="ellipse">
@@ -8744,7 +8604,7 @@
         </p:nvSpPr>
         <p:spPr>
           <a:xfrm>
-            <a:off x="9636891" y="4072221"/>
+            <a:off x="11673428" y="4240110"/>
             <a:ext cx="518572" cy="434891"/>
           </a:xfrm>
           <a:prstGeom prst="ellipse">
@@ -8793,7 +8653,7 @@
         </p:nvSpPr>
         <p:spPr>
           <a:xfrm>
-            <a:off x="8244310" y="4123240"/>
+            <a:off x="10280847" y="4291129"/>
             <a:ext cx="1303334" cy="332855"/>
           </a:xfrm>
           <a:prstGeom prst="ellipse">
@@ -8839,14 +8699,14 @@
             </a:extLst>
           </p:cNvPr>
           <p:cNvCxnSpPr>
-            <a:stCxn id="130" idx="4"/>
+            <a:cxnSpLocks/>
             <a:endCxn id="191" idx="0"/>
           </p:cNvCxnSpPr>
           <p:nvPr/>
         </p:nvCxnSpPr>
         <p:spPr>
           <a:xfrm>
-            <a:off x="6018718" y="3571685"/>
+            <a:off x="8055255" y="3739574"/>
             <a:ext cx="1877059" cy="502424"/>
           </a:xfrm>
           <a:prstGeom prst="line">
@@ -8878,14 +8738,14 @@
             </a:extLst>
           </p:cNvPr>
           <p:cNvCxnSpPr>
-            <a:stCxn id="130" idx="4"/>
+            <a:cxnSpLocks/>
             <a:endCxn id="193" idx="0"/>
           </p:cNvCxnSpPr>
           <p:nvPr/>
         </p:nvCxnSpPr>
         <p:spPr>
           <a:xfrm>
-            <a:off x="6018718" y="3571685"/>
+            <a:off x="8055255" y="3739574"/>
             <a:ext cx="2877259" cy="551555"/>
           </a:xfrm>
           <a:prstGeom prst="line">
@@ -8917,14 +8777,14 @@
             </a:extLst>
           </p:cNvPr>
           <p:cNvCxnSpPr>
-            <a:stCxn id="130" idx="4"/>
+            <a:cxnSpLocks/>
             <a:endCxn id="192" idx="0"/>
           </p:cNvCxnSpPr>
           <p:nvPr/>
         </p:nvCxnSpPr>
         <p:spPr>
           <a:xfrm>
-            <a:off x="6018718" y="3571685"/>
+            <a:off x="8055255" y="3739574"/>
             <a:ext cx="3877459" cy="500536"/>
           </a:xfrm>
           <a:prstGeom prst="line">
@@ -8948,58 +8808,6 @@
       </p:cxnSp>
       <p:sp>
         <p:nvSpPr>
-          <p:cNvPr id="203" name="CuadroTexto 202">
-            <a:extLst>
-              <a:ext uri="{FF2B5EF4-FFF2-40B4-BE49-F238E27FC236}">
-                <a16:creationId xmlns:a16="http://schemas.microsoft.com/office/drawing/2014/main" id="{2CB166B4-2246-6D0B-12E3-B67447422C16}"/>
-              </a:ext>
-            </a:extLst>
-          </p:cNvPr>
-          <p:cNvSpPr txBox="1"/>
-          <p:nvPr/>
-        </p:nvSpPr>
-        <p:spPr>
-          <a:xfrm>
-            <a:off x="2306037" y="6359009"/>
-            <a:ext cx="6096000" cy="369332"/>
-          </a:xfrm>
-          <a:prstGeom prst="rect">
-            <a:avLst/>
-          </a:prstGeom>
-          <a:noFill/>
-        </p:spPr>
-        <p:txBody>
-          <a:bodyPr wrap="square">
-            <a:spAutoFit/>
-          </a:bodyPr>
-          <a:lstStyle/>
-          <a:p>
-            <a:r>
-              <a:rPr lang="es-MX" dirty="0" err="1"/>
-              <a:t>expression</a:t>
-            </a:r>
-            <a:r>
-              <a:rPr lang="es-MX" dirty="0"/>
-              <a:t> </a:t>
-            </a:r>
-            <a:r>
-              <a:rPr lang="es-MX" dirty="0" err="1"/>
-              <a:t>comparison_operator</a:t>
-            </a:r>
-            <a:r>
-              <a:rPr lang="es-MX" dirty="0"/>
-              <a:t> </a:t>
-            </a:r>
-            <a:r>
-              <a:rPr lang="es-MX" dirty="0" err="1"/>
-              <a:t>expression</a:t>
-            </a:r>
-            <a:endParaRPr lang="es-MX" dirty="0"/>
-          </a:p>
-        </p:txBody>
-      </p:sp>
-      <p:sp>
-        <p:nvSpPr>
           <p:cNvPr id="204" name="Elipse 203">
             <a:extLst>
               <a:ext uri="{FF2B5EF4-FFF2-40B4-BE49-F238E27FC236}">
@@ -9012,7 +8820,7 @@
         </p:nvSpPr>
         <p:spPr>
           <a:xfrm>
-            <a:off x="4524756" y="4753973"/>
+            <a:off x="6561293" y="4921862"/>
             <a:ext cx="1147244" cy="220620"/>
           </a:xfrm>
           <a:prstGeom prst="ellipse">
@@ -9062,7 +8870,7 @@
         </p:nvSpPr>
         <p:spPr>
           <a:xfrm>
-            <a:off x="5757968" y="4758967"/>
+            <a:off x="7794505" y="4926856"/>
             <a:ext cx="1147244" cy="220620"/>
           </a:xfrm>
           <a:prstGeom prst="ellipse">
@@ -9111,7 +8919,7 @@
         </p:nvSpPr>
         <p:spPr>
           <a:xfrm>
-            <a:off x="6994554" y="4758967"/>
+            <a:off x="9031091" y="4926856"/>
             <a:ext cx="1147244" cy="220620"/>
           </a:xfrm>
           <a:prstGeom prst="ellipse">
@@ -9165,7 +8973,7 @@
         </p:nvCxnSpPr>
         <p:spPr>
           <a:xfrm flipH="1">
-            <a:off x="5098378" y="4463574"/>
+            <a:off x="7134915" y="4631463"/>
             <a:ext cx="1252890" cy="290399"/>
           </a:xfrm>
           <a:prstGeom prst="line">
@@ -9205,7 +9013,7 @@
         </p:nvCxnSpPr>
         <p:spPr>
           <a:xfrm flipH="1">
-            <a:off x="6331590" y="4463574"/>
+            <a:off x="8368127" y="4631463"/>
             <a:ext cx="19678" cy="295393"/>
           </a:xfrm>
           <a:prstGeom prst="line">
@@ -9245,8 +9053,1812 @@
         </p:nvCxnSpPr>
         <p:spPr>
           <a:xfrm>
-            <a:off x="6351268" y="4463574"/>
+            <a:off x="8387805" y="4631463"/>
             <a:ext cx="1216908" cy="295393"/>
+          </a:xfrm>
+          <a:prstGeom prst="line">
+            <a:avLst/>
+          </a:prstGeom>
+        </p:spPr>
+        <p:style>
+          <a:lnRef idx="1">
+            <a:schemeClr val="accent1"/>
+          </a:lnRef>
+          <a:fillRef idx="0">
+            <a:schemeClr val="accent1"/>
+          </a:fillRef>
+          <a:effectRef idx="0">
+            <a:schemeClr val="accent1"/>
+          </a:effectRef>
+          <a:fontRef idx="minor">
+            <a:schemeClr val="tx1"/>
+          </a:fontRef>
+        </p:style>
+      </p:cxnSp>
+      <p:cxnSp>
+        <p:nvCxnSpPr>
+          <p:cNvPr id="19" name="Conector recto 18">
+            <a:extLst>
+              <a:ext uri="{FF2B5EF4-FFF2-40B4-BE49-F238E27FC236}">
+                <a16:creationId xmlns:a16="http://schemas.microsoft.com/office/drawing/2014/main" id="{9EAEC1CF-C09F-0E04-21C2-4844EE098586}"/>
+              </a:ext>
+            </a:extLst>
+          </p:cNvPr>
+          <p:cNvCxnSpPr>
+            <a:stCxn id="6" idx="4"/>
+            <a:endCxn id="154" idx="0"/>
+          </p:cNvCxnSpPr>
+          <p:nvPr/>
+        </p:nvCxnSpPr>
+        <p:spPr>
+          <a:xfrm flipH="1">
+            <a:off x="5467213" y="1059180"/>
+            <a:ext cx="1" cy="224113"/>
+          </a:xfrm>
+          <a:prstGeom prst="line">
+            <a:avLst/>
+          </a:prstGeom>
+        </p:spPr>
+        <p:style>
+          <a:lnRef idx="1">
+            <a:schemeClr val="accent1"/>
+          </a:lnRef>
+          <a:fillRef idx="0">
+            <a:schemeClr val="accent1"/>
+          </a:fillRef>
+          <a:effectRef idx="0">
+            <a:schemeClr val="accent1"/>
+          </a:effectRef>
+          <a:fontRef idx="minor">
+            <a:schemeClr val="tx1"/>
+          </a:fontRef>
+        </p:style>
+      </p:cxnSp>
+      <p:cxnSp>
+        <p:nvCxnSpPr>
+          <p:cNvPr id="21" name="Conector recto 20">
+            <a:extLst>
+              <a:ext uri="{FF2B5EF4-FFF2-40B4-BE49-F238E27FC236}">
+                <a16:creationId xmlns:a16="http://schemas.microsoft.com/office/drawing/2014/main" id="{AFEAD1B8-32D5-0A54-B095-5BB67D8362BE}"/>
+              </a:ext>
+            </a:extLst>
+          </p:cNvPr>
+          <p:cNvCxnSpPr>
+            <a:stCxn id="6" idx="4"/>
+            <a:endCxn id="117" idx="0"/>
+          </p:cNvCxnSpPr>
+          <p:nvPr/>
+        </p:nvCxnSpPr>
+        <p:spPr>
+          <a:xfrm>
+            <a:off x="5467214" y="1059180"/>
+            <a:ext cx="1667520" cy="293905"/>
+          </a:xfrm>
+          <a:prstGeom prst="line">
+            <a:avLst/>
+          </a:prstGeom>
+        </p:spPr>
+        <p:style>
+          <a:lnRef idx="1">
+            <a:schemeClr val="accent1"/>
+          </a:lnRef>
+          <a:fillRef idx="0">
+            <a:schemeClr val="accent1"/>
+          </a:fillRef>
+          <a:effectRef idx="0">
+            <a:schemeClr val="accent1"/>
+          </a:effectRef>
+          <a:fontRef idx="minor">
+            <a:schemeClr val="tx1"/>
+          </a:fontRef>
+        </p:style>
+      </p:cxnSp>
+      <p:cxnSp>
+        <p:nvCxnSpPr>
+          <p:cNvPr id="23" name="Conector recto 22">
+            <a:extLst>
+              <a:ext uri="{FF2B5EF4-FFF2-40B4-BE49-F238E27FC236}">
+                <a16:creationId xmlns:a16="http://schemas.microsoft.com/office/drawing/2014/main" id="{05DF9740-818C-F37E-48E4-1FB9779BB691}"/>
+              </a:ext>
+            </a:extLst>
+          </p:cNvPr>
+          <p:cNvCxnSpPr>
+            <a:stCxn id="6" idx="4"/>
+            <a:endCxn id="155" idx="0"/>
+          </p:cNvCxnSpPr>
+          <p:nvPr/>
+        </p:nvCxnSpPr>
+        <p:spPr>
+          <a:xfrm>
+            <a:off x="5467214" y="1059180"/>
+            <a:ext cx="3335041" cy="251798"/>
+          </a:xfrm>
+          <a:prstGeom prst="line">
+            <a:avLst/>
+          </a:prstGeom>
+        </p:spPr>
+        <p:style>
+          <a:lnRef idx="1">
+            <a:schemeClr val="accent1"/>
+          </a:lnRef>
+          <a:fillRef idx="0">
+            <a:schemeClr val="accent1"/>
+          </a:fillRef>
+          <a:effectRef idx="0">
+            <a:schemeClr val="accent1"/>
+          </a:effectRef>
+          <a:fontRef idx="minor">
+            <a:schemeClr val="tx1"/>
+          </a:fontRef>
+        </p:style>
+      </p:cxnSp>
+      <p:sp>
+        <p:nvSpPr>
+          <p:cNvPr id="45" name="Elipse 44">
+            <a:extLst>
+              <a:ext uri="{FF2B5EF4-FFF2-40B4-BE49-F238E27FC236}">
+                <a16:creationId xmlns:a16="http://schemas.microsoft.com/office/drawing/2014/main" id="{BAC71F1E-FA7E-EBC2-7892-579283DF17CC}"/>
+              </a:ext>
+            </a:extLst>
+          </p:cNvPr>
+          <p:cNvSpPr/>
+          <p:nvPr/>
+        </p:nvSpPr>
+        <p:spPr>
+          <a:xfrm>
+            <a:off x="2637087" y="5659309"/>
+            <a:ext cx="721644" cy="332855"/>
+          </a:xfrm>
+          <a:prstGeom prst="ellipse">
+            <a:avLst/>
+          </a:prstGeom>
+        </p:spPr>
+        <p:style>
+          <a:lnRef idx="2">
+            <a:schemeClr val="accent1">
+              <a:shade val="15000"/>
+            </a:schemeClr>
+          </a:lnRef>
+          <a:fillRef idx="1">
+            <a:schemeClr val="accent1"/>
+          </a:fillRef>
+          <a:effectRef idx="0">
+            <a:schemeClr val="accent1"/>
+          </a:effectRef>
+          <a:fontRef idx="minor">
+            <a:schemeClr val="lt1"/>
+          </a:fontRef>
+        </p:style>
+        <p:txBody>
+          <a:bodyPr rtlCol="0" anchor="ctr"/>
+          <a:lstStyle/>
+          <a:p>
+            <a:pPr algn="ctr"/>
+            <a:r>
+              <a:rPr lang="es-MX" sz="1100" dirty="0" err="1"/>
+              <a:t>pr</a:t>
+            </a:r>
+            <a:endParaRPr lang="es-MX" sz="1100" dirty="0"/>
+          </a:p>
+        </p:txBody>
+      </p:sp>
+      <p:sp>
+        <p:nvSpPr>
+          <p:cNvPr id="46" name="Elipse 45">
+            <a:extLst>
+              <a:ext uri="{FF2B5EF4-FFF2-40B4-BE49-F238E27FC236}">
+                <a16:creationId xmlns:a16="http://schemas.microsoft.com/office/drawing/2014/main" id="{EF109FF0-C13C-835B-6EE8-DDA32C3D138C}"/>
+              </a:ext>
+            </a:extLst>
+          </p:cNvPr>
+          <p:cNvSpPr/>
+          <p:nvPr/>
+        </p:nvSpPr>
+        <p:spPr>
+          <a:xfrm>
+            <a:off x="3472813" y="5562465"/>
+            <a:ext cx="772635" cy="472440"/>
+          </a:xfrm>
+          <a:prstGeom prst="ellipse">
+            <a:avLst/>
+          </a:prstGeom>
+        </p:spPr>
+        <p:style>
+          <a:lnRef idx="2">
+            <a:schemeClr val="accent1">
+              <a:shade val="15000"/>
+            </a:schemeClr>
+          </a:lnRef>
+          <a:fillRef idx="1">
+            <a:schemeClr val="accent1"/>
+          </a:fillRef>
+          <a:effectRef idx="0">
+            <a:schemeClr val="accent1"/>
+          </a:effectRef>
+          <a:fontRef idx="minor">
+            <a:schemeClr val="lt1"/>
+          </a:fontRef>
+        </p:style>
+        <p:txBody>
+          <a:bodyPr rtlCol="0" anchor="ctr"/>
+          <a:lstStyle/>
+          <a:p>
+            <a:pPr algn="ctr"/>
+            <a:r>
+              <a:rPr lang="es-MX" sz="1100" dirty="0"/>
+              <a:t>id</a:t>
+            </a:r>
+          </a:p>
+        </p:txBody>
+      </p:sp>
+      <p:sp>
+        <p:nvSpPr>
+          <p:cNvPr id="47" name="Elipse 46">
+            <a:extLst>
+              <a:ext uri="{FF2B5EF4-FFF2-40B4-BE49-F238E27FC236}">
+                <a16:creationId xmlns:a16="http://schemas.microsoft.com/office/drawing/2014/main" id="{5E781B89-63A7-C6AE-C80D-FB0CBC0F46D8}"/>
+              </a:ext>
+            </a:extLst>
+          </p:cNvPr>
+          <p:cNvSpPr/>
+          <p:nvPr/>
+        </p:nvSpPr>
+        <p:spPr>
+          <a:xfrm>
+            <a:off x="4325675" y="5562465"/>
+            <a:ext cx="518572" cy="472440"/>
+          </a:xfrm>
+          <a:prstGeom prst="ellipse">
+            <a:avLst/>
+          </a:prstGeom>
+        </p:spPr>
+        <p:style>
+          <a:lnRef idx="2">
+            <a:schemeClr val="accent1">
+              <a:shade val="15000"/>
+            </a:schemeClr>
+          </a:lnRef>
+          <a:fillRef idx="1">
+            <a:schemeClr val="accent1"/>
+          </a:fillRef>
+          <a:effectRef idx="0">
+            <a:schemeClr val="accent1"/>
+          </a:effectRef>
+          <a:fontRef idx="minor">
+            <a:schemeClr val="lt1"/>
+          </a:fontRef>
+        </p:style>
+        <p:txBody>
+          <a:bodyPr rtlCol="0" anchor="ctr"/>
+          <a:lstStyle/>
+          <a:p>
+            <a:pPr algn="ctr"/>
+            <a:r>
+              <a:rPr lang="es-MX" sz="1100" dirty="0"/>
+              <a:t>=</a:t>
+            </a:r>
+          </a:p>
+        </p:txBody>
+      </p:sp>
+      <p:sp>
+        <p:nvSpPr>
+          <p:cNvPr id="48" name="Elipse 47">
+            <a:extLst>
+              <a:ext uri="{FF2B5EF4-FFF2-40B4-BE49-F238E27FC236}">
+                <a16:creationId xmlns:a16="http://schemas.microsoft.com/office/drawing/2014/main" id="{D391CDE3-78FB-DBA6-AFFB-66E98DB2B3F2}"/>
+              </a:ext>
+            </a:extLst>
+          </p:cNvPr>
+          <p:cNvSpPr/>
+          <p:nvPr/>
+        </p:nvSpPr>
+        <p:spPr>
+          <a:xfrm>
+            <a:off x="5016133" y="5467469"/>
+            <a:ext cx="1005735" cy="594360"/>
+          </a:xfrm>
+          <a:prstGeom prst="ellipse">
+            <a:avLst/>
+          </a:prstGeom>
+        </p:spPr>
+        <p:style>
+          <a:lnRef idx="2">
+            <a:schemeClr val="accent1">
+              <a:shade val="15000"/>
+            </a:schemeClr>
+          </a:lnRef>
+          <a:fillRef idx="1">
+            <a:schemeClr val="accent1"/>
+          </a:fillRef>
+          <a:effectRef idx="0">
+            <a:schemeClr val="accent1"/>
+          </a:effectRef>
+          <a:fontRef idx="minor">
+            <a:schemeClr val="lt1"/>
+          </a:fontRef>
+        </p:style>
+        <p:txBody>
+          <a:bodyPr rtlCol="0" anchor="ctr"/>
+          <a:lstStyle/>
+          <a:p>
+            <a:pPr algn="ctr"/>
+            <a:r>
+              <a:rPr lang="es-MX" sz="1100" dirty="0" err="1"/>
+              <a:t>number</a:t>
+            </a:r>
+            <a:endParaRPr lang="es-MX" sz="1100" dirty="0"/>
+          </a:p>
+        </p:txBody>
+      </p:sp>
+      <p:sp>
+        <p:nvSpPr>
+          <p:cNvPr id="49" name="Elipse 48">
+            <a:extLst>
+              <a:ext uri="{FF2B5EF4-FFF2-40B4-BE49-F238E27FC236}">
+                <a16:creationId xmlns:a16="http://schemas.microsoft.com/office/drawing/2014/main" id="{A4580A90-5E9B-FF5E-8E06-0CE991152078}"/>
+              </a:ext>
+            </a:extLst>
+          </p:cNvPr>
+          <p:cNvSpPr/>
+          <p:nvPr/>
+        </p:nvSpPr>
+        <p:spPr>
+          <a:xfrm>
+            <a:off x="3268727" y="4597165"/>
+            <a:ext cx="2612696" cy="332855"/>
+          </a:xfrm>
+          <a:prstGeom prst="ellipse">
+            <a:avLst/>
+          </a:prstGeom>
+        </p:spPr>
+        <p:style>
+          <a:lnRef idx="2">
+            <a:schemeClr val="accent1">
+              <a:shade val="15000"/>
+            </a:schemeClr>
+          </a:lnRef>
+          <a:fillRef idx="1">
+            <a:schemeClr val="accent1"/>
+          </a:fillRef>
+          <a:effectRef idx="0">
+            <a:schemeClr val="accent1"/>
+          </a:effectRef>
+          <a:fontRef idx="minor">
+            <a:schemeClr val="lt1"/>
+          </a:fontRef>
+        </p:style>
+        <p:txBody>
+          <a:bodyPr rtlCol="0" anchor="ctr"/>
+          <a:lstStyle/>
+          <a:p>
+            <a:pPr algn="ctr"/>
+            <a:r>
+              <a:rPr lang="es-MX" sz="1100" dirty="0" err="1"/>
+              <a:t>variable_declarationInt</a:t>
+            </a:r>
+            <a:endParaRPr lang="es-MX" sz="1100" dirty="0"/>
+          </a:p>
+        </p:txBody>
+      </p:sp>
+      <p:cxnSp>
+        <p:nvCxnSpPr>
+          <p:cNvPr id="50" name="Conector recto 49">
+            <a:extLst>
+              <a:ext uri="{FF2B5EF4-FFF2-40B4-BE49-F238E27FC236}">
+                <a16:creationId xmlns:a16="http://schemas.microsoft.com/office/drawing/2014/main" id="{7EBD6D87-B259-49D5-2333-E54C3728213F}"/>
+              </a:ext>
+            </a:extLst>
+          </p:cNvPr>
+          <p:cNvCxnSpPr>
+            <a:cxnSpLocks/>
+            <a:stCxn id="49" idx="4"/>
+            <a:endCxn id="45" idx="0"/>
+          </p:cNvCxnSpPr>
+          <p:nvPr/>
+        </p:nvCxnSpPr>
+        <p:spPr>
+          <a:xfrm flipH="1">
+            <a:off x="2997909" y="4930020"/>
+            <a:ext cx="1577166" cy="729289"/>
+          </a:xfrm>
+          <a:prstGeom prst="line">
+            <a:avLst/>
+          </a:prstGeom>
+        </p:spPr>
+        <p:style>
+          <a:lnRef idx="1">
+            <a:schemeClr val="accent1"/>
+          </a:lnRef>
+          <a:fillRef idx="0">
+            <a:schemeClr val="accent1"/>
+          </a:fillRef>
+          <a:effectRef idx="0">
+            <a:schemeClr val="accent1"/>
+          </a:effectRef>
+          <a:fontRef idx="minor">
+            <a:schemeClr val="tx1"/>
+          </a:fontRef>
+        </p:style>
+      </p:cxnSp>
+      <p:cxnSp>
+        <p:nvCxnSpPr>
+          <p:cNvPr id="51" name="Conector recto 50">
+            <a:extLst>
+              <a:ext uri="{FF2B5EF4-FFF2-40B4-BE49-F238E27FC236}">
+                <a16:creationId xmlns:a16="http://schemas.microsoft.com/office/drawing/2014/main" id="{12E90B68-F9B6-563B-2F77-970D333E5624}"/>
+              </a:ext>
+            </a:extLst>
+          </p:cNvPr>
+          <p:cNvCxnSpPr>
+            <a:cxnSpLocks/>
+            <a:stCxn id="49" idx="4"/>
+            <a:endCxn id="46" idx="0"/>
+          </p:cNvCxnSpPr>
+          <p:nvPr/>
+        </p:nvCxnSpPr>
+        <p:spPr>
+          <a:xfrm flipH="1">
+            <a:off x="3859131" y="4930020"/>
+            <a:ext cx="715944" cy="632445"/>
+          </a:xfrm>
+          <a:prstGeom prst="line">
+            <a:avLst/>
+          </a:prstGeom>
+        </p:spPr>
+        <p:style>
+          <a:lnRef idx="1">
+            <a:schemeClr val="accent1"/>
+          </a:lnRef>
+          <a:fillRef idx="0">
+            <a:schemeClr val="accent1"/>
+          </a:fillRef>
+          <a:effectRef idx="0">
+            <a:schemeClr val="accent1"/>
+          </a:effectRef>
+          <a:fontRef idx="minor">
+            <a:schemeClr val="tx1"/>
+          </a:fontRef>
+        </p:style>
+      </p:cxnSp>
+      <p:cxnSp>
+        <p:nvCxnSpPr>
+          <p:cNvPr id="52" name="Conector recto 51">
+            <a:extLst>
+              <a:ext uri="{FF2B5EF4-FFF2-40B4-BE49-F238E27FC236}">
+                <a16:creationId xmlns:a16="http://schemas.microsoft.com/office/drawing/2014/main" id="{FDE8A29D-070E-6195-C505-DAF777BC35D4}"/>
+              </a:ext>
+            </a:extLst>
+          </p:cNvPr>
+          <p:cNvCxnSpPr>
+            <a:cxnSpLocks/>
+            <a:stCxn id="49" idx="4"/>
+            <a:endCxn id="47" idx="0"/>
+          </p:cNvCxnSpPr>
+          <p:nvPr/>
+        </p:nvCxnSpPr>
+        <p:spPr>
+          <a:xfrm>
+            <a:off x="4575075" y="4930020"/>
+            <a:ext cx="9886" cy="632445"/>
+          </a:xfrm>
+          <a:prstGeom prst="line">
+            <a:avLst/>
+          </a:prstGeom>
+        </p:spPr>
+        <p:style>
+          <a:lnRef idx="1">
+            <a:schemeClr val="accent1"/>
+          </a:lnRef>
+          <a:fillRef idx="0">
+            <a:schemeClr val="accent1"/>
+          </a:fillRef>
+          <a:effectRef idx="0">
+            <a:schemeClr val="accent1"/>
+          </a:effectRef>
+          <a:fontRef idx="minor">
+            <a:schemeClr val="tx1"/>
+          </a:fontRef>
+        </p:style>
+      </p:cxnSp>
+      <p:cxnSp>
+        <p:nvCxnSpPr>
+          <p:cNvPr id="53" name="Conector recto 52">
+            <a:extLst>
+              <a:ext uri="{FF2B5EF4-FFF2-40B4-BE49-F238E27FC236}">
+                <a16:creationId xmlns:a16="http://schemas.microsoft.com/office/drawing/2014/main" id="{309498D9-A431-A426-8637-E24435E619F3}"/>
+              </a:ext>
+            </a:extLst>
+          </p:cNvPr>
+          <p:cNvCxnSpPr>
+            <a:cxnSpLocks/>
+            <a:stCxn id="49" idx="4"/>
+            <a:endCxn id="48" idx="0"/>
+          </p:cNvCxnSpPr>
+          <p:nvPr/>
+        </p:nvCxnSpPr>
+        <p:spPr>
+          <a:xfrm>
+            <a:off x="4575075" y="4930020"/>
+            <a:ext cx="943926" cy="537449"/>
+          </a:xfrm>
+          <a:prstGeom prst="line">
+            <a:avLst/>
+          </a:prstGeom>
+        </p:spPr>
+        <p:style>
+          <a:lnRef idx="1">
+            <a:schemeClr val="accent1"/>
+          </a:lnRef>
+          <a:fillRef idx="0">
+            <a:schemeClr val="accent1"/>
+          </a:fillRef>
+          <a:effectRef idx="0">
+            <a:schemeClr val="accent1"/>
+          </a:effectRef>
+          <a:fontRef idx="minor">
+            <a:schemeClr val="tx1"/>
+          </a:fontRef>
+        </p:style>
+      </p:cxnSp>
+      <p:sp>
+        <p:nvSpPr>
+          <p:cNvPr id="54" name="Elipse 53">
+            <a:extLst>
+              <a:ext uri="{FF2B5EF4-FFF2-40B4-BE49-F238E27FC236}">
+                <a16:creationId xmlns:a16="http://schemas.microsoft.com/office/drawing/2014/main" id="{39A2721A-3BDD-F250-8486-B675EAC66C19}"/>
+              </a:ext>
+            </a:extLst>
+          </p:cNvPr>
+          <p:cNvSpPr/>
+          <p:nvPr/>
+        </p:nvSpPr>
+        <p:spPr>
+          <a:xfrm>
+            <a:off x="6056565" y="5570287"/>
+            <a:ext cx="518572" cy="472440"/>
+          </a:xfrm>
+          <a:prstGeom prst="ellipse">
+            <a:avLst/>
+          </a:prstGeom>
+        </p:spPr>
+        <p:style>
+          <a:lnRef idx="2">
+            <a:schemeClr val="accent1">
+              <a:shade val="15000"/>
+            </a:schemeClr>
+          </a:lnRef>
+          <a:fillRef idx="1">
+            <a:schemeClr val="accent1"/>
+          </a:fillRef>
+          <a:effectRef idx="0">
+            <a:schemeClr val="accent1"/>
+          </a:effectRef>
+          <a:fontRef idx="minor">
+            <a:schemeClr val="lt1"/>
+          </a:fontRef>
+        </p:style>
+        <p:txBody>
+          <a:bodyPr rtlCol="0" anchor="ctr"/>
+          <a:lstStyle/>
+          <a:p>
+            <a:pPr algn="ctr"/>
+            <a:r>
+              <a:rPr lang="es-MX" sz="1100" dirty="0"/>
+              <a:t>;</a:t>
+            </a:r>
+          </a:p>
+        </p:txBody>
+      </p:sp>
+      <p:cxnSp>
+        <p:nvCxnSpPr>
+          <p:cNvPr id="55" name="Conector recto 54">
+            <a:extLst>
+              <a:ext uri="{FF2B5EF4-FFF2-40B4-BE49-F238E27FC236}">
+                <a16:creationId xmlns:a16="http://schemas.microsoft.com/office/drawing/2014/main" id="{A37AB5E9-4E32-18C4-C231-CB5FE98F1BF3}"/>
+              </a:ext>
+            </a:extLst>
+          </p:cNvPr>
+          <p:cNvCxnSpPr>
+            <a:cxnSpLocks/>
+            <a:stCxn id="49" idx="4"/>
+            <a:endCxn id="54" idx="0"/>
+          </p:cNvCxnSpPr>
+          <p:nvPr/>
+        </p:nvCxnSpPr>
+        <p:spPr>
+          <a:xfrm>
+            <a:off x="4575075" y="4930020"/>
+            <a:ext cx="1740776" cy="640267"/>
+          </a:xfrm>
+          <a:prstGeom prst="line">
+            <a:avLst/>
+          </a:prstGeom>
+        </p:spPr>
+        <p:style>
+          <a:lnRef idx="1">
+            <a:schemeClr val="accent1"/>
+          </a:lnRef>
+          <a:fillRef idx="0">
+            <a:schemeClr val="accent1"/>
+          </a:fillRef>
+          <a:effectRef idx="0">
+            <a:schemeClr val="accent1"/>
+          </a:effectRef>
+          <a:fontRef idx="minor">
+            <a:schemeClr val="tx1"/>
+          </a:fontRef>
+        </p:style>
+      </p:cxnSp>
+      <p:sp>
+        <p:nvSpPr>
+          <p:cNvPr id="56" name="Elipse 55">
+            <a:extLst>
+              <a:ext uri="{FF2B5EF4-FFF2-40B4-BE49-F238E27FC236}">
+                <a16:creationId xmlns:a16="http://schemas.microsoft.com/office/drawing/2014/main" id="{F77FCB92-9C6C-674A-BA0C-6FF51F9E88C1}"/>
+              </a:ext>
+            </a:extLst>
+          </p:cNvPr>
+          <p:cNvSpPr/>
+          <p:nvPr/>
+        </p:nvSpPr>
+        <p:spPr>
+          <a:xfrm>
+            <a:off x="3314339" y="2939207"/>
+            <a:ext cx="2405589" cy="332855"/>
+          </a:xfrm>
+          <a:prstGeom prst="ellipse">
+            <a:avLst/>
+          </a:prstGeom>
+        </p:spPr>
+        <p:style>
+          <a:lnRef idx="2">
+            <a:schemeClr val="accent1">
+              <a:shade val="15000"/>
+            </a:schemeClr>
+          </a:lnRef>
+          <a:fillRef idx="1">
+            <a:schemeClr val="accent1"/>
+          </a:fillRef>
+          <a:effectRef idx="0">
+            <a:schemeClr val="accent1"/>
+          </a:effectRef>
+          <a:fontRef idx="minor">
+            <a:schemeClr val="lt1"/>
+          </a:fontRef>
+        </p:style>
+        <p:txBody>
+          <a:bodyPr rtlCol="0" anchor="ctr"/>
+          <a:lstStyle/>
+          <a:p>
+            <a:pPr algn="ctr"/>
+            <a:r>
+              <a:rPr lang="es-MX" sz="1100" dirty="0" err="1"/>
+              <a:t>statement</a:t>
+            </a:r>
+            <a:endParaRPr lang="es-MX" sz="1100" dirty="0"/>
+          </a:p>
+        </p:txBody>
+      </p:sp>
+      <p:cxnSp>
+        <p:nvCxnSpPr>
+          <p:cNvPr id="57" name="Conector recto 56">
+            <a:extLst>
+              <a:ext uri="{FF2B5EF4-FFF2-40B4-BE49-F238E27FC236}">
+                <a16:creationId xmlns:a16="http://schemas.microsoft.com/office/drawing/2014/main" id="{33C910E6-2113-1D7C-729F-9446D108FA4E}"/>
+              </a:ext>
+            </a:extLst>
+          </p:cNvPr>
+          <p:cNvCxnSpPr>
+            <a:cxnSpLocks/>
+            <a:stCxn id="56" idx="4"/>
+            <a:endCxn id="49" idx="0"/>
+          </p:cNvCxnSpPr>
+          <p:nvPr/>
+        </p:nvCxnSpPr>
+        <p:spPr>
+          <a:xfrm>
+            <a:off x="4517134" y="3272062"/>
+            <a:ext cx="57941" cy="1325103"/>
+          </a:xfrm>
+          <a:prstGeom prst="line">
+            <a:avLst/>
+          </a:prstGeom>
+        </p:spPr>
+        <p:style>
+          <a:lnRef idx="1">
+            <a:schemeClr val="accent1"/>
+          </a:lnRef>
+          <a:fillRef idx="0">
+            <a:schemeClr val="accent1"/>
+          </a:fillRef>
+          <a:effectRef idx="0">
+            <a:schemeClr val="accent1"/>
+          </a:effectRef>
+          <a:fontRef idx="minor">
+            <a:schemeClr val="tx1"/>
+          </a:fontRef>
+        </p:style>
+      </p:cxnSp>
+      <p:sp>
+        <p:nvSpPr>
+          <p:cNvPr id="64" name="Elipse 63">
+            <a:extLst>
+              <a:ext uri="{FF2B5EF4-FFF2-40B4-BE49-F238E27FC236}">
+                <a16:creationId xmlns:a16="http://schemas.microsoft.com/office/drawing/2014/main" id="{763387F4-F9D0-E568-A3DD-5F5550761147}"/>
+              </a:ext>
+            </a:extLst>
+          </p:cNvPr>
+          <p:cNvSpPr/>
+          <p:nvPr/>
+        </p:nvSpPr>
+        <p:spPr>
+          <a:xfrm>
+            <a:off x="6579936" y="5219042"/>
+            <a:ext cx="1147244" cy="220620"/>
+          </a:xfrm>
+          <a:prstGeom prst="ellipse">
+            <a:avLst/>
+          </a:prstGeom>
+        </p:spPr>
+        <p:style>
+          <a:lnRef idx="2">
+            <a:schemeClr val="accent1">
+              <a:shade val="15000"/>
+            </a:schemeClr>
+          </a:lnRef>
+          <a:fillRef idx="1">
+            <a:schemeClr val="accent1"/>
+          </a:fillRef>
+          <a:effectRef idx="0">
+            <a:schemeClr val="accent1"/>
+          </a:effectRef>
+          <a:fontRef idx="minor">
+            <a:schemeClr val="lt1"/>
+          </a:fontRef>
+        </p:style>
+        <p:txBody>
+          <a:bodyPr rtlCol="0" anchor="ctr"/>
+          <a:lstStyle/>
+          <a:p>
+            <a:pPr algn="ctr"/>
+            <a:r>
+              <a:rPr lang="es-MX" sz="1000" dirty="0"/>
+              <a:t>factor</a:t>
+            </a:r>
+          </a:p>
+        </p:txBody>
+      </p:sp>
+      <p:sp>
+        <p:nvSpPr>
+          <p:cNvPr id="65" name="Elipse 64">
+            <a:extLst>
+              <a:ext uri="{FF2B5EF4-FFF2-40B4-BE49-F238E27FC236}">
+                <a16:creationId xmlns:a16="http://schemas.microsoft.com/office/drawing/2014/main" id="{51E2ED8F-324C-8F9C-5971-071B5B280679}"/>
+              </a:ext>
+            </a:extLst>
+          </p:cNvPr>
+          <p:cNvSpPr/>
+          <p:nvPr/>
+        </p:nvSpPr>
+        <p:spPr>
+          <a:xfrm>
+            <a:off x="6579936" y="5548999"/>
+            <a:ext cx="1147244" cy="220620"/>
+          </a:xfrm>
+          <a:prstGeom prst="ellipse">
+            <a:avLst/>
+          </a:prstGeom>
+        </p:spPr>
+        <p:style>
+          <a:lnRef idx="2">
+            <a:schemeClr val="accent1">
+              <a:shade val="15000"/>
+            </a:schemeClr>
+          </a:lnRef>
+          <a:fillRef idx="1">
+            <a:schemeClr val="accent1"/>
+          </a:fillRef>
+          <a:effectRef idx="0">
+            <a:schemeClr val="accent1"/>
+          </a:effectRef>
+          <a:fontRef idx="minor">
+            <a:schemeClr val="lt1"/>
+          </a:fontRef>
+        </p:style>
+        <p:txBody>
+          <a:bodyPr rtlCol="0" anchor="ctr"/>
+          <a:lstStyle/>
+          <a:p>
+            <a:pPr algn="ctr"/>
+            <a:r>
+              <a:rPr lang="es-MX" sz="1000" dirty="0"/>
+              <a:t>id</a:t>
+            </a:r>
+          </a:p>
+        </p:txBody>
+      </p:sp>
+      <p:cxnSp>
+        <p:nvCxnSpPr>
+          <p:cNvPr id="68" name="Conector recto 67">
+            <a:extLst>
+              <a:ext uri="{FF2B5EF4-FFF2-40B4-BE49-F238E27FC236}">
+                <a16:creationId xmlns:a16="http://schemas.microsoft.com/office/drawing/2014/main" id="{A8007DE3-8A25-67C1-47E3-962A3C28B012}"/>
+              </a:ext>
+            </a:extLst>
+          </p:cNvPr>
+          <p:cNvCxnSpPr>
+            <a:stCxn id="204" idx="4"/>
+            <a:endCxn id="64" idx="0"/>
+          </p:cNvCxnSpPr>
+          <p:nvPr/>
+        </p:nvCxnSpPr>
+        <p:spPr>
+          <a:xfrm>
+            <a:off x="7134915" y="5142482"/>
+            <a:ext cx="18643" cy="76560"/>
+          </a:xfrm>
+          <a:prstGeom prst="line">
+            <a:avLst/>
+          </a:prstGeom>
+        </p:spPr>
+        <p:style>
+          <a:lnRef idx="1">
+            <a:schemeClr val="accent1"/>
+          </a:lnRef>
+          <a:fillRef idx="0">
+            <a:schemeClr val="accent1"/>
+          </a:fillRef>
+          <a:effectRef idx="0">
+            <a:schemeClr val="accent1"/>
+          </a:effectRef>
+          <a:fontRef idx="minor">
+            <a:schemeClr val="tx1"/>
+          </a:fontRef>
+        </p:style>
+      </p:cxnSp>
+      <p:cxnSp>
+        <p:nvCxnSpPr>
+          <p:cNvPr id="70" name="Conector recto 69">
+            <a:extLst>
+              <a:ext uri="{FF2B5EF4-FFF2-40B4-BE49-F238E27FC236}">
+                <a16:creationId xmlns:a16="http://schemas.microsoft.com/office/drawing/2014/main" id="{A215FD03-C3D9-CD05-D1A7-56637F2CB003}"/>
+              </a:ext>
+            </a:extLst>
+          </p:cNvPr>
+          <p:cNvCxnSpPr>
+            <a:stCxn id="64" idx="4"/>
+            <a:endCxn id="65" idx="0"/>
+          </p:cNvCxnSpPr>
+          <p:nvPr/>
+        </p:nvCxnSpPr>
+        <p:spPr>
+          <a:xfrm>
+            <a:off x="7153558" y="5439662"/>
+            <a:ext cx="0" cy="109337"/>
+          </a:xfrm>
+          <a:prstGeom prst="line">
+            <a:avLst/>
+          </a:prstGeom>
+        </p:spPr>
+        <p:style>
+          <a:lnRef idx="1">
+            <a:schemeClr val="accent1"/>
+          </a:lnRef>
+          <a:fillRef idx="0">
+            <a:schemeClr val="accent1"/>
+          </a:fillRef>
+          <a:effectRef idx="0">
+            <a:schemeClr val="accent1"/>
+          </a:effectRef>
+          <a:fontRef idx="minor">
+            <a:schemeClr val="tx1"/>
+          </a:fontRef>
+        </p:style>
+      </p:cxnSp>
+      <p:sp>
+        <p:nvSpPr>
+          <p:cNvPr id="72" name="Elipse 71">
+            <a:extLst>
+              <a:ext uri="{FF2B5EF4-FFF2-40B4-BE49-F238E27FC236}">
+                <a16:creationId xmlns:a16="http://schemas.microsoft.com/office/drawing/2014/main" id="{9C15506C-C4C2-B648-8078-623E9EA546BC}"/>
+              </a:ext>
+            </a:extLst>
+          </p:cNvPr>
+          <p:cNvSpPr/>
+          <p:nvPr/>
+        </p:nvSpPr>
+        <p:spPr>
+          <a:xfrm>
+            <a:off x="9148965" y="5267517"/>
+            <a:ext cx="1147244" cy="220620"/>
+          </a:xfrm>
+          <a:prstGeom prst="ellipse">
+            <a:avLst/>
+          </a:prstGeom>
+        </p:spPr>
+        <p:style>
+          <a:lnRef idx="2">
+            <a:schemeClr val="accent1">
+              <a:shade val="15000"/>
+            </a:schemeClr>
+          </a:lnRef>
+          <a:fillRef idx="1">
+            <a:schemeClr val="accent1"/>
+          </a:fillRef>
+          <a:effectRef idx="0">
+            <a:schemeClr val="accent1"/>
+          </a:effectRef>
+          <a:fontRef idx="minor">
+            <a:schemeClr val="lt1"/>
+          </a:fontRef>
+        </p:style>
+        <p:txBody>
+          <a:bodyPr rtlCol="0" anchor="ctr"/>
+          <a:lstStyle/>
+          <a:p>
+            <a:pPr algn="ctr"/>
+            <a:r>
+              <a:rPr lang="es-MX" sz="1000" dirty="0"/>
+              <a:t>factor</a:t>
+            </a:r>
+          </a:p>
+        </p:txBody>
+      </p:sp>
+      <p:sp>
+        <p:nvSpPr>
+          <p:cNvPr id="73" name="Elipse 72">
+            <a:extLst>
+              <a:ext uri="{FF2B5EF4-FFF2-40B4-BE49-F238E27FC236}">
+                <a16:creationId xmlns:a16="http://schemas.microsoft.com/office/drawing/2014/main" id="{607F2F20-D618-8A08-BE8C-7007E5C7A78A}"/>
+              </a:ext>
+            </a:extLst>
+          </p:cNvPr>
+          <p:cNvSpPr/>
+          <p:nvPr/>
+        </p:nvSpPr>
+        <p:spPr>
+          <a:xfrm>
+            <a:off x="9026689" y="5597474"/>
+            <a:ext cx="1147244" cy="220620"/>
+          </a:xfrm>
+          <a:prstGeom prst="ellipse">
+            <a:avLst/>
+          </a:prstGeom>
+        </p:spPr>
+        <p:style>
+          <a:lnRef idx="2">
+            <a:schemeClr val="accent1">
+              <a:shade val="15000"/>
+            </a:schemeClr>
+          </a:lnRef>
+          <a:fillRef idx="1">
+            <a:schemeClr val="accent1"/>
+          </a:fillRef>
+          <a:effectRef idx="0">
+            <a:schemeClr val="accent1"/>
+          </a:effectRef>
+          <a:fontRef idx="minor">
+            <a:schemeClr val="lt1"/>
+          </a:fontRef>
+        </p:style>
+        <p:txBody>
+          <a:bodyPr rtlCol="0" anchor="ctr"/>
+          <a:lstStyle/>
+          <a:p>
+            <a:pPr algn="ctr"/>
+            <a:r>
+              <a:rPr lang="es-MX" sz="1000" dirty="0" err="1"/>
+              <a:t>number</a:t>
+            </a:r>
+            <a:endParaRPr lang="es-MX" sz="1000" dirty="0"/>
+          </a:p>
+        </p:txBody>
+      </p:sp>
+      <p:cxnSp>
+        <p:nvCxnSpPr>
+          <p:cNvPr id="75" name="Conector recto 74">
+            <a:extLst>
+              <a:ext uri="{FF2B5EF4-FFF2-40B4-BE49-F238E27FC236}">
+                <a16:creationId xmlns:a16="http://schemas.microsoft.com/office/drawing/2014/main" id="{4FC63AC5-3B40-F9D9-F1CD-10F0504B8F67}"/>
+              </a:ext>
+            </a:extLst>
+          </p:cNvPr>
+          <p:cNvCxnSpPr>
+            <a:stCxn id="206" idx="4"/>
+            <a:endCxn id="72" idx="0"/>
+          </p:cNvCxnSpPr>
+          <p:nvPr/>
+        </p:nvCxnSpPr>
+        <p:spPr>
+          <a:xfrm>
+            <a:off x="9604713" y="5147476"/>
+            <a:ext cx="117874" cy="120041"/>
+          </a:xfrm>
+          <a:prstGeom prst="line">
+            <a:avLst/>
+          </a:prstGeom>
+        </p:spPr>
+        <p:style>
+          <a:lnRef idx="1">
+            <a:schemeClr val="accent1"/>
+          </a:lnRef>
+          <a:fillRef idx="0">
+            <a:schemeClr val="accent1"/>
+          </a:fillRef>
+          <a:effectRef idx="0">
+            <a:schemeClr val="accent1"/>
+          </a:effectRef>
+          <a:fontRef idx="minor">
+            <a:schemeClr val="tx1"/>
+          </a:fontRef>
+        </p:style>
+      </p:cxnSp>
+      <p:cxnSp>
+        <p:nvCxnSpPr>
+          <p:cNvPr id="77" name="Conector recto 76">
+            <a:extLst>
+              <a:ext uri="{FF2B5EF4-FFF2-40B4-BE49-F238E27FC236}">
+                <a16:creationId xmlns:a16="http://schemas.microsoft.com/office/drawing/2014/main" id="{E1FC270B-8365-E5B2-BC5D-39166A7837A9}"/>
+              </a:ext>
+            </a:extLst>
+          </p:cNvPr>
+          <p:cNvCxnSpPr>
+            <a:stCxn id="72" idx="4"/>
+            <a:endCxn id="73" idx="0"/>
+          </p:cNvCxnSpPr>
+          <p:nvPr/>
+        </p:nvCxnSpPr>
+        <p:spPr>
+          <a:xfrm flipH="1">
+            <a:off x="9600311" y="5488137"/>
+            <a:ext cx="122276" cy="109337"/>
+          </a:xfrm>
+          <a:prstGeom prst="line">
+            <a:avLst/>
+          </a:prstGeom>
+        </p:spPr>
+        <p:style>
+          <a:lnRef idx="1">
+            <a:schemeClr val="accent1"/>
+          </a:lnRef>
+          <a:fillRef idx="0">
+            <a:schemeClr val="accent1"/>
+          </a:fillRef>
+          <a:effectRef idx="0">
+            <a:schemeClr val="accent1"/>
+          </a:effectRef>
+          <a:fontRef idx="minor">
+            <a:schemeClr val="tx1"/>
+          </a:fontRef>
+        </p:style>
+      </p:cxnSp>
+      <p:cxnSp>
+        <p:nvCxnSpPr>
+          <p:cNvPr id="79" name="Conector recto 78">
+            <a:extLst>
+              <a:ext uri="{FF2B5EF4-FFF2-40B4-BE49-F238E27FC236}">
+                <a16:creationId xmlns:a16="http://schemas.microsoft.com/office/drawing/2014/main" id="{97007924-BA68-E06F-948A-EE1B7DAB14D7}"/>
+              </a:ext>
+            </a:extLst>
+          </p:cNvPr>
+          <p:cNvCxnSpPr>
+            <a:stCxn id="117" idx="4"/>
+            <a:endCxn id="56" idx="0"/>
+          </p:cNvCxnSpPr>
+          <p:nvPr/>
+        </p:nvCxnSpPr>
+        <p:spPr>
+          <a:xfrm flipH="1">
+            <a:off x="4517134" y="1685940"/>
+            <a:ext cx="2617600" cy="1253267"/>
+          </a:xfrm>
+          <a:prstGeom prst="line">
+            <a:avLst/>
+          </a:prstGeom>
+        </p:spPr>
+        <p:style>
+          <a:lnRef idx="1">
+            <a:schemeClr val="accent1"/>
+          </a:lnRef>
+          <a:fillRef idx="0">
+            <a:schemeClr val="accent1"/>
+          </a:fillRef>
+          <a:effectRef idx="0">
+            <a:schemeClr val="accent1"/>
+          </a:effectRef>
+          <a:fontRef idx="minor">
+            <a:schemeClr val="tx1"/>
+          </a:fontRef>
+        </p:style>
+      </p:cxnSp>
+      <p:sp>
+        <p:nvSpPr>
+          <p:cNvPr id="80" name="Elipse 79">
+            <a:extLst>
+              <a:ext uri="{FF2B5EF4-FFF2-40B4-BE49-F238E27FC236}">
+                <a16:creationId xmlns:a16="http://schemas.microsoft.com/office/drawing/2014/main" id="{715D2DF1-4BAE-A4E5-9C51-BB32CE667EF6}"/>
+              </a:ext>
+            </a:extLst>
+          </p:cNvPr>
+          <p:cNvSpPr/>
+          <p:nvPr/>
+        </p:nvSpPr>
+        <p:spPr>
+          <a:xfrm>
+            <a:off x="10356924" y="4699317"/>
+            <a:ext cx="1151179" cy="332855"/>
+          </a:xfrm>
+          <a:prstGeom prst="ellipse">
+            <a:avLst/>
+          </a:prstGeom>
+        </p:spPr>
+        <p:style>
+          <a:lnRef idx="2">
+            <a:schemeClr val="accent1">
+              <a:shade val="15000"/>
+            </a:schemeClr>
+          </a:lnRef>
+          <a:fillRef idx="1">
+            <a:schemeClr val="accent1"/>
+          </a:fillRef>
+          <a:effectRef idx="0">
+            <a:schemeClr val="accent1"/>
+          </a:effectRef>
+          <a:fontRef idx="minor">
+            <a:schemeClr val="lt1"/>
+          </a:fontRef>
+        </p:style>
+        <p:txBody>
+          <a:bodyPr rtlCol="0" anchor="ctr"/>
+          <a:lstStyle/>
+          <a:p>
+            <a:pPr algn="ctr"/>
+            <a:r>
+              <a:rPr lang="es-MX" sz="1100" dirty="0" err="1"/>
+              <a:t>statement</a:t>
+            </a:r>
+            <a:endParaRPr lang="es-MX" sz="1100" dirty="0"/>
+          </a:p>
+        </p:txBody>
+      </p:sp>
+      <p:cxnSp>
+        <p:nvCxnSpPr>
+          <p:cNvPr id="82" name="Conector recto 81">
+            <a:extLst>
+              <a:ext uri="{FF2B5EF4-FFF2-40B4-BE49-F238E27FC236}">
+                <a16:creationId xmlns:a16="http://schemas.microsoft.com/office/drawing/2014/main" id="{6FC48E38-D859-8ECB-F277-9A460A53147C}"/>
+              </a:ext>
+            </a:extLst>
+          </p:cNvPr>
+          <p:cNvCxnSpPr>
+            <a:stCxn id="193" idx="4"/>
+            <a:endCxn id="80" idx="0"/>
+          </p:cNvCxnSpPr>
+          <p:nvPr/>
+        </p:nvCxnSpPr>
+        <p:spPr>
+          <a:xfrm>
+            <a:off x="10932514" y="4623984"/>
+            <a:ext cx="0" cy="75333"/>
+          </a:xfrm>
+          <a:prstGeom prst="line">
+            <a:avLst/>
+          </a:prstGeom>
+        </p:spPr>
+        <p:style>
+          <a:lnRef idx="1">
+            <a:schemeClr val="accent1"/>
+          </a:lnRef>
+          <a:fillRef idx="0">
+            <a:schemeClr val="accent1"/>
+          </a:fillRef>
+          <a:effectRef idx="0">
+            <a:schemeClr val="accent1"/>
+          </a:effectRef>
+          <a:fontRef idx="minor">
+            <a:schemeClr val="tx1"/>
+          </a:fontRef>
+        </p:style>
+      </p:cxnSp>
+      <p:sp>
+        <p:nvSpPr>
+          <p:cNvPr id="84" name="Elipse 83">
+            <a:extLst>
+              <a:ext uri="{FF2B5EF4-FFF2-40B4-BE49-F238E27FC236}">
+                <a16:creationId xmlns:a16="http://schemas.microsoft.com/office/drawing/2014/main" id="{503C468D-99C4-31AC-8999-3CF3BE88CD2C}"/>
+              </a:ext>
+            </a:extLst>
+          </p:cNvPr>
+          <p:cNvSpPr/>
+          <p:nvPr/>
+        </p:nvSpPr>
+        <p:spPr>
+          <a:xfrm>
+            <a:off x="10385551" y="5107505"/>
+            <a:ext cx="1303334" cy="332855"/>
+          </a:xfrm>
+          <a:prstGeom prst="ellipse">
+            <a:avLst/>
+          </a:prstGeom>
+        </p:spPr>
+        <p:style>
+          <a:lnRef idx="2">
+            <a:schemeClr val="accent1">
+              <a:shade val="15000"/>
+            </a:schemeClr>
+          </a:lnRef>
+          <a:fillRef idx="1">
+            <a:schemeClr val="accent1"/>
+          </a:fillRef>
+          <a:effectRef idx="0">
+            <a:schemeClr val="accent1"/>
+          </a:effectRef>
+          <a:fontRef idx="minor">
+            <a:schemeClr val="lt1"/>
+          </a:fontRef>
+        </p:style>
+        <p:txBody>
+          <a:bodyPr rtlCol="0" anchor="ctr"/>
+          <a:lstStyle/>
+          <a:p>
+            <a:pPr algn="ctr"/>
+            <a:r>
+              <a:rPr lang="es-MX" sz="1100" dirty="0" err="1"/>
+              <a:t>assignment</a:t>
+            </a:r>
+            <a:endParaRPr lang="es-MX" sz="1100" dirty="0"/>
+          </a:p>
+        </p:txBody>
+      </p:sp>
+      <p:cxnSp>
+        <p:nvCxnSpPr>
+          <p:cNvPr id="86" name="Conector recto 85">
+            <a:extLst>
+              <a:ext uri="{FF2B5EF4-FFF2-40B4-BE49-F238E27FC236}">
+                <a16:creationId xmlns:a16="http://schemas.microsoft.com/office/drawing/2014/main" id="{981D88B5-D60B-A9E5-4D5D-A4498CA4C0F0}"/>
+              </a:ext>
+            </a:extLst>
+          </p:cNvPr>
+          <p:cNvCxnSpPr>
+            <a:stCxn id="80" idx="4"/>
+            <a:endCxn id="84" idx="0"/>
+          </p:cNvCxnSpPr>
+          <p:nvPr/>
+        </p:nvCxnSpPr>
+        <p:spPr>
+          <a:xfrm>
+            <a:off x="10932514" y="5032172"/>
+            <a:ext cx="104704" cy="75333"/>
+          </a:xfrm>
+          <a:prstGeom prst="line">
+            <a:avLst/>
+          </a:prstGeom>
+        </p:spPr>
+        <p:style>
+          <a:lnRef idx="1">
+            <a:schemeClr val="accent1"/>
+          </a:lnRef>
+          <a:fillRef idx="0">
+            <a:schemeClr val="accent1"/>
+          </a:fillRef>
+          <a:effectRef idx="0">
+            <a:schemeClr val="accent1"/>
+          </a:effectRef>
+          <a:fontRef idx="minor">
+            <a:schemeClr val="tx1"/>
+          </a:fontRef>
+        </p:style>
+      </p:cxnSp>
+      <p:sp>
+        <p:nvSpPr>
+          <p:cNvPr id="91" name="Elipse 90">
+            <a:extLst>
+              <a:ext uri="{FF2B5EF4-FFF2-40B4-BE49-F238E27FC236}">
+                <a16:creationId xmlns:a16="http://schemas.microsoft.com/office/drawing/2014/main" id="{70E506F8-0483-926C-1C40-0911F5C7451E}"/>
+              </a:ext>
+            </a:extLst>
+          </p:cNvPr>
+          <p:cNvSpPr/>
+          <p:nvPr/>
+        </p:nvSpPr>
+        <p:spPr>
+          <a:xfrm>
+            <a:off x="8964477" y="6114084"/>
+            <a:ext cx="772635" cy="472440"/>
+          </a:xfrm>
+          <a:prstGeom prst="ellipse">
+            <a:avLst/>
+          </a:prstGeom>
+        </p:spPr>
+        <p:style>
+          <a:lnRef idx="2">
+            <a:schemeClr val="accent1">
+              <a:shade val="15000"/>
+            </a:schemeClr>
+          </a:lnRef>
+          <a:fillRef idx="1">
+            <a:schemeClr val="accent1"/>
+          </a:fillRef>
+          <a:effectRef idx="0">
+            <a:schemeClr val="accent1"/>
+          </a:effectRef>
+          <a:fontRef idx="minor">
+            <a:schemeClr val="lt1"/>
+          </a:fontRef>
+        </p:style>
+        <p:txBody>
+          <a:bodyPr rtlCol="0" anchor="ctr"/>
+          <a:lstStyle/>
+          <a:p>
+            <a:pPr algn="ctr"/>
+            <a:r>
+              <a:rPr lang="es-MX" sz="1100" dirty="0"/>
+              <a:t>id</a:t>
+            </a:r>
+          </a:p>
+        </p:txBody>
+      </p:sp>
+      <p:sp>
+        <p:nvSpPr>
+          <p:cNvPr id="97" name="Elipse 96">
+            <a:extLst>
+              <a:ext uri="{FF2B5EF4-FFF2-40B4-BE49-F238E27FC236}">
+                <a16:creationId xmlns:a16="http://schemas.microsoft.com/office/drawing/2014/main" id="{6EB31572-14AD-5F98-CE0A-3B30D84F1A1C}"/>
+              </a:ext>
+            </a:extLst>
+          </p:cNvPr>
+          <p:cNvSpPr/>
+          <p:nvPr/>
+        </p:nvSpPr>
+        <p:spPr>
+          <a:xfrm>
+            <a:off x="9811910" y="6087160"/>
+            <a:ext cx="518572" cy="472440"/>
+          </a:xfrm>
+          <a:prstGeom prst="ellipse">
+            <a:avLst/>
+          </a:prstGeom>
+        </p:spPr>
+        <p:style>
+          <a:lnRef idx="2">
+            <a:schemeClr val="accent1">
+              <a:shade val="15000"/>
+            </a:schemeClr>
+          </a:lnRef>
+          <a:fillRef idx="1">
+            <a:schemeClr val="accent1"/>
+          </a:fillRef>
+          <a:effectRef idx="0">
+            <a:schemeClr val="accent1"/>
+          </a:effectRef>
+          <a:fontRef idx="minor">
+            <a:schemeClr val="lt1"/>
+          </a:fontRef>
+        </p:style>
+        <p:txBody>
+          <a:bodyPr rtlCol="0" anchor="ctr"/>
+          <a:lstStyle/>
+          <a:p>
+            <a:pPr algn="ctr"/>
+            <a:r>
+              <a:rPr lang="es-MX" sz="1100" dirty="0"/>
+              <a:t>=</a:t>
+            </a:r>
+          </a:p>
+        </p:txBody>
+      </p:sp>
+      <p:sp>
+        <p:nvSpPr>
+          <p:cNvPr id="100" name="Elipse 99">
+            <a:extLst>
+              <a:ext uri="{FF2B5EF4-FFF2-40B4-BE49-F238E27FC236}">
+                <a16:creationId xmlns:a16="http://schemas.microsoft.com/office/drawing/2014/main" id="{AC93062C-0547-A303-EA74-5E0CB87803A7}"/>
+              </a:ext>
+            </a:extLst>
+          </p:cNvPr>
+          <p:cNvSpPr/>
+          <p:nvPr/>
+        </p:nvSpPr>
+        <p:spPr>
+          <a:xfrm>
+            <a:off x="11730318" y="6042727"/>
+            <a:ext cx="518572" cy="472440"/>
+          </a:xfrm>
+          <a:prstGeom prst="ellipse">
+            <a:avLst/>
+          </a:prstGeom>
+        </p:spPr>
+        <p:style>
+          <a:lnRef idx="2">
+            <a:schemeClr val="accent1">
+              <a:shade val="15000"/>
+            </a:schemeClr>
+          </a:lnRef>
+          <a:fillRef idx="1">
+            <a:schemeClr val="accent1"/>
+          </a:fillRef>
+          <a:effectRef idx="0">
+            <a:schemeClr val="accent1"/>
+          </a:effectRef>
+          <a:fontRef idx="minor">
+            <a:schemeClr val="lt1"/>
+          </a:fontRef>
+        </p:style>
+        <p:txBody>
+          <a:bodyPr rtlCol="0" anchor="ctr"/>
+          <a:lstStyle/>
+          <a:p>
+            <a:pPr algn="ctr"/>
+            <a:r>
+              <a:rPr lang="es-MX" sz="1100" dirty="0"/>
+              <a:t>;</a:t>
+            </a:r>
+          </a:p>
+        </p:txBody>
+      </p:sp>
+      <p:cxnSp>
+        <p:nvCxnSpPr>
+          <p:cNvPr id="102" name="Conector recto 101">
+            <a:extLst>
+              <a:ext uri="{FF2B5EF4-FFF2-40B4-BE49-F238E27FC236}">
+                <a16:creationId xmlns:a16="http://schemas.microsoft.com/office/drawing/2014/main" id="{550F4A80-16C8-BDBC-2694-1F2BF0F85EF7}"/>
+              </a:ext>
+            </a:extLst>
+          </p:cNvPr>
+          <p:cNvCxnSpPr>
+            <a:stCxn id="84" idx="4"/>
+            <a:endCxn id="91" idx="0"/>
+          </p:cNvCxnSpPr>
+          <p:nvPr/>
+        </p:nvCxnSpPr>
+        <p:spPr>
+          <a:xfrm flipH="1">
+            <a:off x="9350795" y="5440360"/>
+            <a:ext cx="1686423" cy="673724"/>
+          </a:xfrm>
+          <a:prstGeom prst="line">
+            <a:avLst/>
+          </a:prstGeom>
+        </p:spPr>
+        <p:style>
+          <a:lnRef idx="1">
+            <a:schemeClr val="accent1"/>
+          </a:lnRef>
+          <a:fillRef idx="0">
+            <a:schemeClr val="accent1"/>
+          </a:fillRef>
+          <a:effectRef idx="0">
+            <a:schemeClr val="accent1"/>
+          </a:effectRef>
+          <a:fontRef idx="minor">
+            <a:schemeClr val="tx1"/>
+          </a:fontRef>
+        </p:style>
+      </p:cxnSp>
+      <p:cxnSp>
+        <p:nvCxnSpPr>
+          <p:cNvPr id="104" name="Conector recto 103">
+            <a:extLst>
+              <a:ext uri="{FF2B5EF4-FFF2-40B4-BE49-F238E27FC236}">
+                <a16:creationId xmlns:a16="http://schemas.microsoft.com/office/drawing/2014/main" id="{84CD61A4-70E0-0EE4-1B54-B7218E3FFA5A}"/>
+              </a:ext>
+            </a:extLst>
+          </p:cNvPr>
+          <p:cNvCxnSpPr>
+            <a:stCxn id="84" idx="4"/>
+            <a:endCxn id="97" idx="0"/>
+          </p:cNvCxnSpPr>
+          <p:nvPr/>
+        </p:nvCxnSpPr>
+        <p:spPr>
+          <a:xfrm flipH="1">
+            <a:off x="10071196" y="5440360"/>
+            <a:ext cx="966022" cy="646800"/>
+          </a:xfrm>
+          <a:prstGeom prst="line">
+            <a:avLst/>
+          </a:prstGeom>
+        </p:spPr>
+        <p:style>
+          <a:lnRef idx="1">
+            <a:schemeClr val="accent1"/>
+          </a:lnRef>
+          <a:fillRef idx="0">
+            <a:schemeClr val="accent1"/>
+          </a:fillRef>
+          <a:effectRef idx="0">
+            <a:schemeClr val="accent1"/>
+          </a:effectRef>
+          <a:fontRef idx="minor">
+            <a:schemeClr val="tx1"/>
+          </a:fontRef>
+        </p:style>
+      </p:cxnSp>
+      <p:cxnSp>
+        <p:nvCxnSpPr>
+          <p:cNvPr id="108" name="Conector recto 107">
+            <a:extLst>
+              <a:ext uri="{FF2B5EF4-FFF2-40B4-BE49-F238E27FC236}">
+                <a16:creationId xmlns:a16="http://schemas.microsoft.com/office/drawing/2014/main" id="{074366FC-7775-1283-613D-6BAFEF4EF63D}"/>
+              </a:ext>
+            </a:extLst>
+          </p:cNvPr>
+          <p:cNvCxnSpPr>
+            <a:stCxn id="84" idx="4"/>
+            <a:endCxn id="100" idx="0"/>
+          </p:cNvCxnSpPr>
+          <p:nvPr/>
+        </p:nvCxnSpPr>
+        <p:spPr>
+          <a:xfrm>
+            <a:off x="11037218" y="5440360"/>
+            <a:ext cx="952386" cy="602367"/>
+          </a:xfrm>
+          <a:prstGeom prst="line">
+            <a:avLst/>
+          </a:prstGeom>
+        </p:spPr>
+        <p:style>
+          <a:lnRef idx="1">
+            <a:schemeClr val="accent1"/>
+          </a:lnRef>
+          <a:fillRef idx="0">
+            <a:schemeClr val="accent1"/>
+          </a:fillRef>
+          <a:effectRef idx="0">
+            <a:schemeClr val="accent1"/>
+          </a:effectRef>
+          <a:fontRef idx="minor">
+            <a:schemeClr val="tx1"/>
+          </a:fontRef>
+        </p:style>
+      </p:cxnSp>
+      <p:sp>
+        <p:nvSpPr>
+          <p:cNvPr id="111" name="Elipse 110">
+            <a:extLst>
+              <a:ext uri="{FF2B5EF4-FFF2-40B4-BE49-F238E27FC236}">
+                <a16:creationId xmlns:a16="http://schemas.microsoft.com/office/drawing/2014/main" id="{08EE3ED9-3E1D-ED0C-5001-2AB277FE5B85}"/>
+              </a:ext>
+            </a:extLst>
+          </p:cNvPr>
+          <p:cNvSpPr/>
+          <p:nvPr/>
+        </p:nvSpPr>
+        <p:spPr>
+          <a:xfrm>
+            <a:off x="10532853" y="5770531"/>
+            <a:ext cx="1112260" cy="207754"/>
+          </a:xfrm>
+          <a:prstGeom prst="ellipse">
+            <a:avLst/>
+          </a:prstGeom>
+        </p:spPr>
+        <p:style>
+          <a:lnRef idx="2">
+            <a:schemeClr val="accent1">
+              <a:shade val="15000"/>
+            </a:schemeClr>
+          </a:lnRef>
+          <a:fillRef idx="1">
+            <a:schemeClr val="accent1"/>
+          </a:fillRef>
+          <a:effectRef idx="0">
+            <a:schemeClr val="accent1"/>
+          </a:effectRef>
+          <a:fontRef idx="minor">
+            <a:schemeClr val="lt1"/>
+          </a:fontRef>
+        </p:style>
+        <p:txBody>
+          <a:bodyPr rtlCol="0" anchor="ctr"/>
+          <a:lstStyle/>
+          <a:p>
+            <a:pPr algn="ctr"/>
+            <a:r>
+              <a:rPr lang="es-MX" sz="1000" dirty="0" err="1"/>
+              <a:t>Expression</a:t>
+            </a:r>
+            <a:endParaRPr lang="es-MX" sz="1000" dirty="0"/>
+          </a:p>
+        </p:txBody>
+      </p:sp>
+      <p:sp>
+        <p:nvSpPr>
+          <p:cNvPr id="112" name="Elipse 111">
+            <a:extLst>
+              <a:ext uri="{FF2B5EF4-FFF2-40B4-BE49-F238E27FC236}">
+                <a16:creationId xmlns:a16="http://schemas.microsoft.com/office/drawing/2014/main" id="{0AF8E0EA-F72F-A399-CB3C-EED6C6ED7A95}"/>
+              </a:ext>
+            </a:extLst>
+          </p:cNvPr>
+          <p:cNvSpPr/>
+          <p:nvPr/>
+        </p:nvSpPr>
+        <p:spPr>
+          <a:xfrm>
+            <a:off x="10521136" y="6071193"/>
+            <a:ext cx="1112260" cy="207754"/>
+          </a:xfrm>
+          <a:prstGeom prst="ellipse">
+            <a:avLst/>
+          </a:prstGeom>
+        </p:spPr>
+        <p:style>
+          <a:lnRef idx="2">
+            <a:schemeClr val="accent1">
+              <a:shade val="15000"/>
+            </a:schemeClr>
+          </a:lnRef>
+          <a:fillRef idx="1">
+            <a:schemeClr val="accent1"/>
+          </a:fillRef>
+          <a:effectRef idx="0">
+            <a:schemeClr val="accent1"/>
+          </a:effectRef>
+          <a:fontRef idx="minor">
+            <a:schemeClr val="lt1"/>
+          </a:fontRef>
+        </p:style>
+        <p:txBody>
+          <a:bodyPr rtlCol="0" anchor="ctr"/>
+          <a:lstStyle/>
+          <a:p>
+            <a:pPr algn="ctr"/>
+            <a:r>
+              <a:rPr lang="es-MX" sz="1000" dirty="0"/>
+              <a:t>factor</a:t>
+            </a:r>
+          </a:p>
+        </p:txBody>
+      </p:sp>
+      <p:sp>
+        <p:nvSpPr>
+          <p:cNvPr id="114" name="Elipse 113">
+            <a:extLst>
+              <a:ext uri="{FF2B5EF4-FFF2-40B4-BE49-F238E27FC236}">
+                <a16:creationId xmlns:a16="http://schemas.microsoft.com/office/drawing/2014/main" id="{F4F75E17-F336-3B98-C0DC-7EEA428E298D}"/>
+              </a:ext>
+            </a:extLst>
+          </p:cNvPr>
+          <p:cNvSpPr/>
+          <p:nvPr/>
+        </p:nvSpPr>
+        <p:spPr>
+          <a:xfrm>
+            <a:off x="10517036" y="6418033"/>
+            <a:ext cx="1112260" cy="207754"/>
+          </a:xfrm>
+          <a:prstGeom prst="ellipse">
+            <a:avLst/>
+          </a:prstGeom>
+        </p:spPr>
+        <p:style>
+          <a:lnRef idx="2">
+            <a:schemeClr val="accent1">
+              <a:shade val="15000"/>
+            </a:schemeClr>
+          </a:lnRef>
+          <a:fillRef idx="1">
+            <a:schemeClr val="accent1"/>
+          </a:fillRef>
+          <a:effectRef idx="0">
+            <a:schemeClr val="accent1"/>
+          </a:effectRef>
+          <a:fontRef idx="minor">
+            <a:schemeClr val="lt1"/>
+          </a:fontRef>
+        </p:style>
+        <p:txBody>
+          <a:bodyPr rtlCol="0" anchor="ctr"/>
+          <a:lstStyle/>
+          <a:p>
+            <a:pPr algn="ctr"/>
+            <a:r>
+              <a:rPr lang="es-MX" sz="1000" dirty="0" err="1"/>
+              <a:t>number</a:t>
+            </a:r>
+            <a:endParaRPr lang="es-MX" sz="1000" dirty="0"/>
+          </a:p>
+        </p:txBody>
+      </p:sp>
+      <p:cxnSp>
+        <p:nvCxnSpPr>
+          <p:cNvPr id="119" name="Conector recto 118">
+            <a:extLst>
+              <a:ext uri="{FF2B5EF4-FFF2-40B4-BE49-F238E27FC236}">
+                <a16:creationId xmlns:a16="http://schemas.microsoft.com/office/drawing/2014/main" id="{3608020F-57E1-D74B-7B96-32FD42CC9BCC}"/>
+              </a:ext>
+            </a:extLst>
+          </p:cNvPr>
+          <p:cNvCxnSpPr>
+            <a:stCxn id="84" idx="4"/>
+            <a:endCxn id="111" idx="0"/>
+          </p:cNvCxnSpPr>
+          <p:nvPr/>
+        </p:nvCxnSpPr>
+        <p:spPr>
+          <a:xfrm>
+            <a:off x="11037218" y="5440360"/>
+            <a:ext cx="51765" cy="330171"/>
+          </a:xfrm>
+          <a:prstGeom prst="line">
+            <a:avLst/>
+          </a:prstGeom>
+        </p:spPr>
+        <p:style>
+          <a:lnRef idx="1">
+            <a:schemeClr val="accent1"/>
+          </a:lnRef>
+          <a:fillRef idx="0">
+            <a:schemeClr val="accent1"/>
+          </a:fillRef>
+          <a:effectRef idx="0">
+            <a:schemeClr val="accent1"/>
+          </a:effectRef>
+          <a:fontRef idx="minor">
+            <a:schemeClr val="tx1"/>
+          </a:fontRef>
+        </p:style>
+      </p:cxnSp>
+      <p:cxnSp>
+        <p:nvCxnSpPr>
+          <p:cNvPr id="122" name="Conector recto 121">
+            <a:extLst>
+              <a:ext uri="{FF2B5EF4-FFF2-40B4-BE49-F238E27FC236}">
+                <a16:creationId xmlns:a16="http://schemas.microsoft.com/office/drawing/2014/main" id="{98EDC096-42A5-6676-0067-DF8336D09227}"/>
+              </a:ext>
+            </a:extLst>
+          </p:cNvPr>
+          <p:cNvCxnSpPr>
+            <a:stCxn id="111" idx="4"/>
+            <a:endCxn id="112" idx="0"/>
+          </p:cNvCxnSpPr>
+          <p:nvPr/>
+        </p:nvCxnSpPr>
+        <p:spPr>
+          <a:xfrm flipH="1">
+            <a:off x="11077266" y="5978285"/>
+            <a:ext cx="11717" cy="92908"/>
+          </a:xfrm>
+          <a:prstGeom prst="line">
+            <a:avLst/>
+          </a:prstGeom>
+        </p:spPr>
+        <p:style>
+          <a:lnRef idx="1">
+            <a:schemeClr val="accent1"/>
+          </a:lnRef>
+          <a:fillRef idx="0">
+            <a:schemeClr val="accent1"/>
+          </a:fillRef>
+          <a:effectRef idx="0">
+            <a:schemeClr val="accent1"/>
+          </a:effectRef>
+          <a:fontRef idx="minor">
+            <a:schemeClr val="tx1"/>
+          </a:fontRef>
+        </p:style>
+      </p:cxnSp>
+      <p:cxnSp>
+        <p:nvCxnSpPr>
+          <p:cNvPr id="125" name="Conector recto 124">
+            <a:extLst>
+              <a:ext uri="{FF2B5EF4-FFF2-40B4-BE49-F238E27FC236}">
+                <a16:creationId xmlns:a16="http://schemas.microsoft.com/office/drawing/2014/main" id="{C10288E3-6417-B76C-9DE3-158548F78708}"/>
+              </a:ext>
+            </a:extLst>
+          </p:cNvPr>
+          <p:cNvCxnSpPr>
+            <a:stCxn id="112" idx="4"/>
+            <a:endCxn id="114" idx="0"/>
+          </p:cNvCxnSpPr>
+          <p:nvPr/>
+        </p:nvCxnSpPr>
+        <p:spPr>
+          <a:xfrm flipH="1">
+            <a:off x="11073166" y="6278947"/>
+            <a:ext cx="4100" cy="139086"/>
           </a:xfrm>
           <a:prstGeom prst="line">
             <a:avLst/>

</xml_diff>